<commit_message>
Ppt Edited by Kuldeepak Gupta 1471
</commit_message>
<xml_diff>
--- a/Revert.pptx
+++ b/Revert.pptx
@@ -6,6 +6,7 @@
   </p:sldMasterIdLst>
   <p:sldIdLst>
     <p:sldId id="256" r:id="rId2"/>
+    <p:sldId id="259" r:id="rId3"/>
   </p:sldIdLst>
   <p:sldSz cx="12192000" cy="6858000"/>
   <p:notesSz cx="6858000" cy="9144000"/>
@@ -3363,7 +3364,7 @@
                 <a16:creationId xmlns:a16="http://schemas.microsoft.com/office/drawing/2014/main" id="{88294908-8B00-4F58-BBBA-20F71A40AA9E}"/>
               </a:ext>
               <a:ext uri="{C183D7F6-B498-43B3-948B-1728B52AA6E4}">
-                <adec:decorative xmlns:adec="http://schemas.microsoft.com/office/drawing/2017/decorative" xmlns="" val="1"/>
+                <adec:decorative xmlns:adec="http://schemas.microsoft.com/office/drawing/2017/decorative" val="1"/>
               </a:ext>
             </a:extLst>
           </p:cNvPr>
@@ -3426,7 +3427,7 @@
                 <a16:creationId xmlns:a16="http://schemas.microsoft.com/office/drawing/2014/main" id="{4364C879-1404-4203-8E9D-CC5DE0A621A2}"/>
               </a:ext>
               <a:ext uri="{C183D7F6-B498-43B3-948B-1728B52AA6E4}">
-                <adec:decorative xmlns:adec="http://schemas.microsoft.com/office/drawing/2017/decorative" xmlns="" val="1"/>
+                <adec:decorative xmlns:adec="http://schemas.microsoft.com/office/drawing/2017/decorative" val="1"/>
               </a:ext>
             </a:extLst>
           </p:cNvPr>
@@ -3536,7 +3537,7 @@
                 <a16:creationId xmlns:a16="http://schemas.microsoft.com/office/drawing/2014/main" id="{84617302-4B0D-4351-A6BB-6F0930D943AC}"/>
               </a:ext>
               <a:ext uri="{C183D7F6-B498-43B3-948B-1728B52AA6E4}">
-                <adec:decorative xmlns:adec="http://schemas.microsoft.com/office/drawing/2017/decorative" xmlns="" val="1"/>
+                <adec:decorative xmlns:adec="http://schemas.microsoft.com/office/drawing/2017/decorative" val="1"/>
               </a:ext>
             </a:extLst>
           </p:cNvPr>
@@ -3654,7 +3655,7 @@
                 <a16:creationId xmlns:a16="http://schemas.microsoft.com/office/drawing/2014/main" id="{DA2C7802-C2E0-4218-8F89-8DD7CCD2CD1C}"/>
               </a:ext>
               <a:ext uri="{C183D7F6-B498-43B3-948B-1728B52AA6E4}">
-                <adec:decorative xmlns:adec="http://schemas.microsoft.com/office/drawing/2017/decorative" xmlns="" val="1"/>
+                <adec:decorative xmlns:adec="http://schemas.microsoft.com/office/drawing/2017/decorative" val="1"/>
               </a:ext>
             </a:extLst>
           </p:cNvPr>
@@ -3764,7 +3765,7 @@
                 <a16:creationId xmlns:a16="http://schemas.microsoft.com/office/drawing/2014/main" id="{A6D7111A-21E5-4EE9-8A78-10E5530F0116}"/>
               </a:ext>
               <a:ext uri="{C183D7F6-B498-43B3-948B-1728B52AA6E4}">
-                <adec:decorative xmlns:adec="http://schemas.microsoft.com/office/drawing/2017/decorative" xmlns="" val="1"/>
+                <adec:decorative xmlns:adec="http://schemas.microsoft.com/office/drawing/2017/decorative" val="1"/>
               </a:ext>
             </a:extLst>
           </p:cNvPr>
@@ -3831,7 +3832,7 @@
                 <a16:creationId xmlns:a16="http://schemas.microsoft.com/office/drawing/2014/main" id="{A3969E80-A77B-49FC-9122-D89AFD5EE118}"/>
               </a:ext>
               <a:ext uri="{C183D7F6-B498-43B3-948B-1728B52AA6E4}">
-                <adec:decorative xmlns:adec="http://schemas.microsoft.com/office/drawing/2017/decorative" xmlns="" val="1"/>
+                <adec:decorative xmlns:adec="http://schemas.microsoft.com/office/drawing/2017/decorative" val="1"/>
               </a:ext>
             </a:extLst>
           </p:cNvPr>
@@ -3949,7 +3950,7 @@
                 <a16:creationId xmlns:a16="http://schemas.microsoft.com/office/drawing/2014/main" id="{1849CA57-76BD-4CF2-80BA-D7A46A01B7B1}"/>
               </a:ext>
               <a:ext uri="{C183D7F6-B498-43B3-948B-1728B52AA6E4}">
-                <adec:decorative xmlns:adec="http://schemas.microsoft.com/office/drawing/2017/decorative" xmlns="" val="1"/>
+                <adec:decorative xmlns:adec="http://schemas.microsoft.com/office/drawing/2017/decorative" val="1"/>
               </a:ext>
             </a:extLst>
           </p:cNvPr>
@@ -4027,7 +4028,7 @@
                 <a16:creationId xmlns:a16="http://schemas.microsoft.com/office/drawing/2014/main" id="{35E9085E-E730-4768-83D4-6CB7E9897153}"/>
               </a:ext>
               <a:ext uri="{C183D7F6-B498-43B3-948B-1728B52AA6E4}">
-                <adec:decorative xmlns:adec="http://schemas.microsoft.com/office/drawing/2017/decorative" xmlns="" val="1"/>
+                <adec:decorative xmlns:adec="http://schemas.microsoft.com/office/drawing/2017/decorative" val="1"/>
               </a:ext>
             </a:extLst>
           </p:cNvPr>
@@ -4151,7 +4152,7 @@
                 <a16:creationId xmlns:a16="http://schemas.microsoft.com/office/drawing/2014/main" id="{973272FE-A474-4CAE-8CA2-BCC8B476C3F4}"/>
               </a:ext>
               <a:ext uri="{C183D7F6-B498-43B3-948B-1728B52AA6E4}">
-                <adec:decorative xmlns:adec="http://schemas.microsoft.com/office/drawing/2017/decorative" xmlns="" val="1"/>
+                <adec:decorative xmlns:adec="http://schemas.microsoft.com/office/drawing/2017/decorative" val="1"/>
               </a:ext>
             </a:extLst>
           </p:cNvPr>
@@ -4330,7 +4331,7 @@
                 <a16:creationId xmlns:a16="http://schemas.microsoft.com/office/drawing/2014/main" id="{E07981EA-05A6-437C-88D7-B377B92B031D}"/>
               </a:ext>
               <a:ext uri="{C183D7F6-B498-43B3-948B-1728B52AA6E4}">
-                <adec:decorative xmlns:adec="http://schemas.microsoft.com/office/drawing/2017/decorative" xmlns="" val="1"/>
+                <adec:decorative xmlns:adec="http://schemas.microsoft.com/office/drawing/2017/decorative" val="1"/>
               </a:ext>
             </a:extLst>
           </p:cNvPr>
@@ -4440,7 +4441,7 @@
                 <a16:creationId xmlns:a16="http://schemas.microsoft.com/office/drawing/2014/main" id="{15E3C750-986E-4769-B1AE-49289FBEE757}"/>
               </a:ext>
               <a:ext uri="{C183D7F6-B498-43B3-948B-1728B52AA6E4}">
-                <adec:decorative xmlns:adec="http://schemas.microsoft.com/office/drawing/2017/decorative" xmlns="" val="1"/>
+                <adec:decorative xmlns:adec="http://schemas.microsoft.com/office/drawing/2017/decorative" val="1"/>
               </a:ext>
             </a:extLst>
           </p:cNvPr>
@@ -4856,7 +4857,7 @@
                 <a14:useLocalDpi xmlns:a14="http://schemas.microsoft.com/office/drawing/2010/main" val="0"/>
               </a:ext>
               <a:ext uri="{96DAC541-7B7A-43D3-8B79-37D633B846F1}">
-                <asvg:svgBlip xmlns:asvg="http://schemas.microsoft.com/office/drawing/2016/SVG/main" xmlns="" r:embed="rId3"/>
+                <asvg:svgBlip xmlns:asvg="http://schemas.microsoft.com/office/drawing/2016/SVG/main" r:embed="rId3"/>
               </a:ext>
             </a:extLst>
           </a:blip>
@@ -4878,6 +4879,1323 @@
     <p:extLst>
       <p:ext uri="{BB962C8B-B14F-4D97-AF65-F5344CB8AC3E}">
         <p14:creationId xmlns:p14="http://schemas.microsoft.com/office/powerpoint/2010/main" val="624867750"/>
+      </p:ext>
+    </p:extLst>
+  </p:cSld>
+  <p:clrMapOvr>
+    <a:masterClrMapping/>
+  </p:clrMapOvr>
+</p:sld>
+</file>
+
+<file path=ppt/slides/slide2.xml><?xml version="1.0" encoding="utf-8"?>
+<p:sld xmlns:a="http://schemas.openxmlformats.org/drawingml/2006/main" xmlns:r="http://schemas.openxmlformats.org/officeDocument/2006/relationships" xmlns:p="http://schemas.openxmlformats.org/presentationml/2006/main">
+  <p:cSld>
+    <p:bg>
+      <p:bgPr>
+        <a:solidFill>
+          <a:schemeClr val="bg1"/>
+        </a:solidFill>
+        <a:effectLst/>
+      </p:bgPr>
+    </p:bg>
+    <p:spTree>
+      <p:nvGrpSpPr>
+        <p:cNvPr id="1" name=""/>
+        <p:cNvGrpSpPr/>
+        <p:nvPr/>
+      </p:nvGrpSpPr>
+      <p:grpSpPr>
+        <a:xfrm>
+          <a:off x="0" y="0"/>
+          <a:ext cx="0" cy="0"/>
+          <a:chOff x="0" y="0"/>
+          <a:chExt cx="0" cy="0"/>
+        </a:xfrm>
+      </p:grpSpPr>
+      <p:sp>
+        <p:nvSpPr>
+          <p:cNvPr id="13" name="Rectangle 7">
+            <a:extLst>
+              <a:ext uri="{FF2B5EF4-FFF2-40B4-BE49-F238E27FC236}">
+                <a16:creationId xmlns:a16="http://schemas.microsoft.com/office/drawing/2014/main" id="{88294908-8B00-4F58-BBBA-20F71A40AA9E}"/>
+              </a:ext>
+              <a:ext uri="{C183D7F6-B498-43B3-948B-1728B52AA6E4}">
+                <adec:decorative xmlns:adec="http://schemas.microsoft.com/office/drawing/2017/decorative" val="1"/>
+              </a:ext>
+            </a:extLst>
+          </p:cNvPr>
+          <p:cNvSpPr>
+            <a:spLocks noGrp="1" noRot="1" noChangeAspect="1" noMove="1" noResize="1" noEditPoints="1" noAdjustHandles="1" noChangeArrowheads="1" noChangeShapeType="1" noTextEdit="1"/>
+          </p:cNvSpPr>
+          <p:nvPr>
+            <p:extLst>
+              <p:ext uri="{386F3935-93C4-4BCD-93E2-E3B085C9AB24}">
+                <p16:designElem xmlns:p16="http://schemas.microsoft.com/office/powerpoint/2015/main" val="1"/>
+              </p:ext>
+            </p:extLst>
+          </p:nvPr>
+        </p:nvSpPr>
+        <p:spPr>
+          <a:xfrm>
+            <a:off x="0" y="0"/>
+            <a:ext cx="12192000" cy="6858000"/>
+          </a:xfrm>
+          <a:prstGeom prst="rect">
+            <a:avLst/>
+          </a:prstGeom>
+          <a:solidFill>
+            <a:schemeClr val="bg2"/>
+          </a:solidFill>
+          <a:ln>
+            <a:noFill/>
+          </a:ln>
+        </p:spPr>
+        <p:style>
+          <a:lnRef idx="2">
+            <a:schemeClr val="accent1">
+              <a:shade val="50000"/>
+            </a:schemeClr>
+          </a:lnRef>
+          <a:fillRef idx="1">
+            <a:schemeClr val="accent1"/>
+          </a:fillRef>
+          <a:effectRef idx="0">
+            <a:schemeClr val="accent1"/>
+          </a:effectRef>
+          <a:fontRef idx="minor">
+            <a:schemeClr val="lt1"/>
+          </a:fontRef>
+        </p:style>
+        <p:txBody>
+          <a:bodyPr rtlCol="0" anchor="ctr"/>
+          <a:lstStyle/>
+          <a:p>
+            <a:pPr algn="ctr"/>
+            <a:endParaRPr lang="en-US" dirty="0"/>
+          </a:p>
+        </p:txBody>
+      </p:sp>
+      <p:sp>
+        <p:nvSpPr>
+          <p:cNvPr id="15" name="Freeform: Shape 9">
+            <a:extLst>
+              <a:ext uri="{FF2B5EF4-FFF2-40B4-BE49-F238E27FC236}">
+                <a16:creationId xmlns:a16="http://schemas.microsoft.com/office/drawing/2014/main" id="{4364C879-1404-4203-8E9D-CC5DE0A621A2}"/>
+              </a:ext>
+              <a:ext uri="{C183D7F6-B498-43B3-948B-1728B52AA6E4}">
+                <adec:decorative xmlns:adec="http://schemas.microsoft.com/office/drawing/2017/decorative" val="1"/>
+              </a:ext>
+            </a:extLst>
+          </p:cNvPr>
+          <p:cNvSpPr>
+            <a:spLocks noGrp="1" noRot="1" noChangeAspect="1" noMove="1" noResize="1" noEditPoints="1" noAdjustHandles="1" noChangeArrowheads="1" noChangeShapeType="1" noTextEdit="1"/>
+          </p:cNvSpPr>
+          <p:nvPr>
+            <p:extLst>
+              <p:ext uri="{386F3935-93C4-4BCD-93E2-E3B085C9AB24}">
+                <p16:designElem xmlns:p16="http://schemas.microsoft.com/office/powerpoint/2015/main" val="1"/>
+              </p:ext>
+            </p:extLst>
+          </p:nvPr>
+        </p:nvSpPr>
+        <p:spPr>
+          <a:xfrm rot="2700000">
+            <a:off x="82782" y="-1386168"/>
+            <a:ext cx="2424873" cy="3611191"/>
+          </a:xfrm>
+          <a:custGeom>
+            <a:avLst/>
+            <a:gdLst>
+              <a:gd name="connsiteX0" fmla="*/ 0 w 2424873"/>
+              <a:gd name="connsiteY0" fmla="*/ 2424874 h 3611191"/>
+              <a:gd name="connsiteX1" fmla="*/ 2424873 w 2424873"/>
+              <a:gd name="connsiteY1" fmla="*/ 0 h 3611191"/>
+              <a:gd name="connsiteX2" fmla="*/ 2424873 w 2424873"/>
+              <a:gd name="connsiteY2" fmla="*/ 3611191 h 3611191"/>
+              <a:gd name="connsiteX3" fmla="*/ 1186317 w 2424873"/>
+              <a:gd name="connsiteY3" fmla="*/ 3611191 h 3611191"/>
+            </a:gdLst>
+            <a:ahLst/>
+            <a:cxnLst>
+              <a:cxn ang="0">
+                <a:pos x="connsiteX0" y="connsiteY0"/>
+              </a:cxn>
+              <a:cxn ang="0">
+                <a:pos x="connsiteX1" y="connsiteY1"/>
+              </a:cxn>
+              <a:cxn ang="0">
+                <a:pos x="connsiteX2" y="connsiteY2"/>
+              </a:cxn>
+              <a:cxn ang="0">
+                <a:pos x="connsiteX3" y="connsiteY3"/>
+              </a:cxn>
+            </a:cxnLst>
+            <a:rect l="l" t="t" r="r" b="b"/>
+            <a:pathLst>
+              <a:path w="2424873" h="3611191">
+                <a:moveTo>
+                  <a:pt x="0" y="2424874"/>
+                </a:moveTo>
+                <a:lnTo>
+                  <a:pt x="2424873" y="0"/>
+                </a:lnTo>
+                <a:lnTo>
+                  <a:pt x="2424873" y="3611191"/>
+                </a:lnTo>
+                <a:lnTo>
+                  <a:pt x="1186317" y="3611191"/>
+                </a:lnTo>
+                <a:close/>
+              </a:path>
+            </a:pathLst>
+          </a:custGeom>
+          <a:solidFill>
+            <a:schemeClr val="accent4">
+              <a:alpha val="40000"/>
+            </a:schemeClr>
+          </a:solidFill>
+          <a:ln>
+            <a:noFill/>
+          </a:ln>
+        </p:spPr>
+        <p:style>
+          <a:lnRef idx="2">
+            <a:schemeClr val="accent1">
+              <a:shade val="50000"/>
+            </a:schemeClr>
+          </a:lnRef>
+          <a:fillRef idx="1">
+            <a:schemeClr val="accent1"/>
+          </a:fillRef>
+          <a:effectRef idx="0">
+            <a:schemeClr val="accent1"/>
+          </a:effectRef>
+          <a:fontRef idx="minor">
+            <a:schemeClr val="lt1"/>
+          </a:fontRef>
+        </p:style>
+        <p:txBody>
+          <a:bodyPr wrap="square" rtlCol="0" anchor="ctr">
+            <a:noAutofit/>
+          </a:bodyPr>
+          <a:lstStyle/>
+          <a:p>
+            <a:pPr algn="ctr"/>
+            <a:endParaRPr lang="en-US"/>
+          </a:p>
+        </p:txBody>
+      </p:sp>
+      <p:sp>
+        <p:nvSpPr>
+          <p:cNvPr id="12" name="Freeform: Shape 11">
+            <a:extLst>
+              <a:ext uri="{FF2B5EF4-FFF2-40B4-BE49-F238E27FC236}">
+                <a16:creationId xmlns:a16="http://schemas.microsoft.com/office/drawing/2014/main" id="{84617302-4B0D-4351-A6BB-6F0930D943AC}"/>
+              </a:ext>
+              <a:ext uri="{C183D7F6-B498-43B3-948B-1728B52AA6E4}">
+                <adec:decorative xmlns:adec="http://schemas.microsoft.com/office/drawing/2017/decorative" val="1"/>
+              </a:ext>
+            </a:extLst>
+          </p:cNvPr>
+          <p:cNvSpPr>
+            <a:spLocks noGrp="1" noRot="1" noChangeAspect="1" noMove="1" noResize="1" noEditPoints="1" noAdjustHandles="1" noChangeArrowheads="1" noChangeShapeType="1" noTextEdit="1"/>
+          </p:cNvSpPr>
+          <p:nvPr>
+            <p:extLst>
+              <p:ext uri="{386F3935-93C4-4BCD-93E2-E3B085C9AB24}">
+                <p16:designElem xmlns:p16="http://schemas.microsoft.com/office/powerpoint/2015/main" val="1"/>
+              </p:ext>
+            </p:extLst>
+          </p:nvPr>
+        </p:nvSpPr>
+        <p:spPr>
+          <a:xfrm rot="2700000">
+            <a:off x="1571000" y="-338582"/>
+            <a:ext cx="1635955" cy="1635955"/>
+          </a:xfrm>
+          <a:custGeom>
+            <a:avLst/>
+            <a:gdLst>
+              <a:gd name="connsiteX0" fmla="*/ 0 w 1635955"/>
+              <a:gd name="connsiteY0" fmla="*/ 957987 h 1635955"/>
+              <a:gd name="connsiteX1" fmla="*/ 957987 w 1635955"/>
+              <a:gd name="connsiteY1" fmla="*/ 0 h 1635955"/>
+              <a:gd name="connsiteX2" fmla="*/ 1635955 w 1635955"/>
+              <a:gd name="connsiteY2" fmla="*/ 0 h 1635955"/>
+              <a:gd name="connsiteX3" fmla="*/ 1635955 w 1635955"/>
+              <a:gd name="connsiteY3" fmla="*/ 1635955 h 1635955"/>
+              <a:gd name="connsiteX4" fmla="*/ 0 w 1635955"/>
+              <a:gd name="connsiteY4" fmla="*/ 1635955 h 1635955"/>
+            </a:gdLst>
+            <a:ahLst/>
+            <a:cxnLst>
+              <a:cxn ang="0">
+                <a:pos x="connsiteX0" y="connsiteY0"/>
+              </a:cxn>
+              <a:cxn ang="0">
+                <a:pos x="connsiteX1" y="connsiteY1"/>
+              </a:cxn>
+              <a:cxn ang="0">
+                <a:pos x="connsiteX2" y="connsiteY2"/>
+              </a:cxn>
+              <a:cxn ang="0">
+                <a:pos x="connsiteX3" y="connsiteY3"/>
+              </a:cxn>
+              <a:cxn ang="0">
+                <a:pos x="connsiteX4" y="connsiteY4"/>
+              </a:cxn>
+            </a:cxnLst>
+            <a:rect l="l" t="t" r="r" b="b"/>
+            <a:pathLst>
+              <a:path w="1635955" h="1635955">
+                <a:moveTo>
+                  <a:pt x="0" y="957987"/>
+                </a:moveTo>
+                <a:lnTo>
+                  <a:pt x="957987" y="0"/>
+                </a:lnTo>
+                <a:lnTo>
+                  <a:pt x="1635955" y="0"/>
+                </a:lnTo>
+                <a:lnTo>
+                  <a:pt x="1635955" y="1635955"/>
+                </a:lnTo>
+                <a:lnTo>
+                  <a:pt x="0" y="1635955"/>
+                </a:lnTo>
+                <a:close/>
+              </a:path>
+            </a:pathLst>
+          </a:custGeom>
+          <a:solidFill>
+            <a:schemeClr val="accent4">
+              <a:alpha val="40000"/>
+            </a:schemeClr>
+          </a:solidFill>
+          <a:ln>
+            <a:noFill/>
+          </a:ln>
+        </p:spPr>
+        <p:style>
+          <a:lnRef idx="2">
+            <a:schemeClr val="accent1">
+              <a:shade val="50000"/>
+            </a:schemeClr>
+          </a:lnRef>
+          <a:fillRef idx="1">
+            <a:schemeClr val="accent1"/>
+          </a:fillRef>
+          <a:effectRef idx="0">
+            <a:schemeClr val="accent1"/>
+          </a:effectRef>
+          <a:fontRef idx="minor">
+            <a:schemeClr val="lt1"/>
+          </a:fontRef>
+        </p:style>
+        <p:txBody>
+          <a:bodyPr wrap="square" rtlCol="0" anchor="ctr">
+            <a:noAutofit/>
+          </a:bodyPr>
+          <a:lstStyle/>
+          <a:p>
+            <a:pPr algn="ctr"/>
+            <a:endParaRPr lang="en-US"/>
+          </a:p>
+        </p:txBody>
+      </p:sp>
+      <p:sp>
+        <p:nvSpPr>
+          <p:cNvPr id="14" name="Freeform: Shape 13">
+            <a:extLst>
+              <a:ext uri="{FF2B5EF4-FFF2-40B4-BE49-F238E27FC236}">
+                <a16:creationId xmlns:a16="http://schemas.microsoft.com/office/drawing/2014/main" id="{DA2C7802-C2E0-4218-8F89-8DD7CCD2CD1C}"/>
+              </a:ext>
+              <a:ext uri="{C183D7F6-B498-43B3-948B-1728B52AA6E4}">
+                <adec:decorative xmlns:adec="http://schemas.microsoft.com/office/drawing/2017/decorative" val="1"/>
+              </a:ext>
+            </a:extLst>
+          </p:cNvPr>
+          <p:cNvSpPr>
+            <a:spLocks noGrp="1" noRot="1" noChangeAspect="1" noMove="1" noResize="1" noEditPoints="1" noAdjustHandles="1" noChangeArrowheads="1" noChangeShapeType="1" noTextEdit="1"/>
+          </p:cNvSpPr>
+          <p:nvPr>
+            <p:extLst>
+              <p:ext uri="{386F3935-93C4-4BCD-93E2-E3B085C9AB24}">
+                <p16:designElem xmlns:p16="http://schemas.microsoft.com/office/powerpoint/2015/main" val="1"/>
+              </p:ext>
+            </p:extLst>
+          </p:nvPr>
+        </p:nvSpPr>
+        <p:spPr>
+          <a:xfrm rot="2700000">
+            <a:off x="9627985" y="-6588"/>
+            <a:ext cx="4059393" cy="2548110"/>
+          </a:xfrm>
+          <a:custGeom>
+            <a:avLst/>
+            <a:gdLst>
+              <a:gd name="connsiteX0" fmla="*/ 0 w 4059393"/>
+              <a:gd name="connsiteY0" fmla="*/ 1511282 h 2548110"/>
+              <a:gd name="connsiteX1" fmla="*/ 1511282 w 4059393"/>
+              <a:gd name="connsiteY1" fmla="*/ 0 h 2548110"/>
+              <a:gd name="connsiteX2" fmla="*/ 4059393 w 4059393"/>
+              <a:gd name="connsiteY2" fmla="*/ 2548110 h 2548110"/>
+              <a:gd name="connsiteX3" fmla="*/ 0 w 4059393"/>
+              <a:gd name="connsiteY3" fmla="*/ 2548110 h 2548110"/>
+            </a:gdLst>
+            <a:ahLst/>
+            <a:cxnLst>
+              <a:cxn ang="0">
+                <a:pos x="connsiteX0" y="connsiteY0"/>
+              </a:cxn>
+              <a:cxn ang="0">
+                <a:pos x="connsiteX1" y="connsiteY1"/>
+              </a:cxn>
+              <a:cxn ang="0">
+                <a:pos x="connsiteX2" y="connsiteY2"/>
+              </a:cxn>
+              <a:cxn ang="0">
+                <a:pos x="connsiteX3" y="connsiteY3"/>
+              </a:cxn>
+            </a:cxnLst>
+            <a:rect l="l" t="t" r="r" b="b"/>
+            <a:pathLst>
+              <a:path w="4059393" h="2548110">
+                <a:moveTo>
+                  <a:pt x="0" y="1511282"/>
+                </a:moveTo>
+                <a:lnTo>
+                  <a:pt x="1511282" y="0"/>
+                </a:lnTo>
+                <a:lnTo>
+                  <a:pt x="4059393" y="2548110"/>
+                </a:lnTo>
+                <a:lnTo>
+                  <a:pt x="0" y="2548110"/>
+                </a:lnTo>
+                <a:close/>
+              </a:path>
+            </a:pathLst>
+          </a:custGeom>
+          <a:solidFill>
+            <a:schemeClr val="accent1">
+              <a:alpha val="30000"/>
+            </a:schemeClr>
+          </a:solidFill>
+          <a:ln>
+            <a:noFill/>
+          </a:ln>
+        </p:spPr>
+        <p:style>
+          <a:lnRef idx="2">
+            <a:schemeClr val="accent1">
+              <a:shade val="50000"/>
+            </a:schemeClr>
+          </a:lnRef>
+          <a:fillRef idx="1">
+            <a:schemeClr val="accent1"/>
+          </a:fillRef>
+          <a:effectRef idx="0">
+            <a:schemeClr val="accent1"/>
+          </a:effectRef>
+          <a:fontRef idx="minor">
+            <a:schemeClr val="lt1"/>
+          </a:fontRef>
+        </p:style>
+        <p:txBody>
+          <a:bodyPr wrap="square" rtlCol="0" anchor="ctr">
+            <a:noAutofit/>
+          </a:bodyPr>
+          <a:lstStyle/>
+          <a:p>
+            <a:pPr algn="ctr"/>
+            <a:endParaRPr lang="en-US"/>
+          </a:p>
+        </p:txBody>
+      </p:sp>
+      <p:sp>
+        <p:nvSpPr>
+          <p:cNvPr id="16" name="Rectangle 15">
+            <a:extLst>
+              <a:ext uri="{FF2B5EF4-FFF2-40B4-BE49-F238E27FC236}">
+                <a16:creationId xmlns:a16="http://schemas.microsoft.com/office/drawing/2014/main" id="{A6D7111A-21E5-4EE9-8A78-10E5530F0116}"/>
+              </a:ext>
+              <a:ext uri="{C183D7F6-B498-43B3-948B-1728B52AA6E4}">
+                <adec:decorative xmlns:adec="http://schemas.microsoft.com/office/drawing/2017/decorative" val="1"/>
+              </a:ext>
+            </a:extLst>
+          </p:cNvPr>
+          <p:cNvSpPr>
+            <a:spLocks noGrp="1" noRot="1" noChangeAspect="1" noMove="1" noResize="1" noEditPoints="1" noAdjustHandles="1" noChangeArrowheads="1" noChangeShapeType="1" noTextEdit="1"/>
+          </p:cNvSpPr>
+          <p:nvPr>
+            <p:extLst>
+              <p:ext uri="{386F3935-93C4-4BCD-93E2-E3B085C9AB24}">
+                <p16:designElem xmlns:p16="http://schemas.microsoft.com/office/powerpoint/2015/main" val="1"/>
+              </p:ext>
+            </p:extLst>
+          </p:nvPr>
+        </p:nvSpPr>
+        <p:spPr>
+          <a:xfrm rot="2700000">
+            <a:off x="10262924" y="1465780"/>
+            <a:ext cx="1185708" cy="1185708"/>
+          </a:xfrm>
+          <a:prstGeom prst="rect">
+            <a:avLst/>
+          </a:prstGeom>
+          <a:solidFill>
+            <a:schemeClr val="accent1">
+              <a:alpha val="30000"/>
+            </a:schemeClr>
+          </a:solidFill>
+          <a:ln>
+            <a:noFill/>
+          </a:ln>
+        </p:spPr>
+        <p:style>
+          <a:lnRef idx="2">
+            <a:schemeClr val="accent1">
+              <a:shade val="50000"/>
+            </a:schemeClr>
+          </a:lnRef>
+          <a:fillRef idx="1">
+            <a:schemeClr val="accent1"/>
+          </a:fillRef>
+          <a:effectRef idx="0">
+            <a:schemeClr val="accent1"/>
+          </a:effectRef>
+          <a:fontRef idx="minor">
+            <a:schemeClr val="lt1"/>
+          </a:fontRef>
+        </p:style>
+        <p:txBody>
+          <a:bodyPr wrap="square" rtlCol="0" anchor="ctr">
+            <a:noAutofit/>
+          </a:bodyPr>
+          <a:lstStyle/>
+          <a:p>
+            <a:pPr algn="ctr"/>
+            <a:endParaRPr lang="en-US"/>
+          </a:p>
+        </p:txBody>
+      </p:sp>
+      <p:sp>
+        <p:nvSpPr>
+          <p:cNvPr id="18" name="Freeform: Shape 17">
+            <a:extLst>
+              <a:ext uri="{FF2B5EF4-FFF2-40B4-BE49-F238E27FC236}">
+                <a16:creationId xmlns:a16="http://schemas.microsoft.com/office/drawing/2014/main" id="{A3969E80-A77B-49FC-9122-D89AFD5EE118}"/>
+              </a:ext>
+              <a:ext uri="{C183D7F6-B498-43B3-948B-1728B52AA6E4}">
+                <adec:decorative xmlns:adec="http://schemas.microsoft.com/office/drawing/2017/decorative" val="1"/>
+              </a:ext>
+            </a:extLst>
+          </p:cNvPr>
+          <p:cNvSpPr>
+            <a:spLocks noGrp="1" noRot="1" noChangeAspect="1" noMove="1" noResize="1" noEditPoints="1" noAdjustHandles="1" noChangeArrowheads="1" noChangeShapeType="1" noTextEdit="1"/>
+          </p:cNvSpPr>
+          <p:nvPr>
+            <p:extLst>
+              <p:ext uri="{386F3935-93C4-4BCD-93E2-E3B085C9AB24}">
+                <p16:designElem xmlns:p16="http://schemas.microsoft.com/office/powerpoint/2015/main" val="1"/>
+              </p:ext>
+            </p:extLst>
+          </p:nvPr>
+        </p:nvSpPr>
+        <p:spPr>
+          <a:xfrm rot="2700000">
+            <a:off x="-29557" y="5198743"/>
+            <a:ext cx="2444907" cy="2366116"/>
+          </a:xfrm>
+          <a:custGeom>
+            <a:avLst/>
+            <a:gdLst>
+              <a:gd name="connsiteX0" fmla="*/ 0 w 2203753"/>
+              <a:gd name="connsiteY0" fmla="*/ 0 h 2132734"/>
+              <a:gd name="connsiteX1" fmla="*/ 2203753 w 2203753"/>
+              <a:gd name="connsiteY1" fmla="*/ 0 h 2132734"/>
+              <a:gd name="connsiteX2" fmla="*/ 2203753 w 2203753"/>
+              <a:gd name="connsiteY2" fmla="*/ 576461 h 2132734"/>
+              <a:gd name="connsiteX3" fmla="*/ 647480 w 2203753"/>
+              <a:gd name="connsiteY3" fmla="*/ 2132734 h 2132734"/>
+              <a:gd name="connsiteX4" fmla="*/ 0 w 2203753"/>
+              <a:gd name="connsiteY4" fmla="*/ 1485255 h 2132734"/>
+            </a:gdLst>
+            <a:ahLst/>
+            <a:cxnLst>
+              <a:cxn ang="0">
+                <a:pos x="connsiteX0" y="connsiteY0"/>
+              </a:cxn>
+              <a:cxn ang="0">
+                <a:pos x="connsiteX1" y="connsiteY1"/>
+              </a:cxn>
+              <a:cxn ang="0">
+                <a:pos x="connsiteX2" y="connsiteY2"/>
+              </a:cxn>
+              <a:cxn ang="0">
+                <a:pos x="connsiteX3" y="connsiteY3"/>
+              </a:cxn>
+              <a:cxn ang="0">
+                <a:pos x="connsiteX4" y="connsiteY4"/>
+              </a:cxn>
+            </a:cxnLst>
+            <a:rect l="l" t="t" r="r" b="b"/>
+            <a:pathLst>
+              <a:path w="2203753" h="2132734">
+                <a:moveTo>
+                  <a:pt x="0" y="0"/>
+                </a:moveTo>
+                <a:lnTo>
+                  <a:pt x="2203753" y="0"/>
+                </a:lnTo>
+                <a:lnTo>
+                  <a:pt x="2203753" y="576461"/>
+                </a:lnTo>
+                <a:lnTo>
+                  <a:pt x="647480" y="2132734"/>
+                </a:lnTo>
+                <a:lnTo>
+                  <a:pt x="0" y="1485255"/>
+                </a:lnTo>
+                <a:close/>
+              </a:path>
+            </a:pathLst>
+          </a:custGeom>
+          <a:solidFill>
+            <a:schemeClr val="accent1">
+              <a:alpha val="30000"/>
+            </a:schemeClr>
+          </a:solidFill>
+          <a:ln>
+            <a:noFill/>
+          </a:ln>
+        </p:spPr>
+        <p:style>
+          <a:lnRef idx="2">
+            <a:schemeClr val="accent1">
+              <a:shade val="50000"/>
+            </a:schemeClr>
+          </a:lnRef>
+          <a:fillRef idx="1">
+            <a:schemeClr val="accent1"/>
+          </a:fillRef>
+          <a:effectRef idx="0">
+            <a:schemeClr val="accent1"/>
+          </a:effectRef>
+          <a:fontRef idx="minor">
+            <a:schemeClr val="lt1"/>
+          </a:fontRef>
+        </p:style>
+        <p:txBody>
+          <a:bodyPr wrap="square" rtlCol="0" anchor="ctr">
+            <a:noAutofit/>
+          </a:bodyPr>
+          <a:lstStyle/>
+          <a:p>
+            <a:pPr algn="ctr"/>
+            <a:endParaRPr lang="en-US"/>
+          </a:p>
+        </p:txBody>
+      </p:sp>
+      <p:sp>
+        <p:nvSpPr>
+          <p:cNvPr id="20" name="Rectangle 19">
+            <a:extLst>
+              <a:ext uri="{FF2B5EF4-FFF2-40B4-BE49-F238E27FC236}">
+                <a16:creationId xmlns:a16="http://schemas.microsoft.com/office/drawing/2014/main" id="{1849CA57-76BD-4CF2-80BA-D7A46A01B7B1}"/>
+              </a:ext>
+              <a:ext uri="{C183D7F6-B498-43B3-948B-1728B52AA6E4}">
+                <adec:decorative xmlns:adec="http://schemas.microsoft.com/office/drawing/2017/decorative" val="1"/>
+              </a:ext>
+            </a:extLst>
+          </p:cNvPr>
+          <p:cNvSpPr>
+            <a:spLocks noGrp="1" noRot="1" noChangeAspect="1" noMove="1" noResize="1" noEditPoints="1" noAdjustHandles="1" noChangeArrowheads="1" noChangeShapeType="1" noTextEdit="1"/>
+          </p:cNvSpPr>
+          <p:nvPr>
+            <p:extLst>
+              <p:ext uri="{386F3935-93C4-4BCD-93E2-E3B085C9AB24}">
+                <p16:designElem xmlns:p16="http://schemas.microsoft.com/office/powerpoint/2015/main" val="1"/>
+              </p:ext>
+            </p:extLst>
+          </p:nvPr>
+        </p:nvSpPr>
+        <p:spPr>
+          <a:xfrm rot="2700000">
+            <a:off x="1769787" y="5439893"/>
+            <a:ext cx="928467" cy="928467"/>
+          </a:xfrm>
+          <a:prstGeom prst="rect">
+            <a:avLst/>
+          </a:prstGeom>
+          <a:solidFill>
+            <a:schemeClr val="accent1">
+              <a:alpha val="30000"/>
+            </a:schemeClr>
+          </a:solidFill>
+          <a:ln>
+            <a:noFill/>
+          </a:ln>
+        </p:spPr>
+        <p:style>
+          <a:lnRef idx="2">
+            <a:schemeClr val="accent1">
+              <a:shade val="50000"/>
+            </a:schemeClr>
+          </a:lnRef>
+          <a:fillRef idx="1">
+            <a:schemeClr val="accent1"/>
+          </a:fillRef>
+          <a:effectRef idx="0">
+            <a:schemeClr val="accent1"/>
+          </a:effectRef>
+          <a:fontRef idx="minor">
+            <a:schemeClr val="lt1"/>
+          </a:fontRef>
+        </p:style>
+        <p:txBody>
+          <a:bodyPr wrap="square" rtlCol="0" anchor="ctr">
+            <a:noAutofit/>
+          </a:bodyPr>
+          <a:lstStyle/>
+          <a:p>
+            <a:pPr algn="ctr"/>
+            <a:endParaRPr lang="en-US">
+              <a:solidFill>
+                <a:srgbClr val="FFFFFF"/>
+              </a:solidFill>
+              <a:effectLst>
+                <a:outerShdw blurRad="38100" dist="38100" dir="2700000" algn="tl">
+                  <a:srgbClr val="000000">
+                    <a:alpha val="43137"/>
+                  </a:srgbClr>
+                </a:outerShdw>
+              </a:effectLst>
+            </a:endParaRPr>
+          </a:p>
+        </p:txBody>
+      </p:sp>
+      <p:sp>
+        <p:nvSpPr>
+          <p:cNvPr id="22" name="Freeform: Shape 21">
+            <a:extLst>
+              <a:ext uri="{FF2B5EF4-FFF2-40B4-BE49-F238E27FC236}">
+                <a16:creationId xmlns:a16="http://schemas.microsoft.com/office/drawing/2014/main" id="{35E9085E-E730-4768-83D4-6CB7E9897153}"/>
+              </a:ext>
+              <a:ext uri="{C183D7F6-B498-43B3-948B-1728B52AA6E4}">
+                <adec:decorative xmlns:adec="http://schemas.microsoft.com/office/drawing/2017/decorative" val="1"/>
+              </a:ext>
+            </a:extLst>
+          </p:cNvPr>
+          <p:cNvSpPr>
+            <a:spLocks noGrp="1" noRot="1" noChangeAspect="1" noMove="1" noResize="1" noEditPoints="1" noAdjustHandles="1" noChangeArrowheads="1" noChangeShapeType="1" noTextEdit="1"/>
+          </p:cNvSpPr>
+          <p:nvPr>
+            <p:extLst>
+              <p:ext uri="{386F3935-93C4-4BCD-93E2-E3B085C9AB24}">
+                <p16:designElem xmlns:p16="http://schemas.microsoft.com/office/powerpoint/2015/main" val="1"/>
+              </p:ext>
+            </p:extLst>
+          </p:nvPr>
+        </p:nvSpPr>
+        <p:spPr>
+          <a:xfrm rot="2700000">
+            <a:off x="3401311" y="734311"/>
+            <a:ext cx="5389379" cy="5389379"/>
+          </a:xfrm>
+          <a:custGeom>
+            <a:avLst/>
+            <a:gdLst>
+              <a:gd name="connsiteX0" fmla="*/ 0 w 5389379"/>
+              <a:gd name="connsiteY0" fmla="*/ 540040 h 5389379"/>
+              <a:gd name="connsiteX1" fmla="*/ 540040 w 5389379"/>
+              <a:gd name="connsiteY1" fmla="*/ 0 h 5389379"/>
+              <a:gd name="connsiteX2" fmla="*/ 5389379 w 5389379"/>
+              <a:gd name="connsiteY2" fmla="*/ 0 h 5389379"/>
+              <a:gd name="connsiteX3" fmla="*/ 5389379 w 5389379"/>
+              <a:gd name="connsiteY3" fmla="*/ 4838655 h 5389379"/>
+              <a:gd name="connsiteX4" fmla="*/ 4838655 w 5389379"/>
+              <a:gd name="connsiteY4" fmla="*/ 5389379 h 5389379"/>
+              <a:gd name="connsiteX5" fmla="*/ 0 w 5389379"/>
+              <a:gd name="connsiteY5" fmla="*/ 5389379 h 5389379"/>
+            </a:gdLst>
+            <a:ahLst/>
+            <a:cxnLst>
+              <a:cxn ang="0">
+                <a:pos x="connsiteX0" y="connsiteY0"/>
+              </a:cxn>
+              <a:cxn ang="0">
+                <a:pos x="connsiteX1" y="connsiteY1"/>
+              </a:cxn>
+              <a:cxn ang="0">
+                <a:pos x="connsiteX2" y="connsiteY2"/>
+              </a:cxn>
+              <a:cxn ang="0">
+                <a:pos x="connsiteX3" y="connsiteY3"/>
+              </a:cxn>
+              <a:cxn ang="0">
+                <a:pos x="connsiteX4" y="connsiteY4"/>
+              </a:cxn>
+              <a:cxn ang="0">
+                <a:pos x="connsiteX5" y="connsiteY5"/>
+              </a:cxn>
+            </a:cxnLst>
+            <a:rect l="l" t="t" r="r" b="b"/>
+            <a:pathLst>
+              <a:path w="5389379" h="5389379">
+                <a:moveTo>
+                  <a:pt x="0" y="540040"/>
+                </a:moveTo>
+                <a:lnTo>
+                  <a:pt x="540040" y="0"/>
+                </a:lnTo>
+                <a:lnTo>
+                  <a:pt x="5389379" y="0"/>
+                </a:lnTo>
+                <a:lnTo>
+                  <a:pt x="5389379" y="4838655"/>
+                </a:lnTo>
+                <a:lnTo>
+                  <a:pt x="4838655" y="5389379"/>
+                </a:lnTo>
+                <a:lnTo>
+                  <a:pt x="0" y="5389379"/>
+                </a:lnTo>
+                <a:close/>
+              </a:path>
+            </a:pathLst>
+          </a:custGeom>
+          <a:solidFill>
+            <a:srgbClr val="FFFFFF"/>
+          </a:solidFill>
+          <a:ln>
+            <a:noFill/>
+          </a:ln>
+        </p:spPr>
+        <p:style>
+          <a:lnRef idx="2">
+            <a:schemeClr val="accent1">
+              <a:shade val="50000"/>
+            </a:schemeClr>
+          </a:lnRef>
+          <a:fillRef idx="1">
+            <a:schemeClr val="accent1"/>
+          </a:fillRef>
+          <a:effectRef idx="0">
+            <a:schemeClr val="accent1"/>
+          </a:effectRef>
+          <a:fontRef idx="minor">
+            <a:schemeClr val="lt1"/>
+          </a:fontRef>
+        </p:style>
+        <p:txBody>
+          <a:bodyPr wrap="square" rtlCol="0" anchor="ctr">
+            <a:noAutofit/>
+          </a:bodyPr>
+          <a:lstStyle/>
+          <a:p>
+            <a:pPr algn="ctr"/>
+            <a:endParaRPr lang="en-US"/>
+          </a:p>
+        </p:txBody>
+      </p:sp>
+      <p:sp>
+        <p:nvSpPr>
+          <p:cNvPr id="24" name="Freeform: Shape 23">
+            <a:extLst>
+              <a:ext uri="{FF2B5EF4-FFF2-40B4-BE49-F238E27FC236}">
+                <a16:creationId xmlns:a16="http://schemas.microsoft.com/office/drawing/2014/main" id="{973272FE-A474-4CAE-8CA2-BCC8B476C3F4}"/>
+              </a:ext>
+              <a:ext uri="{C183D7F6-B498-43B3-948B-1728B52AA6E4}">
+                <adec:decorative xmlns:adec="http://schemas.microsoft.com/office/drawing/2017/decorative" val="1"/>
+              </a:ext>
+            </a:extLst>
+          </p:cNvPr>
+          <p:cNvSpPr>
+            <a:spLocks noGrp="1" noRot="1" noChangeAspect="1" noMove="1" noResize="1" noEditPoints="1" noAdjustHandles="1" noChangeArrowheads="1" noChangeShapeType="1" noTextEdit="1"/>
+          </p:cNvSpPr>
+          <p:nvPr>
+            <p:extLst>
+              <p:ext uri="{386F3935-93C4-4BCD-93E2-E3B085C9AB24}">
+                <p16:designElem xmlns:p16="http://schemas.microsoft.com/office/powerpoint/2015/main" val="1"/>
+              </p:ext>
+            </p:extLst>
+          </p:nvPr>
+        </p:nvSpPr>
+        <p:spPr>
+          <a:xfrm rot="2700000">
+            <a:off x="2700283" y="33283"/>
+            <a:ext cx="6791435" cy="6791435"/>
+          </a:xfrm>
+          <a:custGeom>
+            <a:avLst/>
+            <a:gdLst>
+              <a:gd name="connsiteX0" fmla="*/ 1860938 w 6791435"/>
+              <a:gd name="connsiteY0" fmla="*/ 81158 h 6791435"/>
+              <a:gd name="connsiteX1" fmla="*/ 1942096 w 6791435"/>
+              <a:gd name="connsiteY1" fmla="*/ 0 h 6791435"/>
+              <a:gd name="connsiteX2" fmla="*/ 6791435 w 6791435"/>
+              <a:gd name="connsiteY2" fmla="*/ 0 h 6791435"/>
+              <a:gd name="connsiteX3" fmla="*/ 6791435 w 6791435"/>
+              <a:gd name="connsiteY3" fmla="*/ 4838655 h 6791435"/>
+              <a:gd name="connsiteX4" fmla="*/ 6710277 w 6791435"/>
+              <a:gd name="connsiteY4" fmla="*/ 4919813 h 6791435"/>
+              <a:gd name="connsiteX5" fmla="*/ 6710277 w 6791435"/>
+              <a:gd name="connsiteY5" fmla="*/ 81158 h 6791435"/>
+              <a:gd name="connsiteX6" fmla="*/ 0 w 6791435"/>
+              <a:gd name="connsiteY6" fmla="*/ 1942096 h 6791435"/>
+              <a:gd name="connsiteX7" fmla="*/ 81158 w 6791435"/>
+              <a:gd name="connsiteY7" fmla="*/ 1860938 h 6791435"/>
+              <a:gd name="connsiteX8" fmla="*/ 81158 w 6791435"/>
+              <a:gd name="connsiteY8" fmla="*/ 6710277 h 6791435"/>
+              <a:gd name="connsiteX9" fmla="*/ 4919813 w 6791435"/>
+              <a:gd name="connsiteY9" fmla="*/ 6710277 h 6791435"/>
+              <a:gd name="connsiteX10" fmla="*/ 4838655 w 6791435"/>
+              <a:gd name="connsiteY10" fmla="*/ 6791435 h 6791435"/>
+              <a:gd name="connsiteX11" fmla="*/ 0 w 6791435"/>
+              <a:gd name="connsiteY11" fmla="*/ 6791435 h 6791435"/>
+            </a:gdLst>
+            <a:ahLst/>
+            <a:cxnLst>
+              <a:cxn ang="0">
+                <a:pos x="connsiteX0" y="connsiteY0"/>
+              </a:cxn>
+              <a:cxn ang="0">
+                <a:pos x="connsiteX1" y="connsiteY1"/>
+              </a:cxn>
+              <a:cxn ang="0">
+                <a:pos x="connsiteX2" y="connsiteY2"/>
+              </a:cxn>
+              <a:cxn ang="0">
+                <a:pos x="connsiteX3" y="connsiteY3"/>
+              </a:cxn>
+              <a:cxn ang="0">
+                <a:pos x="connsiteX4" y="connsiteY4"/>
+              </a:cxn>
+              <a:cxn ang="0">
+                <a:pos x="connsiteX5" y="connsiteY5"/>
+              </a:cxn>
+              <a:cxn ang="0">
+                <a:pos x="connsiteX6" y="connsiteY6"/>
+              </a:cxn>
+              <a:cxn ang="0">
+                <a:pos x="connsiteX7" y="connsiteY7"/>
+              </a:cxn>
+              <a:cxn ang="0">
+                <a:pos x="connsiteX8" y="connsiteY8"/>
+              </a:cxn>
+              <a:cxn ang="0">
+                <a:pos x="connsiteX9" y="connsiteY9"/>
+              </a:cxn>
+              <a:cxn ang="0">
+                <a:pos x="connsiteX10" y="connsiteY10"/>
+              </a:cxn>
+              <a:cxn ang="0">
+                <a:pos x="connsiteX11" y="connsiteY11"/>
+              </a:cxn>
+            </a:cxnLst>
+            <a:rect l="l" t="t" r="r" b="b"/>
+            <a:pathLst>
+              <a:path w="6791435" h="6791435">
+                <a:moveTo>
+                  <a:pt x="1860938" y="81158"/>
+                </a:moveTo>
+                <a:lnTo>
+                  <a:pt x="1942096" y="0"/>
+                </a:lnTo>
+                <a:lnTo>
+                  <a:pt x="6791435" y="0"/>
+                </a:lnTo>
+                <a:lnTo>
+                  <a:pt x="6791435" y="4838655"/>
+                </a:lnTo>
+                <a:lnTo>
+                  <a:pt x="6710277" y="4919813"/>
+                </a:lnTo>
+                <a:lnTo>
+                  <a:pt x="6710277" y="81158"/>
+                </a:lnTo>
+                <a:close/>
+                <a:moveTo>
+                  <a:pt x="0" y="1942096"/>
+                </a:moveTo>
+                <a:lnTo>
+                  <a:pt x="81158" y="1860938"/>
+                </a:lnTo>
+                <a:lnTo>
+                  <a:pt x="81158" y="6710277"/>
+                </a:lnTo>
+                <a:lnTo>
+                  <a:pt x="4919813" y="6710277"/>
+                </a:lnTo>
+                <a:lnTo>
+                  <a:pt x="4838655" y="6791435"/>
+                </a:lnTo>
+                <a:lnTo>
+                  <a:pt x="0" y="6791435"/>
+                </a:lnTo>
+                <a:close/>
+              </a:path>
+            </a:pathLst>
+          </a:custGeom>
+          <a:solidFill>
+            <a:srgbClr val="FFFFFF">
+              <a:alpha val="60000"/>
+            </a:srgbClr>
+          </a:solidFill>
+          <a:ln>
+            <a:noFill/>
+          </a:ln>
+        </p:spPr>
+        <p:style>
+          <a:lnRef idx="2">
+            <a:schemeClr val="accent1">
+              <a:shade val="50000"/>
+            </a:schemeClr>
+          </a:lnRef>
+          <a:fillRef idx="1">
+            <a:schemeClr val="accent1"/>
+          </a:fillRef>
+          <a:effectRef idx="0">
+            <a:schemeClr val="accent1"/>
+          </a:effectRef>
+          <a:fontRef idx="minor">
+            <a:schemeClr val="lt1"/>
+          </a:fontRef>
+        </p:style>
+        <p:txBody>
+          <a:bodyPr wrap="square" rtlCol="0" anchor="ctr">
+            <a:noAutofit/>
+          </a:bodyPr>
+          <a:lstStyle/>
+          <a:p>
+            <a:pPr algn="ctr"/>
+            <a:endParaRPr lang="en-US">
+              <a:solidFill>
+                <a:schemeClr val="tx1"/>
+              </a:solidFill>
+            </a:endParaRPr>
+          </a:p>
+        </p:txBody>
+      </p:sp>
+      <p:sp>
+        <p:nvSpPr>
+          <p:cNvPr id="26" name="Freeform: Shape 25">
+            <a:extLst>
+              <a:ext uri="{FF2B5EF4-FFF2-40B4-BE49-F238E27FC236}">
+                <a16:creationId xmlns:a16="http://schemas.microsoft.com/office/drawing/2014/main" id="{E07981EA-05A6-437C-88D7-B377B92B031D}"/>
+              </a:ext>
+              <a:ext uri="{C183D7F6-B498-43B3-948B-1728B52AA6E4}">
+                <adec:decorative xmlns:adec="http://schemas.microsoft.com/office/drawing/2017/decorative" val="1"/>
+              </a:ext>
+            </a:extLst>
+          </p:cNvPr>
+          <p:cNvSpPr>
+            <a:spLocks noGrp="1" noRot="1" noChangeAspect="1" noMove="1" noResize="1" noEditPoints="1" noAdjustHandles="1" noChangeArrowheads="1" noChangeShapeType="1" noTextEdit="1"/>
+          </p:cNvSpPr>
+          <p:nvPr>
+            <p:extLst>
+              <p:ext uri="{386F3935-93C4-4BCD-93E2-E3B085C9AB24}">
+                <p16:designElem xmlns:p16="http://schemas.microsoft.com/office/powerpoint/2015/main" val="1"/>
+              </p:ext>
+            </p:extLst>
+          </p:nvPr>
+        </p:nvSpPr>
+        <p:spPr>
+          <a:xfrm rot="2700000">
+            <a:off x="9629823" y="5457591"/>
+            <a:ext cx="2231794" cy="2568811"/>
+          </a:xfrm>
+          <a:custGeom>
+            <a:avLst/>
+            <a:gdLst>
+              <a:gd name="connsiteX0" fmla="*/ 0 w 2940086"/>
+              <a:gd name="connsiteY0" fmla="*/ 0 h 3384061"/>
+              <a:gd name="connsiteX1" fmla="*/ 2496112 w 2940086"/>
+              <a:gd name="connsiteY1" fmla="*/ 0 h 3384061"/>
+              <a:gd name="connsiteX2" fmla="*/ 2940086 w 2940086"/>
+              <a:gd name="connsiteY2" fmla="*/ 443975 h 3384061"/>
+              <a:gd name="connsiteX3" fmla="*/ 0 w 2940086"/>
+              <a:gd name="connsiteY3" fmla="*/ 3384061 h 3384061"/>
+            </a:gdLst>
+            <a:ahLst/>
+            <a:cxnLst>
+              <a:cxn ang="0">
+                <a:pos x="connsiteX0" y="connsiteY0"/>
+              </a:cxn>
+              <a:cxn ang="0">
+                <a:pos x="connsiteX1" y="connsiteY1"/>
+              </a:cxn>
+              <a:cxn ang="0">
+                <a:pos x="connsiteX2" y="connsiteY2"/>
+              </a:cxn>
+              <a:cxn ang="0">
+                <a:pos x="connsiteX3" y="connsiteY3"/>
+              </a:cxn>
+            </a:cxnLst>
+            <a:rect l="l" t="t" r="r" b="b"/>
+            <a:pathLst>
+              <a:path w="2940086" h="3384061">
+                <a:moveTo>
+                  <a:pt x="0" y="0"/>
+                </a:moveTo>
+                <a:lnTo>
+                  <a:pt x="2496112" y="0"/>
+                </a:lnTo>
+                <a:lnTo>
+                  <a:pt x="2940086" y="443975"/>
+                </a:lnTo>
+                <a:lnTo>
+                  <a:pt x="0" y="3384061"/>
+                </a:lnTo>
+                <a:close/>
+              </a:path>
+            </a:pathLst>
+          </a:custGeom>
+          <a:solidFill>
+            <a:schemeClr val="accent4">
+              <a:alpha val="40000"/>
+            </a:schemeClr>
+          </a:solidFill>
+          <a:ln>
+            <a:noFill/>
+          </a:ln>
+        </p:spPr>
+        <p:style>
+          <a:lnRef idx="2">
+            <a:schemeClr val="accent1">
+              <a:shade val="50000"/>
+            </a:schemeClr>
+          </a:lnRef>
+          <a:fillRef idx="1">
+            <a:schemeClr val="accent1"/>
+          </a:fillRef>
+          <a:effectRef idx="0">
+            <a:schemeClr val="accent1"/>
+          </a:effectRef>
+          <a:fontRef idx="minor">
+            <a:schemeClr val="lt1"/>
+          </a:fontRef>
+        </p:style>
+        <p:txBody>
+          <a:bodyPr wrap="square" rtlCol="0" anchor="ctr">
+            <a:noAutofit/>
+          </a:bodyPr>
+          <a:lstStyle/>
+          <a:p>
+            <a:pPr algn="ctr"/>
+            <a:endParaRPr lang="en-US"/>
+          </a:p>
+        </p:txBody>
+      </p:sp>
+      <p:sp>
+        <p:nvSpPr>
+          <p:cNvPr id="28" name="Rectangle 27">
+            <a:extLst>
+              <a:ext uri="{FF2B5EF4-FFF2-40B4-BE49-F238E27FC236}">
+                <a16:creationId xmlns:a16="http://schemas.microsoft.com/office/drawing/2014/main" id="{15E3C750-986E-4769-B1AE-49289FBEE757}"/>
+              </a:ext>
+              <a:ext uri="{C183D7F6-B498-43B3-948B-1728B52AA6E4}">
+                <adec:decorative xmlns:adec="http://schemas.microsoft.com/office/drawing/2017/decorative" val="1"/>
+              </a:ext>
+            </a:extLst>
+          </p:cNvPr>
+          <p:cNvSpPr>
+            <a:spLocks noGrp="1" noRot="1" noChangeAspect="1" noMove="1" noResize="1" noEditPoints="1" noAdjustHandles="1" noChangeArrowheads="1" noChangeShapeType="1" noTextEdit="1"/>
+          </p:cNvSpPr>
+          <p:nvPr>
+            <p:extLst>
+              <p:ext uri="{386F3935-93C4-4BCD-93E2-E3B085C9AB24}">
+                <p16:designElem xmlns:p16="http://schemas.microsoft.com/office/powerpoint/2015/main" val="1"/>
+              </p:ext>
+            </p:extLst>
+          </p:nvPr>
+        </p:nvSpPr>
+        <p:spPr>
+          <a:xfrm rot="2700000">
+            <a:off x="9720059" y="5243545"/>
+            <a:ext cx="959985" cy="959985"/>
+          </a:xfrm>
+          <a:prstGeom prst="rect">
+            <a:avLst/>
+          </a:prstGeom>
+          <a:solidFill>
+            <a:schemeClr val="accent4">
+              <a:alpha val="40000"/>
+            </a:schemeClr>
+          </a:solidFill>
+          <a:ln>
+            <a:noFill/>
+          </a:ln>
+        </p:spPr>
+        <p:style>
+          <a:lnRef idx="2">
+            <a:schemeClr val="accent1">
+              <a:shade val="50000"/>
+            </a:schemeClr>
+          </a:lnRef>
+          <a:fillRef idx="1">
+            <a:schemeClr val="accent1"/>
+          </a:fillRef>
+          <a:effectRef idx="0">
+            <a:schemeClr val="accent1"/>
+          </a:effectRef>
+          <a:fontRef idx="minor">
+            <a:schemeClr val="lt1"/>
+          </a:fontRef>
+        </p:style>
+        <p:txBody>
+          <a:bodyPr wrap="square" rtlCol="0" anchor="ctr">
+            <a:noAutofit/>
+          </a:bodyPr>
+          <a:lstStyle/>
+          <a:p>
+            <a:pPr algn="ctr"/>
+            <a:endParaRPr lang="en-US"/>
+          </a:p>
+        </p:txBody>
+      </p:sp>
+      <p:sp>
+        <p:nvSpPr>
+          <p:cNvPr id="21" name="TextBox 20">
+            <a:extLst>
+              <a:ext uri="{FF2B5EF4-FFF2-40B4-BE49-F238E27FC236}">
+                <a16:creationId xmlns:a16="http://schemas.microsoft.com/office/drawing/2014/main" id="{DE8E782F-B94E-431C-879F-122A987CA618}"/>
+              </a:ext>
+            </a:extLst>
+          </p:cNvPr>
+          <p:cNvSpPr txBox="1"/>
+          <p:nvPr/>
+        </p:nvSpPr>
+        <p:spPr>
+          <a:xfrm>
+            <a:off x="1123693" y="538619"/>
+            <a:ext cx="9836125" cy="5262979"/>
+          </a:xfrm>
+          <a:prstGeom prst="rect">
+            <a:avLst/>
+          </a:prstGeom>
+          <a:noFill/>
+        </p:spPr>
+        <p:txBody>
+          <a:bodyPr wrap="square">
+            <a:spAutoFit/>
+          </a:bodyPr>
+          <a:lstStyle/>
+          <a:p>
+            <a:r>
+              <a:rPr lang="en-IN" sz="3600" b="1" u="sng" dirty="0">
+                <a:latin typeface="Times New Roman" panose="02020603050405020304" pitchFamily="18" charset="0"/>
+                <a:cs typeface="Times New Roman" panose="02020603050405020304" pitchFamily="18" charset="0"/>
+              </a:rPr>
+              <a:t>Getting and Creating Projects</a:t>
+            </a:r>
+          </a:p>
+          <a:p>
+            <a:endParaRPr lang="en-IN" sz="2400" dirty="0">
+              <a:latin typeface="Times New Roman" panose="02020603050405020304" pitchFamily="18" charset="0"/>
+              <a:cs typeface="Times New Roman" panose="02020603050405020304" pitchFamily="18" charset="0"/>
+            </a:endParaRPr>
+          </a:p>
+          <a:p>
+            <a:pPr marL="457200" indent="-457200">
+              <a:buFont typeface="Wingdings" panose="05000000000000000000" pitchFamily="2" charset="2"/>
+              <a:buChar char="q"/>
+            </a:pPr>
+            <a:endParaRPr lang="en-IN" sz="2800" u="sng" dirty="0">
+              <a:latin typeface="Times New Roman" panose="02020603050405020304" pitchFamily="18" charset="0"/>
+              <a:cs typeface="Times New Roman" panose="02020603050405020304" pitchFamily="18" charset="0"/>
+            </a:endParaRPr>
+          </a:p>
+          <a:p>
+            <a:pPr marL="457200" indent="-457200">
+              <a:buFont typeface="Wingdings" panose="05000000000000000000" pitchFamily="2" charset="2"/>
+              <a:buChar char="q"/>
+            </a:pPr>
+            <a:r>
+              <a:rPr lang="en-IN" sz="2800" u="sng" dirty="0" err="1">
+                <a:latin typeface="Times New Roman" panose="02020603050405020304" pitchFamily="18" charset="0"/>
+                <a:cs typeface="Times New Roman" panose="02020603050405020304" pitchFamily="18" charset="0"/>
+              </a:rPr>
+              <a:t>init</a:t>
+            </a:r>
+            <a:endParaRPr lang="en-IN" sz="2400" u="sng" dirty="0">
+              <a:latin typeface="Times New Roman" panose="02020603050405020304" pitchFamily="18" charset="0"/>
+              <a:cs typeface="Times New Roman" panose="02020603050405020304" pitchFamily="18" charset="0"/>
+            </a:endParaRPr>
+          </a:p>
+          <a:p>
+            <a:endParaRPr lang="en-IN" sz="2400" dirty="0">
+              <a:latin typeface="Times New Roman" panose="02020603050405020304" pitchFamily="18" charset="0"/>
+              <a:cs typeface="Times New Roman" panose="02020603050405020304" pitchFamily="18" charset="0"/>
+            </a:endParaRPr>
+          </a:p>
+          <a:p>
+            <a:r>
+              <a:rPr lang="en-IN" sz="2400" dirty="0">
+                <a:latin typeface="Times New Roman" panose="02020603050405020304" pitchFamily="18" charset="0"/>
+                <a:cs typeface="Times New Roman" panose="02020603050405020304" pitchFamily="18" charset="0"/>
+              </a:rPr>
+              <a:t>	Create an empty Git repository or reinitialize an existing one.</a:t>
+            </a:r>
+          </a:p>
+          <a:p>
+            <a:endParaRPr lang="en-IN" sz="2400" dirty="0">
+              <a:latin typeface="Times New Roman" panose="02020603050405020304" pitchFamily="18" charset="0"/>
+              <a:cs typeface="Times New Roman" panose="02020603050405020304" pitchFamily="18" charset="0"/>
+            </a:endParaRPr>
+          </a:p>
+          <a:p>
+            <a:r>
+              <a:rPr lang="en-IN" sz="2400" dirty="0">
+                <a:latin typeface="Times New Roman" panose="02020603050405020304" pitchFamily="18" charset="0"/>
+                <a:cs typeface="Times New Roman" panose="02020603050405020304" pitchFamily="18" charset="0"/>
+              </a:rPr>
+              <a:t>	This also creates a .git file which git uses to track all the changes. 	Deleting this will erase everything.</a:t>
+            </a:r>
+          </a:p>
+          <a:p>
+            <a:endParaRPr lang="en-IN" sz="2400" dirty="0">
+              <a:latin typeface="Times New Roman" panose="02020603050405020304" pitchFamily="18" charset="0"/>
+              <a:cs typeface="Times New Roman" panose="02020603050405020304" pitchFamily="18" charset="0"/>
+            </a:endParaRPr>
+          </a:p>
+          <a:p>
+            <a:pPr marL="457200" indent="-457200">
+              <a:buFont typeface="Wingdings" panose="05000000000000000000" pitchFamily="2" charset="2"/>
+              <a:buChar char="q"/>
+            </a:pPr>
+            <a:r>
+              <a:rPr lang="en-IN" sz="2800" u="sng" dirty="0">
+                <a:latin typeface="Times New Roman" panose="02020603050405020304" pitchFamily="18" charset="0"/>
+                <a:cs typeface="Times New Roman" panose="02020603050405020304" pitchFamily="18" charset="0"/>
+              </a:rPr>
+              <a:t>clone</a:t>
+            </a:r>
+          </a:p>
+          <a:p>
+            <a:endParaRPr lang="en-IN" sz="2400" dirty="0">
+              <a:latin typeface="Times New Roman" panose="02020603050405020304" pitchFamily="18" charset="0"/>
+              <a:cs typeface="Times New Roman" panose="02020603050405020304" pitchFamily="18" charset="0"/>
+            </a:endParaRPr>
+          </a:p>
+          <a:p>
+            <a:r>
+              <a:rPr lang="en-IN" sz="2400" dirty="0">
+                <a:latin typeface="Times New Roman" panose="02020603050405020304" pitchFamily="18" charset="0"/>
+                <a:cs typeface="Times New Roman" panose="02020603050405020304" pitchFamily="18" charset="0"/>
+              </a:rPr>
+              <a:t>	Clone a repository into a new directory</a:t>
+            </a:r>
+          </a:p>
+        </p:txBody>
+      </p:sp>
+    </p:spTree>
+    <p:extLst>
+      <p:ext uri="{BB962C8B-B14F-4D97-AF65-F5344CB8AC3E}">
+        <p14:creationId xmlns:p14="http://schemas.microsoft.com/office/powerpoint/2010/main" val="2279911678"/>
       </p:ext>
     </p:extLst>
   </p:cSld>

</xml_diff>

<commit_message>
Ppt Modified by Meenakshi Goyal 1472
</commit_message>
<xml_diff>
--- a/Revert.pptx
+++ b/Revert.pptx
@@ -7,6 +7,7 @@
   <p:sldIdLst>
     <p:sldId id="256" r:id="rId2"/>
     <p:sldId id="259" r:id="rId3"/>
+    <p:sldId id="260" r:id="rId4"/>
   </p:sldIdLst>
   <p:sldSz cx="12192000" cy="6858000"/>
   <p:notesSz cx="6858000" cy="9144000"/>
@@ -6205,6 +6206,1397 @@
 </p:sld>
 </file>
 
+<file path=ppt/slides/slide3.xml><?xml version="1.0" encoding="utf-8"?>
+<p:sld xmlns:a="http://schemas.openxmlformats.org/drawingml/2006/main" xmlns:r="http://schemas.openxmlformats.org/officeDocument/2006/relationships" xmlns:p="http://schemas.openxmlformats.org/presentationml/2006/main">
+  <p:cSld>
+    <p:bg>
+      <p:bgPr>
+        <a:solidFill>
+          <a:schemeClr val="bg1"/>
+        </a:solidFill>
+        <a:effectLst/>
+      </p:bgPr>
+    </p:bg>
+    <p:spTree>
+      <p:nvGrpSpPr>
+        <p:cNvPr id="1" name=""/>
+        <p:cNvGrpSpPr/>
+        <p:nvPr/>
+      </p:nvGrpSpPr>
+      <p:grpSpPr>
+        <a:xfrm>
+          <a:off x="0" y="0"/>
+          <a:ext cx="0" cy="0"/>
+          <a:chOff x="0" y="0"/>
+          <a:chExt cx="0" cy="0"/>
+        </a:xfrm>
+      </p:grpSpPr>
+      <p:sp>
+        <p:nvSpPr>
+          <p:cNvPr id="13" name="Rectangle 7">
+            <a:extLst>
+              <a:ext uri="{FF2B5EF4-FFF2-40B4-BE49-F238E27FC236}">
+                <a16:creationId xmlns:a16="http://schemas.microsoft.com/office/drawing/2014/main" id="{88294908-8B00-4F58-BBBA-20F71A40AA9E}"/>
+              </a:ext>
+              <a:ext uri="{C183D7F6-B498-43B3-948B-1728B52AA6E4}">
+                <adec:decorative xmlns:adec="http://schemas.microsoft.com/office/drawing/2017/decorative" val="1"/>
+              </a:ext>
+            </a:extLst>
+          </p:cNvPr>
+          <p:cNvSpPr>
+            <a:spLocks noGrp="1" noRot="1" noChangeAspect="1" noMove="1" noResize="1" noEditPoints="1" noAdjustHandles="1" noChangeArrowheads="1" noChangeShapeType="1" noTextEdit="1"/>
+          </p:cNvSpPr>
+          <p:nvPr>
+            <p:extLst>
+              <p:ext uri="{386F3935-93C4-4BCD-93E2-E3B085C9AB24}">
+                <p16:designElem xmlns:p16="http://schemas.microsoft.com/office/powerpoint/2015/main" val="1"/>
+              </p:ext>
+            </p:extLst>
+          </p:nvPr>
+        </p:nvSpPr>
+        <p:spPr>
+          <a:xfrm>
+            <a:off x="0" y="0"/>
+            <a:ext cx="12192000" cy="6858000"/>
+          </a:xfrm>
+          <a:prstGeom prst="rect">
+            <a:avLst/>
+          </a:prstGeom>
+          <a:solidFill>
+            <a:schemeClr val="bg2"/>
+          </a:solidFill>
+          <a:ln>
+            <a:noFill/>
+          </a:ln>
+        </p:spPr>
+        <p:style>
+          <a:lnRef idx="2">
+            <a:schemeClr val="accent1">
+              <a:shade val="50000"/>
+            </a:schemeClr>
+          </a:lnRef>
+          <a:fillRef idx="1">
+            <a:schemeClr val="accent1"/>
+          </a:fillRef>
+          <a:effectRef idx="0">
+            <a:schemeClr val="accent1"/>
+          </a:effectRef>
+          <a:fontRef idx="minor">
+            <a:schemeClr val="lt1"/>
+          </a:fontRef>
+        </p:style>
+        <p:txBody>
+          <a:bodyPr rtlCol="0" anchor="ctr"/>
+          <a:lstStyle/>
+          <a:p>
+            <a:pPr algn="ctr"/>
+            <a:endParaRPr lang="en-US" dirty="0"/>
+          </a:p>
+        </p:txBody>
+      </p:sp>
+      <p:sp>
+        <p:nvSpPr>
+          <p:cNvPr id="15" name="Freeform: Shape 9">
+            <a:extLst>
+              <a:ext uri="{FF2B5EF4-FFF2-40B4-BE49-F238E27FC236}">
+                <a16:creationId xmlns:a16="http://schemas.microsoft.com/office/drawing/2014/main" id="{4364C879-1404-4203-8E9D-CC5DE0A621A2}"/>
+              </a:ext>
+              <a:ext uri="{C183D7F6-B498-43B3-948B-1728B52AA6E4}">
+                <adec:decorative xmlns:adec="http://schemas.microsoft.com/office/drawing/2017/decorative" val="1"/>
+              </a:ext>
+            </a:extLst>
+          </p:cNvPr>
+          <p:cNvSpPr>
+            <a:spLocks noGrp="1" noRot="1" noChangeAspect="1" noMove="1" noResize="1" noEditPoints="1" noAdjustHandles="1" noChangeArrowheads="1" noChangeShapeType="1" noTextEdit="1"/>
+          </p:cNvSpPr>
+          <p:nvPr>
+            <p:extLst>
+              <p:ext uri="{386F3935-93C4-4BCD-93E2-E3B085C9AB24}">
+                <p16:designElem xmlns:p16="http://schemas.microsoft.com/office/powerpoint/2015/main" val="1"/>
+              </p:ext>
+            </p:extLst>
+          </p:nvPr>
+        </p:nvSpPr>
+        <p:spPr>
+          <a:xfrm rot="2700000">
+            <a:off x="82782" y="-1386168"/>
+            <a:ext cx="2424873" cy="3611191"/>
+          </a:xfrm>
+          <a:custGeom>
+            <a:avLst/>
+            <a:gdLst>
+              <a:gd name="connsiteX0" fmla="*/ 0 w 2424873"/>
+              <a:gd name="connsiteY0" fmla="*/ 2424874 h 3611191"/>
+              <a:gd name="connsiteX1" fmla="*/ 2424873 w 2424873"/>
+              <a:gd name="connsiteY1" fmla="*/ 0 h 3611191"/>
+              <a:gd name="connsiteX2" fmla="*/ 2424873 w 2424873"/>
+              <a:gd name="connsiteY2" fmla="*/ 3611191 h 3611191"/>
+              <a:gd name="connsiteX3" fmla="*/ 1186317 w 2424873"/>
+              <a:gd name="connsiteY3" fmla="*/ 3611191 h 3611191"/>
+            </a:gdLst>
+            <a:ahLst/>
+            <a:cxnLst>
+              <a:cxn ang="0">
+                <a:pos x="connsiteX0" y="connsiteY0"/>
+              </a:cxn>
+              <a:cxn ang="0">
+                <a:pos x="connsiteX1" y="connsiteY1"/>
+              </a:cxn>
+              <a:cxn ang="0">
+                <a:pos x="connsiteX2" y="connsiteY2"/>
+              </a:cxn>
+              <a:cxn ang="0">
+                <a:pos x="connsiteX3" y="connsiteY3"/>
+              </a:cxn>
+            </a:cxnLst>
+            <a:rect l="l" t="t" r="r" b="b"/>
+            <a:pathLst>
+              <a:path w="2424873" h="3611191">
+                <a:moveTo>
+                  <a:pt x="0" y="2424874"/>
+                </a:moveTo>
+                <a:lnTo>
+                  <a:pt x="2424873" y="0"/>
+                </a:lnTo>
+                <a:lnTo>
+                  <a:pt x="2424873" y="3611191"/>
+                </a:lnTo>
+                <a:lnTo>
+                  <a:pt x="1186317" y="3611191"/>
+                </a:lnTo>
+                <a:close/>
+              </a:path>
+            </a:pathLst>
+          </a:custGeom>
+          <a:solidFill>
+            <a:schemeClr val="accent4">
+              <a:alpha val="40000"/>
+            </a:schemeClr>
+          </a:solidFill>
+          <a:ln>
+            <a:noFill/>
+          </a:ln>
+        </p:spPr>
+        <p:style>
+          <a:lnRef idx="2">
+            <a:schemeClr val="accent1">
+              <a:shade val="50000"/>
+            </a:schemeClr>
+          </a:lnRef>
+          <a:fillRef idx="1">
+            <a:schemeClr val="accent1"/>
+          </a:fillRef>
+          <a:effectRef idx="0">
+            <a:schemeClr val="accent1"/>
+          </a:effectRef>
+          <a:fontRef idx="minor">
+            <a:schemeClr val="lt1"/>
+          </a:fontRef>
+        </p:style>
+        <p:txBody>
+          <a:bodyPr wrap="square" rtlCol="0" anchor="ctr">
+            <a:noAutofit/>
+          </a:bodyPr>
+          <a:lstStyle/>
+          <a:p>
+            <a:pPr algn="ctr"/>
+            <a:endParaRPr lang="en-US"/>
+          </a:p>
+        </p:txBody>
+      </p:sp>
+      <p:sp>
+        <p:nvSpPr>
+          <p:cNvPr id="12" name="Freeform: Shape 11">
+            <a:extLst>
+              <a:ext uri="{FF2B5EF4-FFF2-40B4-BE49-F238E27FC236}">
+                <a16:creationId xmlns:a16="http://schemas.microsoft.com/office/drawing/2014/main" id="{84617302-4B0D-4351-A6BB-6F0930D943AC}"/>
+              </a:ext>
+              <a:ext uri="{C183D7F6-B498-43B3-948B-1728B52AA6E4}">
+                <adec:decorative xmlns:adec="http://schemas.microsoft.com/office/drawing/2017/decorative" val="1"/>
+              </a:ext>
+            </a:extLst>
+          </p:cNvPr>
+          <p:cNvSpPr>
+            <a:spLocks noGrp="1" noRot="1" noChangeAspect="1" noMove="1" noResize="1" noEditPoints="1" noAdjustHandles="1" noChangeArrowheads="1" noChangeShapeType="1" noTextEdit="1"/>
+          </p:cNvSpPr>
+          <p:nvPr>
+            <p:extLst>
+              <p:ext uri="{386F3935-93C4-4BCD-93E2-E3B085C9AB24}">
+                <p16:designElem xmlns:p16="http://schemas.microsoft.com/office/powerpoint/2015/main" val="1"/>
+              </p:ext>
+            </p:extLst>
+          </p:nvPr>
+        </p:nvSpPr>
+        <p:spPr>
+          <a:xfrm rot="2700000">
+            <a:off x="1571000" y="-338582"/>
+            <a:ext cx="1635955" cy="1635955"/>
+          </a:xfrm>
+          <a:custGeom>
+            <a:avLst/>
+            <a:gdLst>
+              <a:gd name="connsiteX0" fmla="*/ 0 w 1635955"/>
+              <a:gd name="connsiteY0" fmla="*/ 957987 h 1635955"/>
+              <a:gd name="connsiteX1" fmla="*/ 957987 w 1635955"/>
+              <a:gd name="connsiteY1" fmla="*/ 0 h 1635955"/>
+              <a:gd name="connsiteX2" fmla="*/ 1635955 w 1635955"/>
+              <a:gd name="connsiteY2" fmla="*/ 0 h 1635955"/>
+              <a:gd name="connsiteX3" fmla="*/ 1635955 w 1635955"/>
+              <a:gd name="connsiteY3" fmla="*/ 1635955 h 1635955"/>
+              <a:gd name="connsiteX4" fmla="*/ 0 w 1635955"/>
+              <a:gd name="connsiteY4" fmla="*/ 1635955 h 1635955"/>
+            </a:gdLst>
+            <a:ahLst/>
+            <a:cxnLst>
+              <a:cxn ang="0">
+                <a:pos x="connsiteX0" y="connsiteY0"/>
+              </a:cxn>
+              <a:cxn ang="0">
+                <a:pos x="connsiteX1" y="connsiteY1"/>
+              </a:cxn>
+              <a:cxn ang="0">
+                <a:pos x="connsiteX2" y="connsiteY2"/>
+              </a:cxn>
+              <a:cxn ang="0">
+                <a:pos x="connsiteX3" y="connsiteY3"/>
+              </a:cxn>
+              <a:cxn ang="0">
+                <a:pos x="connsiteX4" y="connsiteY4"/>
+              </a:cxn>
+            </a:cxnLst>
+            <a:rect l="l" t="t" r="r" b="b"/>
+            <a:pathLst>
+              <a:path w="1635955" h="1635955">
+                <a:moveTo>
+                  <a:pt x="0" y="957987"/>
+                </a:moveTo>
+                <a:lnTo>
+                  <a:pt x="957987" y="0"/>
+                </a:lnTo>
+                <a:lnTo>
+                  <a:pt x="1635955" y="0"/>
+                </a:lnTo>
+                <a:lnTo>
+                  <a:pt x="1635955" y="1635955"/>
+                </a:lnTo>
+                <a:lnTo>
+                  <a:pt x="0" y="1635955"/>
+                </a:lnTo>
+                <a:close/>
+              </a:path>
+            </a:pathLst>
+          </a:custGeom>
+          <a:solidFill>
+            <a:schemeClr val="accent4">
+              <a:alpha val="40000"/>
+            </a:schemeClr>
+          </a:solidFill>
+          <a:ln>
+            <a:noFill/>
+          </a:ln>
+        </p:spPr>
+        <p:style>
+          <a:lnRef idx="2">
+            <a:schemeClr val="accent1">
+              <a:shade val="50000"/>
+            </a:schemeClr>
+          </a:lnRef>
+          <a:fillRef idx="1">
+            <a:schemeClr val="accent1"/>
+          </a:fillRef>
+          <a:effectRef idx="0">
+            <a:schemeClr val="accent1"/>
+          </a:effectRef>
+          <a:fontRef idx="minor">
+            <a:schemeClr val="lt1"/>
+          </a:fontRef>
+        </p:style>
+        <p:txBody>
+          <a:bodyPr wrap="square" rtlCol="0" anchor="ctr">
+            <a:noAutofit/>
+          </a:bodyPr>
+          <a:lstStyle/>
+          <a:p>
+            <a:pPr algn="ctr"/>
+            <a:endParaRPr lang="en-US"/>
+          </a:p>
+        </p:txBody>
+      </p:sp>
+      <p:sp>
+        <p:nvSpPr>
+          <p:cNvPr id="14" name="Freeform: Shape 13">
+            <a:extLst>
+              <a:ext uri="{FF2B5EF4-FFF2-40B4-BE49-F238E27FC236}">
+                <a16:creationId xmlns:a16="http://schemas.microsoft.com/office/drawing/2014/main" id="{DA2C7802-C2E0-4218-8F89-8DD7CCD2CD1C}"/>
+              </a:ext>
+              <a:ext uri="{C183D7F6-B498-43B3-948B-1728B52AA6E4}">
+                <adec:decorative xmlns:adec="http://schemas.microsoft.com/office/drawing/2017/decorative" val="1"/>
+              </a:ext>
+            </a:extLst>
+          </p:cNvPr>
+          <p:cNvSpPr>
+            <a:spLocks noGrp="1" noRot="1" noChangeAspect="1" noMove="1" noResize="1" noEditPoints="1" noAdjustHandles="1" noChangeArrowheads="1" noChangeShapeType="1" noTextEdit="1"/>
+          </p:cNvSpPr>
+          <p:nvPr>
+            <p:extLst>
+              <p:ext uri="{386F3935-93C4-4BCD-93E2-E3B085C9AB24}">
+                <p16:designElem xmlns:p16="http://schemas.microsoft.com/office/powerpoint/2015/main" val="1"/>
+              </p:ext>
+            </p:extLst>
+          </p:nvPr>
+        </p:nvSpPr>
+        <p:spPr>
+          <a:xfrm rot="2700000">
+            <a:off x="9627985" y="-6588"/>
+            <a:ext cx="4059393" cy="2548110"/>
+          </a:xfrm>
+          <a:custGeom>
+            <a:avLst/>
+            <a:gdLst>
+              <a:gd name="connsiteX0" fmla="*/ 0 w 4059393"/>
+              <a:gd name="connsiteY0" fmla="*/ 1511282 h 2548110"/>
+              <a:gd name="connsiteX1" fmla="*/ 1511282 w 4059393"/>
+              <a:gd name="connsiteY1" fmla="*/ 0 h 2548110"/>
+              <a:gd name="connsiteX2" fmla="*/ 4059393 w 4059393"/>
+              <a:gd name="connsiteY2" fmla="*/ 2548110 h 2548110"/>
+              <a:gd name="connsiteX3" fmla="*/ 0 w 4059393"/>
+              <a:gd name="connsiteY3" fmla="*/ 2548110 h 2548110"/>
+            </a:gdLst>
+            <a:ahLst/>
+            <a:cxnLst>
+              <a:cxn ang="0">
+                <a:pos x="connsiteX0" y="connsiteY0"/>
+              </a:cxn>
+              <a:cxn ang="0">
+                <a:pos x="connsiteX1" y="connsiteY1"/>
+              </a:cxn>
+              <a:cxn ang="0">
+                <a:pos x="connsiteX2" y="connsiteY2"/>
+              </a:cxn>
+              <a:cxn ang="0">
+                <a:pos x="connsiteX3" y="connsiteY3"/>
+              </a:cxn>
+            </a:cxnLst>
+            <a:rect l="l" t="t" r="r" b="b"/>
+            <a:pathLst>
+              <a:path w="4059393" h="2548110">
+                <a:moveTo>
+                  <a:pt x="0" y="1511282"/>
+                </a:moveTo>
+                <a:lnTo>
+                  <a:pt x="1511282" y="0"/>
+                </a:lnTo>
+                <a:lnTo>
+                  <a:pt x="4059393" y="2548110"/>
+                </a:lnTo>
+                <a:lnTo>
+                  <a:pt x="0" y="2548110"/>
+                </a:lnTo>
+                <a:close/>
+              </a:path>
+            </a:pathLst>
+          </a:custGeom>
+          <a:solidFill>
+            <a:schemeClr val="accent1">
+              <a:alpha val="30000"/>
+            </a:schemeClr>
+          </a:solidFill>
+          <a:ln>
+            <a:noFill/>
+          </a:ln>
+        </p:spPr>
+        <p:style>
+          <a:lnRef idx="2">
+            <a:schemeClr val="accent1">
+              <a:shade val="50000"/>
+            </a:schemeClr>
+          </a:lnRef>
+          <a:fillRef idx="1">
+            <a:schemeClr val="accent1"/>
+          </a:fillRef>
+          <a:effectRef idx="0">
+            <a:schemeClr val="accent1"/>
+          </a:effectRef>
+          <a:fontRef idx="minor">
+            <a:schemeClr val="lt1"/>
+          </a:fontRef>
+        </p:style>
+        <p:txBody>
+          <a:bodyPr wrap="square" rtlCol="0" anchor="ctr">
+            <a:noAutofit/>
+          </a:bodyPr>
+          <a:lstStyle/>
+          <a:p>
+            <a:pPr algn="ctr"/>
+            <a:endParaRPr lang="en-US"/>
+          </a:p>
+        </p:txBody>
+      </p:sp>
+      <p:sp>
+        <p:nvSpPr>
+          <p:cNvPr id="16" name="Rectangle 15">
+            <a:extLst>
+              <a:ext uri="{FF2B5EF4-FFF2-40B4-BE49-F238E27FC236}">
+                <a16:creationId xmlns:a16="http://schemas.microsoft.com/office/drawing/2014/main" id="{A6D7111A-21E5-4EE9-8A78-10E5530F0116}"/>
+              </a:ext>
+              <a:ext uri="{C183D7F6-B498-43B3-948B-1728B52AA6E4}">
+                <adec:decorative xmlns:adec="http://schemas.microsoft.com/office/drawing/2017/decorative" val="1"/>
+              </a:ext>
+            </a:extLst>
+          </p:cNvPr>
+          <p:cNvSpPr>
+            <a:spLocks noGrp="1" noRot="1" noChangeAspect="1" noMove="1" noResize="1" noEditPoints="1" noAdjustHandles="1" noChangeArrowheads="1" noChangeShapeType="1" noTextEdit="1"/>
+          </p:cNvSpPr>
+          <p:nvPr>
+            <p:extLst>
+              <p:ext uri="{386F3935-93C4-4BCD-93E2-E3B085C9AB24}">
+                <p16:designElem xmlns:p16="http://schemas.microsoft.com/office/powerpoint/2015/main" val="1"/>
+              </p:ext>
+            </p:extLst>
+          </p:nvPr>
+        </p:nvSpPr>
+        <p:spPr>
+          <a:xfrm rot="2700000">
+            <a:off x="10262924" y="1465780"/>
+            <a:ext cx="1185708" cy="1185708"/>
+          </a:xfrm>
+          <a:prstGeom prst="rect">
+            <a:avLst/>
+          </a:prstGeom>
+          <a:solidFill>
+            <a:schemeClr val="accent1">
+              <a:alpha val="30000"/>
+            </a:schemeClr>
+          </a:solidFill>
+          <a:ln>
+            <a:noFill/>
+          </a:ln>
+        </p:spPr>
+        <p:style>
+          <a:lnRef idx="2">
+            <a:schemeClr val="accent1">
+              <a:shade val="50000"/>
+            </a:schemeClr>
+          </a:lnRef>
+          <a:fillRef idx="1">
+            <a:schemeClr val="accent1"/>
+          </a:fillRef>
+          <a:effectRef idx="0">
+            <a:schemeClr val="accent1"/>
+          </a:effectRef>
+          <a:fontRef idx="minor">
+            <a:schemeClr val="lt1"/>
+          </a:fontRef>
+        </p:style>
+        <p:txBody>
+          <a:bodyPr wrap="square" rtlCol="0" anchor="ctr">
+            <a:noAutofit/>
+          </a:bodyPr>
+          <a:lstStyle/>
+          <a:p>
+            <a:pPr algn="ctr"/>
+            <a:endParaRPr lang="en-US"/>
+          </a:p>
+        </p:txBody>
+      </p:sp>
+      <p:sp>
+        <p:nvSpPr>
+          <p:cNvPr id="18" name="Freeform: Shape 17">
+            <a:extLst>
+              <a:ext uri="{FF2B5EF4-FFF2-40B4-BE49-F238E27FC236}">
+                <a16:creationId xmlns:a16="http://schemas.microsoft.com/office/drawing/2014/main" id="{A3969E80-A77B-49FC-9122-D89AFD5EE118}"/>
+              </a:ext>
+              <a:ext uri="{C183D7F6-B498-43B3-948B-1728B52AA6E4}">
+                <adec:decorative xmlns:adec="http://schemas.microsoft.com/office/drawing/2017/decorative" val="1"/>
+              </a:ext>
+            </a:extLst>
+          </p:cNvPr>
+          <p:cNvSpPr>
+            <a:spLocks noGrp="1" noRot="1" noChangeAspect="1" noMove="1" noResize="1" noEditPoints="1" noAdjustHandles="1" noChangeArrowheads="1" noChangeShapeType="1" noTextEdit="1"/>
+          </p:cNvSpPr>
+          <p:nvPr>
+            <p:extLst>
+              <p:ext uri="{386F3935-93C4-4BCD-93E2-E3B085C9AB24}">
+                <p16:designElem xmlns:p16="http://schemas.microsoft.com/office/powerpoint/2015/main" val="1"/>
+              </p:ext>
+            </p:extLst>
+          </p:nvPr>
+        </p:nvSpPr>
+        <p:spPr>
+          <a:xfrm rot="2700000">
+            <a:off x="-29557" y="5198743"/>
+            <a:ext cx="2444907" cy="2366116"/>
+          </a:xfrm>
+          <a:custGeom>
+            <a:avLst/>
+            <a:gdLst>
+              <a:gd name="connsiteX0" fmla="*/ 0 w 2203753"/>
+              <a:gd name="connsiteY0" fmla="*/ 0 h 2132734"/>
+              <a:gd name="connsiteX1" fmla="*/ 2203753 w 2203753"/>
+              <a:gd name="connsiteY1" fmla="*/ 0 h 2132734"/>
+              <a:gd name="connsiteX2" fmla="*/ 2203753 w 2203753"/>
+              <a:gd name="connsiteY2" fmla="*/ 576461 h 2132734"/>
+              <a:gd name="connsiteX3" fmla="*/ 647480 w 2203753"/>
+              <a:gd name="connsiteY3" fmla="*/ 2132734 h 2132734"/>
+              <a:gd name="connsiteX4" fmla="*/ 0 w 2203753"/>
+              <a:gd name="connsiteY4" fmla="*/ 1485255 h 2132734"/>
+            </a:gdLst>
+            <a:ahLst/>
+            <a:cxnLst>
+              <a:cxn ang="0">
+                <a:pos x="connsiteX0" y="connsiteY0"/>
+              </a:cxn>
+              <a:cxn ang="0">
+                <a:pos x="connsiteX1" y="connsiteY1"/>
+              </a:cxn>
+              <a:cxn ang="0">
+                <a:pos x="connsiteX2" y="connsiteY2"/>
+              </a:cxn>
+              <a:cxn ang="0">
+                <a:pos x="connsiteX3" y="connsiteY3"/>
+              </a:cxn>
+              <a:cxn ang="0">
+                <a:pos x="connsiteX4" y="connsiteY4"/>
+              </a:cxn>
+            </a:cxnLst>
+            <a:rect l="l" t="t" r="r" b="b"/>
+            <a:pathLst>
+              <a:path w="2203753" h="2132734">
+                <a:moveTo>
+                  <a:pt x="0" y="0"/>
+                </a:moveTo>
+                <a:lnTo>
+                  <a:pt x="2203753" y="0"/>
+                </a:lnTo>
+                <a:lnTo>
+                  <a:pt x="2203753" y="576461"/>
+                </a:lnTo>
+                <a:lnTo>
+                  <a:pt x="647480" y="2132734"/>
+                </a:lnTo>
+                <a:lnTo>
+                  <a:pt x="0" y="1485255"/>
+                </a:lnTo>
+                <a:close/>
+              </a:path>
+            </a:pathLst>
+          </a:custGeom>
+          <a:solidFill>
+            <a:schemeClr val="accent1">
+              <a:alpha val="30000"/>
+            </a:schemeClr>
+          </a:solidFill>
+          <a:ln>
+            <a:noFill/>
+          </a:ln>
+        </p:spPr>
+        <p:style>
+          <a:lnRef idx="2">
+            <a:schemeClr val="accent1">
+              <a:shade val="50000"/>
+            </a:schemeClr>
+          </a:lnRef>
+          <a:fillRef idx="1">
+            <a:schemeClr val="accent1"/>
+          </a:fillRef>
+          <a:effectRef idx="0">
+            <a:schemeClr val="accent1"/>
+          </a:effectRef>
+          <a:fontRef idx="minor">
+            <a:schemeClr val="lt1"/>
+          </a:fontRef>
+        </p:style>
+        <p:txBody>
+          <a:bodyPr wrap="square" rtlCol="0" anchor="ctr">
+            <a:noAutofit/>
+          </a:bodyPr>
+          <a:lstStyle/>
+          <a:p>
+            <a:pPr algn="ctr"/>
+            <a:endParaRPr lang="en-US"/>
+          </a:p>
+        </p:txBody>
+      </p:sp>
+      <p:sp>
+        <p:nvSpPr>
+          <p:cNvPr id="20" name="Rectangle 19">
+            <a:extLst>
+              <a:ext uri="{FF2B5EF4-FFF2-40B4-BE49-F238E27FC236}">
+                <a16:creationId xmlns:a16="http://schemas.microsoft.com/office/drawing/2014/main" id="{1849CA57-76BD-4CF2-80BA-D7A46A01B7B1}"/>
+              </a:ext>
+              <a:ext uri="{C183D7F6-B498-43B3-948B-1728B52AA6E4}">
+                <adec:decorative xmlns:adec="http://schemas.microsoft.com/office/drawing/2017/decorative" val="1"/>
+              </a:ext>
+            </a:extLst>
+          </p:cNvPr>
+          <p:cNvSpPr>
+            <a:spLocks noGrp="1" noRot="1" noChangeAspect="1" noMove="1" noResize="1" noEditPoints="1" noAdjustHandles="1" noChangeArrowheads="1" noChangeShapeType="1" noTextEdit="1"/>
+          </p:cNvSpPr>
+          <p:nvPr>
+            <p:extLst>
+              <p:ext uri="{386F3935-93C4-4BCD-93E2-E3B085C9AB24}">
+                <p16:designElem xmlns:p16="http://schemas.microsoft.com/office/powerpoint/2015/main" val="1"/>
+              </p:ext>
+            </p:extLst>
+          </p:nvPr>
+        </p:nvSpPr>
+        <p:spPr>
+          <a:xfrm rot="2700000">
+            <a:off x="1769787" y="5439893"/>
+            <a:ext cx="928467" cy="928467"/>
+          </a:xfrm>
+          <a:prstGeom prst="rect">
+            <a:avLst/>
+          </a:prstGeom>
+          <a:solidFill>
+            <a:schemeClr val="accent1">
+              <a:alpha val="30000"/>
+            </a:schemeClr>
+          </a:solidFill>
+          <a:ln>
+            <a:noFill/>
+          </a:ln>
+        </p:spPr>
+        <p:style>
+          <a:lnRef idx="2">
+            <a:schemeClr val="accent1">
+              <a:shade val="50000"/>
+            </a:schemeClr>
+          </a:lnRef>
+          <a:fillRef idx="1">
+            <a:schemeClr val="accent1"/>
+          </a:fillRef>
+          <a:effectRef idx="0">
+            <a:schemeClr val="accent1"/>
+          </a:effectRef>
+          <a:fontRef idx="minor">
+            <a:schemeClr val="lt1"/>
+          </a:fontRef>
+        </p:style>
+        <p:txBody>
+          <a:bodyPr wrap="square" rtlCol="0" anchor="ctr">
+            <a:noAutofit/>
+          </a:bodyPr>
+          <a:lstStyle/>
+          <a:p>
+            <a:pPr algn="ctr"/>
+            <a:endParaRPr lang="en-US">
+              <a:solidFill>
+                <a:srgbClr val="FFFFFF"/>
+              </a:solidFill>
+              <a:effectLst>
+                <a:outerShdw blurRad="38100" dist="38100" dir="2700000" algn="tl">
+                  <a:srgbClr val="000000">
+                    <a:alpha val="43137"/>
+                  </a:srgbClr>
+                </a:outerShdw>
+              </a:effectLst>
+            </a:endParaRPr>
+          </a:p>
+        </p:txBody>
+      </p:sp>
+      <p:sp>
+        <p:nvSpPr>
+          <p:cNvPr id="22" name="Freeform: Shape 21">
+            <a:extLst>
+              <a:ext uri="{FF2B5EF4-FFF2-40B4-BE49-F238E27FC236}">
+                <a16:creationId xmlns:a16="http://schemas.microsoft.com/office/drawing/2014/main" id="{35E9085E-E730-4768-83D4-6CB7E9897153}"/>
+              </a:ext>
+              <a:ext uri="{C183D7F6-B498-43B3-948B-1728B52AA6E4}">
+                <adec:decorative xmlns:adec="http://schemas.microsoft.com/office/drawing/2017/decorative" val="1"/>
+              </a:ext>
+            </a:extLst>
+          </p:cNvPr>
+          <p:cNvSpPr>
+            <a:spLocks noGrp="1" noRot="1" noChangeAspect="1" noMove="1" noResize="1" noEditPoints="1" noAdjustHandles="1" noChangeArrowheads="1" noChangeShapeType="1" noTextEdit="1"/>
+          </p:cNvSpPr>
+          <p:nvPr>
+            <p:extLst>
+              <p:ext uri="{386F3935-93C4-4BCD-93E2-E3B085C9AB24}">
+                <p16:designElem xmlns:p16="http://schemas.microsoft.com/office/powerpoint/2015/main" val="1"/>
+              </p:ext>
+            </p:extLst>
+          </p:nvPr>
+        </p:nvSpPr>
+        <p:spPr>
+          <a:xfrm rot="2700000">
+            <a:off x="3401311" y="734311"/>
+            <a:ext cx="5389379" cy="5389379"/>
+          </a:xfrm>
+          <a:custGeom>
+            <a:avLst/>
+            <a:gdLst>
+              <a:gd name="connsiteX0" fmla="*/ 0 w 5389379"/>
+              <a:gd name="connsiteY0" fmla="*/ 540040 h 5389379"/>
+              <a:gd name="connsiteX1" fmla="*/ 540040 w 5389379"/>
+              <a:gd name="connsiteY1" fmla="*/ 0 h 5389379"/>
+              <a:gd name="connsiteX2" fmla="*/ 5389379 w 5389379"/>
+              <a:gd name="connsiteY2" fmla="*/ 0 h 5389379"/>
+              <a:gd name="connsiteX3" fmla="*/ 5389379 w 5389379"/>
+              <a:gd name="connsiteY3" fmla="*/ 4838655 h 5389379"/>
+              <a:gd name="connsiteX4" fmla="*/ 4838655 w 5389379"/>
+              <a:gd name="connsiteY4" fmla="*/ 5389379 h 5389379"/>
+              <a:gd name="connsiteX5" fmla="*/ 0 w 5389379"/>
+              <a:gd name="connsiteY5" fmla="*/ 5389379 h 5389379"/>
+            </a:gdLst>
+            <a:ahLst/>
+            <a:cxnLst>
+              <a:cxn ang="0">
+                <a:pos x="connsiteX0" y="connsiteY0"/>
+              </a:cxn>
+              <a:cxn ang="0">
+                <a:pos x="connsiteX1" y="connsiteY1"/>
+              </a:cxn>
+              <a:cxn ang="0">
+                <a:pos x="connsiteX2" y="connsiteY2"/>
+              </a:cxn>
+              <a:cxn ang="0">
+                <a:pos x="connsiteX3" y="connsiteY3"/>
+              </a:cxn>
+              <a:cxn ang="0">
+                <a:pos x="connsiteX4" y="connsiteY4"/>
+              </a:cxn>
+              <a:cxn ang="0">
+                <a:pos x="connsiteX5" y="connsiteY5"/>
+              </a:cxn>
+            </a:cxnLst>
+            <a:rect l="l" t="t" r="r" b="b"/>
+            <a:pathLst>
+              <a:path w="5389379" h="5389379">
+                <a:moveTo>
+                  <a:pt x="0" y="540040"/>
+                </a:moveTo>
+                <a:lnTo>
+                  <a:pt x="540040" y="0"/>
+                </a:lnTo>
+                <a:lnTo>
+                  <a:pt x="5389379" y="0"/>
+                </a:lnTo>
+                <a:lnTo>
+                  <a:pt x="5389379" y="4838655"/>
+                </a:lnTo>
+                <a:lnTo>
+                  <a:pt x="4838655" y="5389379"/>
+                </a:lnTo>
+                <a:lnTo>
+                  <a:pt x="0" y="5389379"/>
+                </a:lnTo>
+                <a:close/>
+              </a:path>
+            </a:pathLst>
+          </a:custGeom>
+          <a:solidFill>
+            <a:srgbClr val="FFFFFF"/>
+          </a:solidFill>
+          <a:ln>
+            <a:noFill/>
+          </a:ln>
+        </p:spPr>
+        <p:style>
+          <a:lnRef idx="2">
+            <a:schemeClr val="accent1">
+              <a:shade val="50000"/>
+            </a:schemeClr>
+          </a:lnRef>
+          <a:fillRef idx="1">
+            <a:schemeClr val="accent1"/>
+          </a:fillRef>
+          <a:effectRef idx="0">
+            <a:schemeClr val="accent1"/>
+          </a:effectRef>
+          <a:fontRef idx="minor">
+            <a:schemeClr val="lt1"/>
+          </a:fontRef>
+        </p:style>
+        <p:txBody>
+          <a:bodyPr wrap="square" rtlCol="0" anchor="ctr">
+            <a:noAutofit/>
+          </a:bodyPr>
+          <a:lstStyle/>
+          <a:p>
+            <a:pPr algn="ctr"/>
+            <a:endParaRPr lang="en-US"/>
+          </a:p>
+        </p:txBody>
+      </p:sp>
+      <p:sp>
+        <p:nvSpPr>
+          <p:cNvPr id="24" name="Freeform: Shape 23">
+            <a:extLst>
+              <a:ext uri="{FF2B5EF4-FFF2-40B4-BE49-F238E27FC236}">
+                <a16:creationId xmlns:a16="http://schemas.microsoft.com/office/drawing/2014/main" id="{973272FE-A474-4CAE-8CA2-BCC8B476C3F4}"/>
+              </a:ext>
+              <a:ext uri="{C183D7F6-B498-43B3-948B-1728B52AA6E4}">
+                <adec:decorative xmlns:adec="http://schemas.microsoft.com/office/drawing/2017/decorative" val="1"/>
+              </a:ext>
+            </a:extLst>
+          </p:cNvPr>
+          <p:cNvSpPr>
+            <a:spLocks noGrp="1" noRot="1" noChangeAspect="1" noMove="1" noResize="1" noEditPoints="1" noAdjustHandles="1" noChangeArrowheads="1" noChangeShapeType="1" noTextEdit="1"/>
+          </p:cNvSpPr>
+          <p:nvPr>
+            <p:extLst>
+              <p:ext uri="{386F3935-93C4-4BCD-93E2-E3B085C9AB24}">
+                <p16:designElem xmlns:p16="http://schemas.microsoft.com/office/powerpoint/2015/main" val="1"/>
+              </p:ext>
+            </p:extLst>
+          </p:nvPr>
+        </p:nvSpPr>
+        <p:spPr>
+          <a:xfrm rot="2700000">
+            <a:off x="2700283" y="33283"/>
+            <a:ext cx="6791435" cy="6791435"/>
+          </a:xfrm>
+          <a:custGeom>
+            <a:avLst/>
+            <a:gdLst>
+              <a:gd name="connsiteX0" fmla="*/ 1860938 w 6791435"/>
+              <a:gd name="connsiteY0" fmla="*/ 81158 h 6791435"/>
+              <a:gd name="connsiteX1" fmla="*/ 1942096 w 6791435"/>
+              <a:gd name="connsiteY1" fmla="*/ 0 h 6791435"/>
+              <a:gd name="connsiteX2" fmla="*/ 6791435 w 6791435"/>
+              <a:gd name="connsiteY2" fmla="*/ 0 h 6791435"/>
+              <a:gd name="connsiteX3" fmla="*/ 6791435 w 6791435"/>
+              <a:gd name="connsiteY3" fmla="*/ 4838655 h 6791435"/>
+              <a:gd name="connsiteX4" fmla="*/ 6710277 w 6791435"/>
+              <a:gd name="connsiteY4" fmla="*/ 4919813 h 6791435"/>
+              <a:gd name="connsiteX5" fmla="*/ 6710277 w 6791435"/>
+              <a:gd name="connsiteY5" fmla="*/ 81158 h 6791435"/>
+              <a:gd name="connsiteX6" fmla="*/ 0 w 6791435"/>
+              <a:gd name="connsiteY6" fmla="*/ 1942096 h 6791435"/>
+              <a:gd name="connsiteX7" fmla="*/ 81158 w 6791435"/>
+              <a:gd name="connsiteY7" fmla="*/ 1860938 h 6791435"/>
+              <a:gd name="connsiteX8" fmla="*/ 81158 w 6791435"/>
+              <a:gd name="connsiteY8" fmla="*/ 6710277 h 6791435"/>
+              <a:gd name="connsiteX9" fmla="*/ 4919813 w 6791435"/>
+              <a:gd name="connsiteY9" fmla="*/ 6710277 h 6791435"/>
+              <a:gd name="connsiteX10" fmla="*/ 4838655 w 6791435"/>
+              <a:gd name="connsiteY10" fmla="*/ 6791435 h 6791435"/>
+              <a:gd name="connsiteX11" fmla="*/ 0 w 6791435"/>
+              <a:gd name="connsiteY11" fmla="*/ 6791435 h 6791435"/>
+            </a:gdLst>
+            <a:ahLst/>
+            <a:cxnLst>
+              <a:cxn ang="0">
+                <a:pos x="connsiteX0" y="connsiteY0"/>
+              </a:cxn>
+              <a:cxn ang="0">
+                <a:pos x="connsiteX1" y="connsiteY1"/>
+              </a:cxn>
+              <a:cxn ang="0">
+                <a:pos x="connsiteX2" y="connsiteY2"/>
+              </a:cxn>
+              <a:cxn ang="0">
+                <a:pos x="connsiteX3" y="connsiteY3"/>
+              </a:cxn>
+              <a:cxn ang="0">
+                <a:pos x="connsiteX4" y="connsiteY4"/>
+              </a:cxn>
+              <a:cxn ang="0">
+                <a:pos x="connsiteX5" y="connsiteY5"/>
+              </a:cxn>
+              <a:cxn ang="0">
+                <a:pos x="connsiteX6" y="connsiteY6"/>
+              </a:cxn>
+              <a:cxn ang="0">
+                <a:pos x="connsiteX7" y="connsiteY7"/>
+              </a:cxn>
+              <a:cxn ang="0">
+                <a:pos x="connsiteX8" y="connsiteY8"/>
+              </a:cxn>
+              <a:cxn ang="0">
+                <a:pos x="connsiteX9" y="connsiteY9"/>
+              </a:cxn>
+              <a:cxn ang="0">
+                <a:pos x="connsiteX10" y="connsiteY10"/>
+              </a:cxn>
+              <a:cxn ang="0">
+                <a:pos x="connsiteX11" y="connsiteY11"/>
+              </a:cxn>
+            </a:cxnLst>
+            <a:rect l="l" t="t" r="r" b="b"/>
+            <a:pathLst>
+              <a:path w="6791435" h="6791435">
+                <a:moveTo>
+                  <a:pt x="1860938" y="81158"/>
+                </a:moveTo>
+                <a:lnTo>
+                  <a:pt x="1942096" y="0"/>
+                </a:lnTo>
+                <a:lnTo>
+                  <a:pt x="6791435" y="0"/>
+                </a:lnTo>
+                <a:lnTo>
+                  <a:pt x="6791435" y="4838655"/>
+                </a:lnTo>
+                <a:lnTo>
+                  <a:pt x="6710277" y="4919813"/>
+                </a:lnTo>
+                <a:lnTo>
+                  <a:pt x="6710277" y="81158"/>
+                </a:lnTo>
+                <a:close/>
+                <a:moveTo>
+                  <a:pt x="0" y="1942096"/>
+                </a:moveTo>
+                <a:lnTo>
+                  <a:pt x="81158" y="1860938"/>
+                </a:lnTo>
+                <a:lnTo>
+                  <a:pt x="81158" y="6710277"/>
+                </a:lnTo>
+                <a:lnTo>
+                  <a:pt x="4919813" y="6710277"/>
+                </a:lnTo>
+                <a:lnTo>
+                  <a:pt x="4838655" y="6791435"/>
+                </a:lnTo>
+                <a:lnTo>
+                  <a:pt x="0" y="6791435"/>
+                </a:lnTo>
+                <a:close/>
+              </a:path>
+            </a:pathLst>
+          </a:custGeom>
+          <a:solidFill>
+            <a:srgbClr val="FFFFFF">
+              <a:alpha val="60000"/>
+            </a:srgbClr>
+          </a:solidFill>
+          <a:ln>
+            <a:noFill/>
+          </a:ln>
+        </p:spPr>
+        <p:style>
+          <a:lnRef idx="2">
+            <a:schemeClr val="accent1">
+              <a:shade val="50000"/>
+            </a:schemeClr>
+          </a:lnRef>
+          <a:fillRef idx="1">
+            <a:schemeClr val="accent1"/>
+          </a:fillRef>
+          <a:effectRef idx="0">
+            <a:schemeClr val="accent1"/>
+          </a:effectRef>
+          <a:fontRef idx="minor">
+            <a:schemeClr val="lt1"/>
+          </a:fontRef>
+        </p:style>
+        <p:txBody>
+          <a:bodyPr wrap="square" rtlCol="0" anchor="ctr">
+            <a:noAutofit/>
+          </a:bodyPr>
+          <a:lstStyle/>
+          <a:p>
+            <a:pPr algn="ctr"/>
+            <a:endParaRPr lang="en-US">
+              <a:solidFill>
+                <a:schemeClr val="tx1"/>
+              </a:solidFill>
+            </a:endParaRPr>
+          </a:p>
+        </p:txBody>
+      </p:sp>
+      <p:sp>
+        <p:nvSpPr>
+          <p:cNvPr id="26" name="Freeform: Shape 25">
+            <a:extLst>
+              <a:ext uri="{FF2B5EF4-FFF2-40B4-BE49-F238E27FC236}">
+                <a16:creationId xmlns:a16="http://schemas.microsoft.com/office/drawing/2014/main" id="{E07981EA-05A6-437C-88D7-B377B92B031D}"/>
+              </a:ext>
+              <a:ext uri="{C183D7F6-B498-43B3-948B-1728B52AA6E4}">
+                <adec:decorative xmlns:adec="http://schemas.microsoft.com/office/drawing/2017/decorative" val="1"/>
+              </a:ext>
+            </a:extLst>
+          </p:cNvPr>
+          <p:cNvSpPr>
+            <a:spLocks noGrp="1" noRot="1" noChangeAspect="1" noMove="1" noResize="1" noEditPoints="1" noAdjustHandles="1" noChangeArrowheads="1" noChangeShapeType="1" noTextEdit="1"/>
+          </p:cNvSpPr>
+          <p:nvPr>
+            <p:extLst>
+              <p:ext uri="{386F3935-93C4-4BCD-93E2-E3B085C9AB24}">
+                <p16:designElem xmlns:p16="http://schemas.microsoft.com/office/powerpoint/2015/main" val="1"/>
+              </p:ext>
+            </p:extLst>
+          </p:nvPr>
+        </p:nvSpPr>
+        <p:spPr>
+          <a:xfrm rot="2700000">
+            <a:off x="9629823" y="5457591"/>
+            <a:ext cx="2231794" cy="2568811"/>
+          </a:xfrm>
+          <a:custGeom>
+            <a:avLst/>
+            <a:gdLst>
+              <a:gd name="connsiteX0" fmla="*/ 0 w 2940086"/>
+              <a:gd name="connsiteY0" fmla="*/ 0 h 3384061"/>
+              <a:gd name="connsiteX1" fmla="*/ 2496112 w 2940086"/>
+              <a:gd name="connsiteY1" fmla="*/ 0 h 3384061"/>
+              <a:gd name="connsiteX2" fmla="*/ 2940086 w 2940086"/>
+              <a:gd name="connsiteY2" fmla="*/ 443975 h 3384061"/>
+              <a:gd name="connsiteX3" fmla="*/ 0 w 2940086"/>
+              <a:gd name="connsiteY3" fmla="*/ 3384061 h 3384061"/>
+            </a:gdLst>
+            <a:ahLst/>
+            <a:cxnLst>
+              <a:cxn ang="0">
+                <a:pos x="connsiteX0" y="connsiteY0"/>
+              </a:cxn>
+              <a:cxn ang="0">
+                <a:pos x="connsiteX1" y="connsiteY1"/>
+              </a:cxn>
+              <a:cxn ang="0">
+                <a:pos x="connsiteX2" y="connsiteY2"/>
+              </a:cxn>
+              <a:cxn ang="0">
+                <a:pos x="connsiteX3" y="connsiteY3"/>
+              </a:cxn>
+            </a:cxnLst>
+            <a:rect l="l" t="t" r="r" b="b"/>
+            <a:pathLst>
+              <a:path w="2940086" h="3384061">
+                <a:moveTo>
+                  <a:pt x="0" y="0"/>
+                </a:moveTo>
+                <a:lnTo>
+                  <a:pt x="2496112" y="0"/>
+                </a:lnTo>
+                <a:lnTo>
+                  <a:pt x="2940086" y="443975"/>
+                </a:lnTo>
+                <a:lnTo>
+                  <a:pt x="0" y="3384061"/>
+                </a:lnTo>
+                <a:close/>
+              </a:path>
+            </a:pathLst>
+          </a:custGeom>
+          <a:solidFill>
+            <a:schemeClr val="accent4">
+              <a:alpha val="40000"/>
+            </a:schemeClr>
+          </a:solidFill>
+          <a:ln>
+            <a:noFill/>
+          </a:ln>
+        </p:spPr>
+        <p:style>
+          <a:lnRef idx="2">
+            <a:schemeClr val="accent1">
+              <a:shade val="50000"/>
+            </a:schemeClr>
+          </a:lnRef>
+          <a:fillRef idx="1">
+            <a:schemeClr val="accent1"/>
+          </a:fillRef>
+          <a:effectRef idx="0">
+            <a:schemeClr val="accent1"/>
+          </a:effectRef>
+          <a:fontRef idx="minor">
+            <a:schemeClr val="lt1"/>
+          </a:fontRef>
+        </p:style>
+        <p:txBody>
+          <a:bodyPr wrap="square" rtlCol="0" anchor="ctr">
+            <a:noAutofit/>
+          </a:bodyPr>
+          <a:lstStyle/>
+          <a:p>
+            <a:pPr algn="ctr"/>
+            <a:endParaRPr lang="en-US"/>
+          </a:p>
+        </p:txBody>
+      </p:sp>
+      <p:sp>
+        <p:nvSpPr>
+          <p:cNvPr id="28" name="Rectangle 27">
+            <a:extLst>
+              <a:ext uri="{FF2B5EF4-FFF2-40B4-BE49-F238E27FC236}">
+                <a16:creationId xmlns:a16="http://schemas.microsoft.com/office/drawing/2014/main" id="{15E3C750-986E-4769-B1AE-49289FBEE757}"/>
+              </a:ext>
+              <a:ext uri="{C183D7F6-B498-43B3-948B-1728B52AA6E4}">
+                <adec:decorative xmlns:adec="http://schemas.microsoft.com/office/drawing/2017/decorative" val="1"/>
+              </a:ext>
+            </a:extLst>
+          </p:cNvPr>
+          <p:cNvSpPr>
+            <a:spLocks noGrp="1" noRot="1" noChangeAspect="1" noMove="1" noResize="1" noEditPoints="1" noAdjustHandles="1" noChangeArrowheads="1" noChangeShapeType="1" noTextEdit="1"/>
+          </p:cNvSpPr>
+          <p:nvPr>
+            <p:extLst>
+              <p:ext uri="{386F3935-93C4-4BCD-93E2-E3B085C9AB24}">
+                <p16:designElem xmlns:p16="http://schemas.microsoft.com/office/powerpoint/2015/main" val="1"/>
+              </p:ext>
+            </p:extLst>
+          </p:nvPr>
+        </p:nvSpPr>
+        <p:spPr>
+          <a:xfrm rot="2700000">
+            <a:off x="9720059" y="5243545"/>
+            <a:ext cx="959985" cy="959985"/>
+          </a:xfrm>
+          <a:prstGeom prst="rect">
+            <a:avLst/>
+          </a:prstGeom>
+          <a:solidFill>
+            <a:schemeClr val="accent4">
+              <a:alpha val="40000"/>
+            </a:schemeClr>
+          </a:solidFill>
+          <a:ln>
+            <a:noFill/>
+          </a:ln>
+        </p:spPr>
+        <p:style>
+          <a:lnRef idx="2">
+            <a:schemeClr val="accent1">
+              <a:shade val="50000"/>
+            </a:schemeClr>
+          </a:lnRef>
+          <a:fillRef idx="1">
+            <a:schemeClr val="accent1"/>
+          </a:fillRef>
+          <a:effectRef idx="0">
+            <a:schemeClr val="accent1"/>
+          </a:effectRef>
+          <a:fontRef idx="minor">
+            <a:schemeClr val="lt1"/>
+          </a:fontRef>
+        </p:style>
+        <p:txBody>
+          <a:bodyPr wrap="square" rtlCol="0" anchor="ctr">
+            <a:noAutofit/>
+          </a:bodyPr>
+          <a:lstStyle/>
+          <a:p>
+            <a:pPr algn="ctr"/>
+            <a:endParaRPr lang="en-US"/>
+          </a:p>
+        </p:txBody>
+      </p:sp>
+      <p:sp>
+        <p:nvSpPr>
+          <p:cNvPr id="17" name="TextBox 16">
+            <a:extLst>
+              <a:ext uri="{FF2B5EF4-FFF2-40B4-BE49-F238E27FC236}">
+                <a16:creationId xmlns:a16="http://schemas.microsoft.com/office/drawing/2014/main" id="{C46B169A-8A89-400B-983F-06F7DEBA1D27}"/>
+              </a:ext>
+            </a:extLst>
+          </p:cNvPr>
+          <p:cNvSpPr txBox="1"/>
+          <p:nvPr/>
+        </p:nvSpPr>
+        <p:spPr>
+          <a:xfrm>
+            <a:off x="1489204" y="352315"/>
+            <a:ext cx="6107184" cy="646331"/>
+          </a:xfrm>
+          <a:prstGeom prst="rect">
+            <a:avLst/>
+          </a:prstGeom>
+          <a:noFill/>
+        </p:spPr>
+        <p:txBody>
+          <a:bodyPr wrap="square">
+            <a:spAutoFit/>
+          </a:bodyPr>
+          <a:lstStyle/>
+          <a:p>
+            <a:r>
+              <a:rPr lang="en-IN" sz="3600" b="1" u="sng" dirty="0">
+                <a:latin typeface="Times New Roman" panose="02020603050405020304" pitchFamily="18" charset="0"/>
+                <a:cs typeface="Times New Roman" panose="02020603050405020304" pitchFamily="18" charset="0"/>
+              </a:rPr>
+              <a:t>Git Revert</a:t>
+            </a:r>
+          </a:p>
+        </p:txBody>
+      </p:sp>
+      <p:sp>
+        <p:nvSpPr>
+          <p:cNvPr id="19" name="TextBox 18">
+            <a:extLst>
+              <a:ext uri="{FF2B5EF4-FFF2-40B4-BE49-F238E27FC236}">
+                <a16:creationId xmlns:a16="http://schemas.microsoft.com/office/drawing/2014/main" id="{8C0BDDD6-609E-4C48-9466-72DB42AE109A}"/>
+              </a:ext>
+            </a:extLst>
+          </p:cNvPr>
+          <p:cNvSpPr txBox="1"/>
+          <p:nvPr/>
+        </p:nvSpPr>
+        <p:spPr>
+          <a:xfrm>
+            <a:off x="1489204" y="1578245"/>
+            <a:ext cx="9389660" cy="5816977"/>
+          </a:xfrm>
+          <a:prstGeom prst="rect">
+            <a:avLst/>
+          </a:prstGeom>
+          <a:noFill/>
+        </p:spPr>
+        <p:txBody>
+          <a:bodyPr wrap="square">
+            <a:spAutoFit/>
+          </a:bodyPr>
+          <a:lstStyle/>
+          <a:p>
+            <a:r>
+              <a:rPr lang="en-US" sz="2400" dirty="0"/>
+              <a:t>In Git, the term revert is used to revert some changes. The git revert command is used to apply revert operation. It is an undo type command. However, it is not a traditional undo alternative. It does not delete any data in this process; instead, it will create a new change with the opposite effect and thereby undo the specified commit. Generally, git revert is a commit.</a:t>
+            </a:r>
+          </a:p>
+          <a:p>
+            <a:endParaRPr lang="en-US" sz="2400" dirty="0"/>
+          </a:p>
+          <a:p>
+            <a:endParaRPr lang="en-US" sz="2400" dirty="0"/>
+          </a:p>
+          <a:p>
+            <a:r>
+              <a:rPr lang="en-US" sz="3200" u="sng" dirty="0"/>
+              <a:t>Syntax-</a:t>
+            </a:r>
+          </a:p>
+          <a:p>
+            <a:pPr marL="342900" indent="-342900">
+              <a:buFont typeface="Arial" panose="020B0604020202020204" pitchFamily="34" charset="0"/>
+              <a:buChar char="•"/>
+            </a:pPr>
+            <a:r>
+              <a:rPr kumimoji="0" lang="en-US" altLang="en-US" sz="2400" b="0" i="1" u="none" strike="noStrike" cap="none" normalizeH="0" baseline="0" dirty="0">
+                <a:ln>
+                  <a:noFill/>
+                </a:ln>
+                <a:solidFill>
+                  <a:schemeClr val="tx1"/>
+                </a:solidFill>
+                <a:effectLst/>
+                <a:latin typeface="Arial Unicode MS"/>
+              </a:rPr>
+              <a:t>git revert</a:t>
+            </a:r>
+            <a:r>
+              <a:rPr kumimoji="0" lang="en-US" altLang="en-US" sz="2400" b="0" i="0" u="none" strike="noStrike" cap="none" normalizeH="0" baseline="0" dirty="0">
+                <a:ln>
+                  <a:noFill/>
+                </a:ln>
+                <a:solidFill>
+                  <a:schemeClr val="tx1"/>
+                </a:solidFill>
+                <a:effectLst/>
+                <a:latin typeface="Arial Unicode MS"/>
+              </a:rPr>
+              <a:t> [--[no-]edit] [-n] [-m parent-number] [-s] [-	S[&lt;</a:t>
+            </a:r>
+            <a:r>
+              <a:rPr kumimoji="0" lang="en-US" altLang="en-US" sz="2400" b="0" i="0" u="none" strike="noStrike" cap="none" normalizeH="0" baseline="0" dirty="0" err="1">
+                <a:ln>
+                  <a:noFill/>
+                </a:ln>
+                <a:solidFill>
+                  <a:schemeClr val="tx1"/>
+                </a:solidFill>
+                <a:effectLst/>
+                <a:latin typeface="Arial Unicode MS"/>
+              </a:rPr>
+              <a:t>keyid</a:t>
+            </a:r>
+            <a:r>
+              <a:rPr kumimoji="0" lang="en-US" altLang="en-US" sz="2400" b="0" i="0" u="none" strike="noStrike" cap="none" normalizeH="0" baseline="0" dirty="0">
+                <a:ln>
+                  <a:noFill/>
+                </a:ln>
+                <a:solidFill>
+                  <a:schemeClr val="tx1"/>
+                </a:solidFill>
+                <a:effectLst/>
+                <a:latin typeface="Arial Unicode MS"/>
+              </a:rPr>
+              <a:t>&gt;]] &lt;commit&gt;…​ </a:t>
+            </a:r>
+          </a:p>
+          <a:p>
+            <a:pPr marL="342900" indent="-342900">
+              <a:buFont typeface="Arial" panose="020B0604020202020204" pitchFamily="34" charset="0"/>
+              <a:buChar char="•"/>
+            </a:pPr>
+            <a:r>
+              <a:rPr kumimoji="0" lang="en-US" altLang="en-US" sz="2400" b="0" i="1" u="none" strike="noStrike" cap="none" normalizeH="0" baseline="0" dirty="0">
+                <a:ln>
+                  <a:noFill/>
+                </a:ln>
+                <a:solidFill>
+                  <a:schemeClr val="tx1"/>
+                </a:solidFill>
+                <a:effectLst/>
+                <a:latin typeface="Arial Unicode MS"/>
+              </a:rPr>
+              <a:t>git revert</a:t>
+            </a:r>
+            <a:r>
+              <a:rPr kumimoji="0" lang="en-US" altLang="en-US" sz="2400" b="0" i="0" u="none" strike="noStrike" cap="none" normalizeH="0" baseline="0" dirty="0">
+                <a:ln>
+                  <a:noFill/>
+                </a:ln>
+                <a:solidFill>
+                  <a:schemeClr val="tx1"/>
+                </a:solidFill>
+                <a:effectLst/>
+                <a:latin typeface="Arial Unicode MS"/>
+              </a:rPr>
+              <a:t> (--continue | --skip | --abort | --quit)</a:t>
+            </a:r>
+            <a:r>
+              <a:rPr kumimoji="0" lang="en-US" altLang="en-US" sz="1800" b="0" i="0" u="none" strike="noStrike" cap="none" normalizeH="0" baseline="0" dirty="0">
+                <a:ln>
+                  <a:noFill/>
+                </a:ln>
+                <a:solidFill>
+                  <a:schemeClr val="tx1"/>
+                </a:solidFill>
+                <a:effectLst/>
+              </a:rPr>
+              <a:t> </a:t>
+            </a:r>
+            <a:endParaRPr kumimoji="0" lang="en-US" altLang="en-US" sz="4800" b="0" i="0" u="none" strike="noStrike" cap="none" normalizeH="0" baseline="0" dirty="0">
+              <a:ln>
+                <a:noFill/>
+              </a:ln>
+              <a:solidFill>
+                <a:schemeClr val="tx1"/>
+              </a:solidFill>
+              <a:effectLst/>
+              <a:latin typeface="Arial" panose="020B0604020202020204" pitchFamily="34" charset="0"/>
+            </a:endParaRPr>
+          </a:p>
+          <a:p>
+            <a:endParaRPr lang="en-US" sz="2400" u="sng" dirty="0"/>
+          </a:p>
+          <a:p>
+            <a:endParaRPr lang="en-US" sz="2400" dirty="0"/>
+          </a:p>
+          <a:p>
+            <a:r>
+              <a:rPr lang="en-IN" sz="2800" dirty="0"/>
+              <a:t>	</a:t>
+            </a:r>
+          </a:p>
+        </p:txBody>
+      </p:sp>
+    </p:spTree>
+    <p:extLst>
+      <p:ext uri="{BB962C8B-B14F-4D97-AF65-F5344CB8AC3E}">
+        <p14:creationId xmlns:p14="http://schemas.microsoft.com/office/powerpoint/2010/main" val="1601825883"/>
+      </p:ext>
+    </p:extLst>
+  </p:cSld>
+  <p:clrMapOvr>
+    <a:masterClrMapping/>
+  </p:clrMapOvr>
+</p:sld>
+</file>
+
 <file path=ppt/theme/theme1.xml><?xml version="1.0" encoding="utf-8"?>
 <a:theme xmlns:a="http://schemas.openxmlformats.org/drawingml/2006/main" name="Office Theme">
   <a:themeElements>

</xml_diff>

<commit_message>
Revert "Ppt Modified again by Kuldeepak Gupta 1471"
This reverts commit 3aca02e07720fd1de3cd33e4b6daeb200b858ea6.
</commit_message>
<xml_diff>
--- a/Revert.pptx
+++ b/Revert.pptx
@@ -7,7 +7,6 @@
   <p:sldIdLst>
     <p:sldId id="256" r:id="rId2"/>
     <p:sldId id="259" r:id="rId3"/>
-    <p:sldId id="260" r:id="rId4"/>
   </p:sldIdLst>
   <p:sldSz cx="12192000" cy="6858000"/>
   <p:notesSz cx="6858000" cy="9144000"/>
@@ -6206,1397 +6205,6 @@
 </p:sld>
 </file>
 
-<file path=ppt/slides/slide3.xml><?xml version="1.0" encoding="utf-8"?>
-<p:sld xmlns:a="http://schemas.openxmlformats.org/drawingml/2006/main" xmlns:r="http://schemas.openxmlformats.org/officeDocument/2006/relationships" xmlns:p="http://schemas.openxmlformats.org/presentationml/2006/main">
-  <p:cSld>
-    <p:bg>
-      <p:bgPr>
-        <a:solidFill>
-          <a:schemeClr val="bg1"/>
-        </a:solidFill>
-        <a:effectLst/>
-      </p:bgPr>
-    </p:bg>
-    <p:spTree>
-      <p:nvGrpSpPr>
-        <p:cNvPr id="1" name=""/>
-        <p:cNvGrpSpPr/>
-        <p:nvPr/>
-      </p:nvGrpSpPr>
-      <p:grpSpPr>
-        <a:xfrm>
-          <a:off x="0" y="0"/>
-          <a:ext cx="0" cy="0"/>
-          <a:chOff x="0" y="0"/>
-          <a:chExt cx="0" cy="0"/>
-        </a:xfrm>
-      </p:grpSpPr>
-      <p:sp>
-        <p:nvSpPr>
-          <p:cNvPr id="13" name="Rectangle 7">
-            <a:extLst>
-              <a:ext uri="{FF2B5EF4-FFF2-40B4-BE49-F238E27FC236}">
-                <a16:creationId xmlns:a16="http://schemas.microsoft.com/office/drawing/2014/main" id="{88294908-8B00-4F58-BBBA-20F71A40AA9E}"/>
-              </a:ext>
-              <a:ext uri="{C183D7F6-B498-43B3-948B-1728B52AA6E4}">
-                <adec:decorative xmlns:adec="http://schemas.microsoft.com/office/drawing/2017/decorative" val="1"/>
-              </a:ext>
-            </a:extLst>
-          </p:cNvPr>
-          <p:cNvSpPr>
-            <a:spLocks noGrp="1" noRot="1" noChangeAspect="1" noMove="1" noResize="1" noEditPoints="1" noAdjustHandles="1" noChangeArrowheads="1" noChangeShapeType="1" noTextEdit="1"/>
-          </p:cNvSpPr>
-          <p:nvPr>
-            <p:extLst>
-              <p:ext uri="{386F3935-93C4-4BCD-93E2-E3B085C9AB24}">
-                <p16:designElem xmlns:p16="http://schemas.microsoft.com/office/powerpoint/2015/main" val="1"/>
-              </p:ext>
-            </p:extLst>
-          </p:nvPr>
-        </p:nvSpPr>
-        <p:spPr>
-          <a:xfrm>
-            <a:off x="0" y="0"/>
-            <a:ext cx="12192000" cy="6858000"/>
-          </a:xfrm>
-          <a:prstGeom prst="rect">
-            <a:avLst/>
-          </a:prstGeom>
-          <a:solidFill>
-            <a:schemeClr val="bg2"/>
-          </a:solidFill>
-          <a:ln>
-            <a:noFill/>
-          </a:ln>
-        </p:spPr>
-        <p:style>
-          <a:lnRef idx="2">
-            <a:schemeClr val="accent1">
-              <a:shade val="50000"/>
-            </a:schemeClr>
-          </a:lnRef>
-          <a:fillRef idx="1">
-            <a:schemeClr val="accent1"/>
-          </a:fillRef>
-          <a:effectRef idx="0">
-            <a:schemeClr val="accent1"/>
-          </a:effectRef>
-          <a:fontRef idx="minor">
-            <a:schemeClr val="lt1"/>
-          </a:fontRef>
-        </p:style>
-        <p:txBody>
-          <a:bodyPr rtlCol="0" anchor="ctr"/>
-          <a:lstStyle/>
-          <a:p>
-            <a:pPr algn="ctr"/>
-            <a:endParaRPr lang="en-US" dirty="0"/>
-          </a:p>
-        </p:txBody>
-      </p:sp>
-      <p:sp>
-        <p:nvSpPr>
-          <p:cNvPr id="15" name="Freeform: Shape 9">
-            <a:extLst>
-              <a:ext uri="{FF2B5EF4-FFF2-40B4-BE49-F238E27FC236}">
-                <a16:creationId xmlns:a16="http://schemas.microsoft.com/office/drawing/2014/main" id="{4364C879-1404-4203-8E9D-CC5DE0A621A2}"/>
-              </a:ext>
-              <a:ext uri="{C183D7F6-B498-43B3-948B-1728B52AA6E4}">
-                <adec:decorative xmlns:adec="http://schemas.microsoft.com/office/drawing/2017/decorative" val="1"/>
-              </a:ext>
-            </a:extLst>
-          </p:cNvPr>
-          <p:cNvSpPr>
-            <a:spLocks noGrp="1" noRot="1" noChangeAspect="1" noMove="1" noResize="1" noEditPoints="1" noAdjustHandles="1" noChangeArrowheads="1" noChangeShapeType="1" noTextEdit="1"/>
-          </p:cNvSpPr>
-          <p:nvPr>
-            <p:extLst>
-              <p:ext uri="{386F3935-93C4-4BCD-93E2-E3B085C9AB24}">
-                <p16:designElem xmlns:p16="http://schemas.microsoft.com/office/powerpoint/2015/main" val="1"/>
-              </p:ext>
-            </p:extLst>
-          </p:nvPr>
-        </p:nvSpPr>
-        <p:spPr>
-          <a:xfrm rot="2700000">
-            <a:off x="82782" y="-1386168"/>
-            <a:ext cx="2424873" cy="3611191"/>
-          </a:xfrm>
-          <a:custGeom>
-            <a:avLst/>
-            <a:gdLst>
-              <a:gd name="connsiteX0" fmla="*/ 0 w 2424873"/>
-              <a:gd name="connsiteY0" fmla="*/ 2424874 h 3611191"/>
-              <a:gd name="connsiteX1" fmla="*/ 2424873 w 2424873"/>
-              <a:gd name="connsiteY1" fmla="*/ 0 h 3611191"/>
-              <a:gd name="connsiteX2" fmla="*/ 2424873 w 2424873"/>
-              <a:gd name="connsiteY2" fmla="*/ 3611191 h 3611191"/>
-              <a:gd name="connsiteX3" fmla="*/ 1186317 w 2424873"/>
-              <a:gd name="connsiteY3" fmla="*/ 3611191 h 3611191"/>
-            </a:gdLst>
-            <a:ahLst/>
-            <a:cxnLst>
-              <a:cxn ang="0">
-                <a:pos x="connsiteX0" y="connsiteY0"/>
-              </a:cxn>
-              <a:cxn ang="0">
-                <a:pos x="connsiteX1" y="connsiteY1"/>
-              </a:cxn>
-              <a:cxn ang="0">
-                <a:pos x="connsiteX2" y="connsiteY2"/>
-              </a:cxn>
-              <a:cxn ang="0">
-                <a:pos x="connsiteX3" y="connsiteY3"/>
-              </a:cxn>
-            </a:cxnLst>
-            <a:rect l="l" t="t" r="r" b="b"/>
-            <a:pathLst>
-              <a:path w="2424873" h="3611191">
-                <a:moveTo>
-                  <a:pt x="0" y="2424874"/>
-                </a:moveTo>
-                <a:lnTo>
-                  <a:pt x="2424873" y="0"/>
-                </a:lnTo>
-                <a:lnTo>
-                  <a:pt x="2424873" y="3611191"/>
-                </a:lnTo>
-                <a:lnTo>
-                  <a:pt x="1186317" y="3611191"/>
-                </a:lnTo>
-                <a:close/>
-              </a:path>
-            </a:pathLst>
-          </a:custGeom>
-          <a:solidFill>
-            <a:schemeClr val="accent4">
-              <a:alpha val="40000"/>
-            </a:schemeClr>
-          </a:solidFill>
-          <a:ln>
-            <a:noFill/>
-          </a:ln>
-        </p:spPr>
-        <p:style>
-          <a:lnRef idx="2">
-            <a:schemeClr val="accent1">
-              <a:shade val="50000"/>
-            </a:schemeClr>
-          </a:lnRef>
-          <a:fillRef idx="1">
-            <a:schemeClr val="accent1"/>
-          </a:fillRef>
-          <a:effectRef idx="0">
-            <a:schemeClr val="accent1"/>
-          </a:effectRef>
-          <a:fontRef idx="minor">
-            <a:schemeClr val="lt1"/>
-          </a:fontRef>
-        </p:style>
-        <p:txBody>
-          <a:bodyPr wrap="square" rtlCol="0" anchor="ctr">
-            <a:noAutofit/>
-          </a:bodyPr>
-          <a:lstStyle/>
-          <a:p>
-            <a:pPr algn="ctr"/>
-            <a:endParaRPr lang="en-US"/>
-          </a:p>
-        </p:txBody>
-      </p:sp>
-      <p:sp>
-        <p:nvSpPr>
-          <p:cNvPr id="12" name="Freeform: Shape 11">
-            <a:extLst>
-              <a:ext uri="{FF2B5EF4-FFF2-40B4-BE49-F238E27FC236}">
-                <a16:creationId xmlns:a16="http://schemas.microsoft.com/office/drawing/2014/main" id="{84617302-4B0D-4351-A6BB-6F0930D943AC}"/>
-              </a:ext>
-              <a:ext uri="{C183D7F6-B498-43B3-948B-1728B52AA6E4}">
-                <adec:decorative xmlns:adec="http://schemas.microsoft.com/office/drawing/2017/decorative" val="1"/>
-              </a:ext>
-            </a:extLst>
-          </p:cNvPr>
-          <p:cNvSpPr>
-            <a:spLocks noGrp="1" noRot="1" noChangeAspect="1" noMove="1" noResize="1" noEditPoints="1" noAdjustHandles="1" noChangeArrowheads="1" noChangeShapeType="1" noTextEdit="1"/>
-          </p:cNvSpPr>
-          <p:nvPr>
-            <p:extLst>
-              <p:ext uri="{386F3935-93C4-4BCD-93E2-E3B085C9AB24}">
-                <p16:designElem xmlns:p16="http://schemas.microsoft.com/office/powerpoint/2015/main" val="1"/>
-              </p:ext>
-            </p:extLst>
-          </p:nvPr>
-        </p:nvSpPr>
-        <p:spPr>
-          <a:xfrm rot="2700000">
-            <a:off x="1571000" y="-338582"/>
-            <a:ext cx="1635955" cy="1635955"/>
-          </a:xfrm>
-          <a:custGeom>
-            <a:avLst/>
-            <a:gdLst>
-              <a:gd name="connsiteX0" fmla="*/ 0 w 1635955"/>
-              <a:gd name="connsiteY0" fmla="*/ 957987 h 1635955"/>
-              <a:gd name="connsiteX1" fmla="*/ 957987 w 1635955"/>
-              <a:gd name="connsiteY1" fmla="*/ 0 h 1635955"/>
-              <a:gd name="connsiteX2" fmla="*/ 1635955 w 1635955"/>
-              <a:gd name="connsiteY2" fmla="*/ 0 h 1635955"/>
-              <a:gd name="connsiteX3" fmla="*/ 1635955 w 1635955"/>
-              <a:gd name="connsiteY3" fmla="*/ 1635955 h 1635955"/>
-              <a:gd name="connsiteX4" fmla="*/ 0 w 1635955"/>
-              <a:gd name="connsiteY4" fmla="*/ 1635955 h 1635955"/>
-            </a:gdLst>
-            <a:ahLst/>
-            <a:cxnLst>
-              <a:cxn ang="0">
-                <a:pos x="connsiteX0" y="connsiteY0"/>
-              </a:cxn>
-              <a:cxn ang="0">
-                <a:pos x="connsiteX1" y="connsiteY1"/>
-              </a:cxn>
-              <a:cxn ang="0">
-                <a:pos x="connsiteX2" y="connsiteY2"/>
-              </a:cxn>
-              <a:cxn ang="0">
-                <a:pos x="connsiteX3" y="connsiteY3"/>
-              </a:cxn>
-              <a:cxn ang="0">
-                <a:pos x="connsiteX4" y="connsiteY4"/>
-              </a:cxn>
-            </a:cxnLst>
-            <a:rect l="l" t="t" r="r" b="b"/>
-            <a:pathLst>
-              <a:path w="1635955" h="1635955">
-                <a:moveTo>
-                  <a:pt x="0" y="957987"/>
-                </a:moveTo>
-                <a:lnTo>
-                  <a:pt x="957987" y="0"/>
-                </a:lnTo>
-                <a:lnTo>
-                  <a:pt x="1635955" y="0"/>
-                </a:lnTo>
-                <a:lnTo>
-                  <a:pt x="1635955" y="1635955"/>
-                </a:lnTo>
-                <a:lnTo>
-                  <a:pt x="0" y="1635955"/>
-                </a:lnTo>
-                <a:close/>
-              </a:path>
-            </a:pathLst>
-          </a:custGeom>
-          <a:solidFill>
-            <a:schemeClr val="accent4">
-              <a:alpha val="40000"/>
-            </a:schemeClr>
-          </a:solidFill>
-          <a:ln>
-            <a:noFill/>
-          </a:ln>
-        </p:spPr>
-        <p:style>
-          <a:lnRef idx="2">
-            <a:schemeClr val="accent1">
-              <a:shade val="50000"/>
-            </a:schemeClr>
-          </a:lnRef>
-          <a:fillRef idx="1">
-            <a:schemeClr val="accent1"/>
-          </a:fillRef>
-          <a:effectRef idx="0">
-            <a:schemeClr val="accent1"/>
-          </a:effectRef>
-          <a:fontRef idx="minor">
-            <a:schemeClr val="lt1"/>
-          </a:fontRef>
-        </p:style>
-        <p:txBody>
-          <a:bodyPr wrap="square" rtlCol="0" anchor="ctr">
-            <a:noAutofit/>
-          </a:bodyPr>
-          <a:lstStyle/>
-          <a:p>
-            <a:pPr algn="ctr"/>
-            <a:endParaRPr lang="en-US"/>
-          </a:p>
-        </p:txBody>
-      </p:sp>
-      <p:sp>
-        <p:nvSpPr>
-          <p:cNvPr id="14" name="Freeform: Shape 13">
-            <a:extLst>
-              <a:ext uri="{FF2B5EF4-FFF2-40B4-BE49-F238E27FC236}">
-                <a16:creationId xmlns:a16="http://schemas.microsoft.com/office/drawing/2014/main" id="{DA2C7802-C2E0-4218-8F89-8DD7CCD2CD1C}"/>
-              </a:ext>
-              <a:ext uri="{C183D7F6-B498-43B3-948B-1728B52AA6E4}">
-                <adec:decorative xmlns:adec="http://schemas.microsoft.com/office/drawing/2017/decorative" val="1"/>
-              </a:ext>
-            </a:extLst>
-          </p:cNvPr>
-          <p:cNvSpPr>
-            <a:spLocks noGrp="1" noRot="1" noChangeAspect="1" noMove="1" noResize="1" noEditPoints="1" noAdjustHandles="1" noChangeArrowheads="1" noChangeShapeType="1" noTextEdit="1"/>
-          </p:cNvSpPr>
-          <p:nvPr>
-            <p:extLst>
-              <p:ext uri="{386F3935-93C4-4BCD-93E2-E3B085C9AB24}">
-                <p16:designElem xmlns:p16="http://schemas.microsoft.com/office/powerpoint/2015/main" val="1"/>
-              </p:ext>
-            </p:extLst>
-          </p:nvPr>
-        </p:nvSpPr>
-        <p:spPr>
-          <a:xfrm rot="2700000">
-            <a:off x="9627985" y="-6588"/>
-            <a:ext cx="4059393" cy="2548110"/>
-          </a:xfrm>
-          <a:custGeom>
-            <a:avLst/>
-            <a:gdLst>
-              <a:gd name="connsiteX0" fmla="*/ 0 w 4059393"/>
-              <a:gd name="connsiteY0" fmla="*/ 1511282 h 2548110"/>
-              <a:gd name="connsiteX1" fmla="*/ 1511282 w 4059393"/>
-              <a:gd name="connsiteY1" fmla="*/ 0 h 2548110"/>
-              <a:gd name="connsiteX2" fmla="*/ 4059393 w 4059393"/>
-              <a:gd name="connsiteY2" fmla="*/ 2548110 h 2548110"/>
-              <a:gd name="connsiteX3" fmla="*/ 0 w 4059393"/>
-              <a:gd name="connsiteY3" fmla="*/ 2548110 h 2548110"/>
-            </a:gdLst>
-            <a:ahLst/>
-            <a:cxnLst>
-              <a:cxn ang="0">
-                <a:pos x="connsiteX0" y="connsiteY0"/>
-              </a:cxn>
-              <a:cxn ang="0">
-                <a:pos x="connsiteX1" y="connsiteY1"/>
-              </a:cxn>
-              <a:cxn ang="0">
-                <a:pos x="connsiteX2" y="connsiteY2"/>
-              </a:cxn>
-              <a:cxn ang="0">
-                <a:pos x="connsiteX3" y="connsiteY3"/>
-              </a:cxn>
-            </a:cxnLst>
-            <a:rect l="l" t="t" r="r" b="b"/>
-            <a:pathLst>
-              <a:path w="4059393" h="2548110">
-                <a:moveTo>
-                  <a:pt x="0" y="1511282"/>
-                </a:moveTo>
-                <a:lnTo>
-                  <a:pt x="1511282" y="0"/>
-                </a:lnTo>
-                <a:lnTo>
-                  <a:pt x="4059393" y="2548110"/>
-                </a:lnTo>
-                <a:lnTo>
-                  <a:pt x="0" y="2548110"/>
-                </a:lnTo>
-                <a:close/>
-              </a:path>
-            </a:pathLst>
-          </a:custGeom>
-          <a:solidFill>
-            <a:schemeClr val="accent1">
-              <a:alpha val="30000"/>
-            </a:schemeClr>
-          </a:solidFill>
-          <a:ln>
-            <a:noFill/>
-          </a:ln>
-        </p:spPr>
-        <p:style>
-          <a:lnRef idx="2">
-            <a:schemeClr val="accent1">
-              <a:shade val="50000"/>
-            </a:schemeClr>
-          </a:lnRef>
-          <a:fillRef idx="1">
-            <a:schemeClr val="accent1"/>
-          </a:fillRef>
-          <a:effectRef idx="0">
-            <a:schemeClr val="accent1"/>
-          </a:effectRef>
-          <a:fontRef idx="minor">
-            <a:schemeClr val="lt1"/>
-          </a:fontRef>
-        </p:style>
-        <p:txBody>
-          <a:bodyPr wrap="square" rtlCol="0" anchor="ctr">
-            <a:noAutofit/>
-          </a:bodyPr>
-          <a:lstStyle/>
-          <a:p>
-            <a:pPr algn="ctr"/>
-            <a:endParaRPr lang="en-US"/>
-          </a:p>
-        </p:txBody>
-      </p:sp>
-      <p:sp>
-        <p:nvSpPr>
-          <p:cNvPr id="16" name="Rectangle 15">
-            <a:extLst>
-              <a:ext uri="{FF2B5EF4-FFF2-40B4-BE49-F238E27FC236}">
-                <a16:creationId xmlns:a16="http://schemas.microsoft.com/office/drawing/2014/main" id="{A6D7111A-21E5-4EE9-8A78-10E5530F0116}"/>
-              </a:ext>
-              <a:ext uri="{C183D7F6-B498-43B3-948B-1728B52AA6E4}">
-                <adec:decorative xmlns:adec="http://schemas.microsoft.com/office/drawing/2017/decorative" val="1"/>
-              </a:ext>
-            </a:extLst>
-          </p:cNvPr>
-          <p:cNvSpPr>
-            <a:spLocks noGrp="1" noRot="1" noChangeAspect="1" noMove="1" noResize="1" noEditPoints="1" noAdjustHandles="1" noChangeArrowheads="1" noChangeShapeType="1" noTextEdit="1"/>
-          </p:cNvSpPr>
-          <p:nvPr>
-            <p:extLst>
-              <p:ext uri="{386F3935-93C4-4BCD-93E2-E3B085C9AB24}">
-                <p16:designElem xmlns:p16="http://schemas.microsoft.com/office/powerpoint/2015/main" val="1"/>
-              </p:ext>
-            </p:extLst>
-          </p:nvPr>
-        </p:nvSpPr>
-        <p:spPr>
-          <a:xfrm rot="2700000">
-            <a:off x="10262924" y="1465780"/>
-            <a:ext cx="1185708" cy="1185708"/>
-          </a:xfrm>
-          <a:prstGeom prst="rect">
-            <a:avLst/>
-          </a:prstGeom>
-          <a:solidFill>
-            <a:schemeClr val="accent1">
-              <a:alpha val="30000"/>
-            </a:schemeClr>
-          </a:solidFill>
-          <a:ln>
-            <a:noFill/>
-          </a:ln>
-        </p:spPr>
-        <p:style>
-          <a:lnRef idx="2">
-            <a:schemeClr val="accent1">
-              <a:shade val="50000"/>
-            </a:schemeClr>
-          </a:lnRef>
-          <a:fillRef idx="1">
-            <a:schemeClr val="accent1"/>
-          </a:fillRef>
-          <a:effectRef idx="0">
-            <a:schemeClr val="accent1"/>
-          </a:effectRef>
-          <a:fontRef idx="minor">
-            <a:schemeClr val="lt1"/>
-          </a:fontRef>
-        </p:style>
-        <p:txBody>
-          <a:bodyPr wrap="square" rtlCol="0" anchor="ctr">
-            <a:noAutofit/>
-          </a:bodyPr>
-          <a:lstStyle/>
-          <a:p>
-            <a:pPr algn="ctr"/>
-            <a:endParaRPr lang="en-US"/>
-          </a:p>
-        </p:txBody>
-      </p:sp>
-      <p:sp>
-        <p:nvSpPr>
-          <p:cNvPr id="18" name="Freeform: Shape 17">
-            <a:extLst>
-              <a:ext uri="{FF2B5EF4-FFF2-40B4-BE49-F238E27FC236}">
-                <a16:creationId xmlns:a16="http://schemas.microsoft.com/office/drawing/2014/main" id="{A3969E80-A77B-49FC-9122-D89AFD5EE118}"/>
-              </a:ext>
-              <a:ext uri="{C183D7F6-B498-43B3-948B-1728B52AA6E4}">
-                <adec:decorative xmlns:adec="http://schemas.microsoft.com/office/drawing/2017/decorative" val="1"/>
-              </a:ext>
-            </a:extLst>
-          </p:cNvPr>
-          <p:cNvSpPr>
-            <a:spLocks noGrp="1" noRot="1" noChangeAspect="1" noMove="1" noResize="1" noEditPoints="1" noAdjustHandles="1" noChangeArrowheads="1" noChangeShapeType="1" noTextEdit="1"/>
-          </p:cNvSpPr>
-          <p:nvPr>
-            <p:extLst>
-              <p:ext uri="{386F3935-93C4-4BCD-93E2-E3B085C9AB24}">
-                <p16:designElem xmlns:p16="http://schemas.microsoft.com/office/powerpoint/2015/main" val="1"/>
-              </p:ext>
-            </p:extLst>
-          </p:nvPr>
-        </p:nvSpPr>
-        <p:spPr>
-          <a:xfrm rot="2700000">
-            <a:off x="-29557" y="5198743"/>
-            <a:ext cx="2444907" cy="2366116"/>
-          </a:xfrm>
-          <a:custGeom>
-            <a:avLst/>
-            <a:gdLst>
-              <a:gd name="connsiteX0" fmla="*/ 0 w 2203753"/>
-              <a:gd name="connsiteY0" fmla="*/ 0 h 2132734"/>
-              <a:gd name="connsiteX1" fmla="*/ 2203753 w 2203753"/>
-              <a:gd name="connsiteY1" fmla="*/ 0 h 2132734"/>
-              <a:gd name="connsiteX2" fmla="*/ 2203753 w 2203753"/>
-              <a:gd name="connsiteY2" fmla="*/ 576461 h 2132734"/>
-              <a:gd name="connsiteX3" fmla="*/ 647480 w 2203753"/>
-              <a:gd name="connsiteY3" fmla="*/ 2132734 h 2132734"/>
-              <a:gd name="connsiteX4" fmla="*/ 0 w 2203753"/>
-              <a:gd name="connsiteY4" fmla="*/ 1485255 h 2132734"/>
-            </a:gdLst>
-            <a:ahLst/>
-            <a:cxnLst>
-              <a:cxn ang="0">
-                <a:pos x="connsiteX0" y="connsiteY0"/>
-              </a:cxn>
-              <a:cxn ang="0">
-                <a:pos x="connsiteX1" y="connsiteY1"/>
-              </a:cxn>
-              <a:cxn ang="0">
-                <a:pos x="connsiteX2" y="connsiteY2"/>
-              </a:cxn>
-              <a:cxn ang="0">
-                <a:pos x="connsiteX3" y="connsiteY3"/>
-              </a:cxn>
-              <a:cxn ang="0">
-                <a:pos x="connsiteX4" y="connsiteY4"/>
-              </a:cxn>
-            </a:cxnLst>
-            <a:rect l="l" t="t" r="r" b="b"/>
-            <a:pathLst>
-              <a:path w="2203753" h="2132734">
-                <a:moveTo>
-                  <a:pt x="0" y="0"/>
-                </a:moveTo>
-                <a:lnTo>
-                  <a:pt x="2203753" y="0"/>
-                </a:lnTo>
-                <a:lnTo>
-                  <a:pt x="2203753" y="576461"/>
-                </a:lnTo>
-                <a:lnTo>
-                  <a:pt x="647480" y="2132734"/>
-                </a:lnTo>
-                <a:lnTo>
-                  <a:pt x="0" y="1485255"/>
-                </a:lnTo>
-                <a:close/>
-              </a:path>
-            </a:pathLst>
-          </a:custGeom>
-          <a:solidFill>
-            <a:schemeClr val="accent1">
-              <a:alpha val="30000"/>
-            </a:schemeClr>
-          </a:solidFill>
-          <a:ln>
-            <a:noFill/>
-          </a:ln>
-        </p:spPr>
-        <p:style>
-          <a:lnRef idx="2">
-            <a:schemeClr val="accent1">
-              <a:shade val="50000"/>
-            </a:schemeClr>
-          </a:lnRef>
-          <a:fillRef idx="1">
-            <a:schemeClr val="accent1"/>
-          </a:fillRef>
-          <a:effectRef idx="0">
-            <a:schemeClr val="accent1"/>
-          </a:effectRef>
-          <a:fontRef idx="minor">
-            <a:schemeClr val="lt1"/>
-          </a:fontRef>
-        </p:style>
-        <p:txBody>
-          <a:bodyPr wrap="square" rtlCol="0" anchor="ctr">
-            <a:noAutofit/>
-          </a:bodyPr>
-          <a:lstStyle/>
-          <a:p>
-            <a:pPr algn="ctr"/>
-            <a:endParaRPr lang="en-US"/>
-          </a:p>
-        </p:txBody>
-      </p:sp>
-      <p:sp>
-        <p:nvSpPr>
-          <p:cNvPr id="20" name="Rectangle 19">
-            <a:extLst>
-              <a:ext uri="{FF2B5EF4-FFF2-40B4-BE49-F238E27FC236}">
-                <a16:creationId xmlns:a16="http://schemas.microsoft.com/office/drawing/2014/main" id="{1849CA57-76BD-4CF2-80BA-D7A46A01B7B1}"/>
-              </a:ext>
-              <a:ext uri="{C183D7F6-B498-43B3-948B-1728B52AA6E4}">
-                <adec:decorative xmlns:adec="http://schemas.microsoft.com/office/drawing/2017/decorative" val="1"/>
-              </a:ext>
-            </a:extLst>
-          </p:cNvPr>
-          <p:cNvSpPr>
-            <a:spLocks noGrp="1" noRot="1" noChangeAspect="1" noMove="1" noResize="1" noEditPoints="1" noAdjustHandles="1" noChangeArrowheads="1" noChangeShapeType="1" noTextEdit="1"/>
-          </p:cNvSpPr>
-          <p:nvPr>
-            <p:extLst>
-              <p:ext uri="{386F3935-93C4-4BCD-93E2-E3B085C9AB24}">
-                <p16:designElem xmlns:p16="http://schemas.microsoft.com/office/powerpoint/2015/main" val="1"/>
-              </p:ext>
-            </p:extLst>
-          </p:nvPr>
-        </p:nvSpPr>
-        <p:spPr>
-          <a:xfrm rot="2700000">
-            <a:off x="1769787" y="5439893"/>
-            <a:ext cx="928467" cy="928467"/>
-          </a:xfrm>
-          <a:prstGeom prst="rect">
-            <a:avLst/>
-          </a:prstGeom>
-          <a:solidFill>
-            <a:schemeClr val="accent1">
-              <a:alpha val="30000"/>
-            </a:schemeClr>
-          </a:solidFill>
-          <a:ln>
-            <a:noFill/>
-          </a:ln>
-        </p:spPr>
-        <p:style>
-          <a:lnRef idx="2">
-            <a:schemeClr val="accent1">
-              <a:shade val="50000"/>
-            </a:schemeClr>
-          </a:lnRef>
-          <a:fillRef idx="1">
-            <a:schemeClr val="accent1"/>
-          </a:fillRef>
-          <a:effectRef idx="0">
-            <a:schemeClr val="accent1"/>
-          </a:effectRef>
-          <a:fontRef idx="minor">
-            <a:schemeClr val="lt1"/>
-          </a:fontRef>
-        </p:style>
-        <p:txBody>
-          <a:bodyPr wrap="square" rtlCol="0" anchor="ctr">
-            <a:noAutofit/>
-          </a:bodyPr>
-          <a:lstStyle/>
-          <a:p>
-            <a:pPr algn="ctr"/>
-            <a:endParaRPr lang="en-US">
-              <a:solidFill>
-                <a:srgbClr val="FFFFFF"/>
-              </a:solidFill>
-              <a:effectLst>
-                <a:outerShdw blurRad="38100" dist="38100" dir="2700000" algn="tl">
-                  <a:srgbClr val="000000">
-                    <a:alpha val="43137"/>
-                  </a:srgbClr>
-                </a:outerShdw>
-              </a:effectLst>
-            </a:endParaRPr>
-          </a:p>
-        </p:txBody>
-      </p:sp>
-      <p:sp>
-        <p:nvSpPr>
-          <p:cNvPr id="22" name="Freeform: Shape 21">
-            <a:extLst>
-              <a:ext uri="{FF2B5EF4-FFF2-40B4-BE49-F238E27FC236}">
-                <a16:creationId xmlns:a16="http://schemas.microsoft.com/office/drawing/2014/main" id="{35E9085E-E730-4768-83D4-6CB7E9897153}"/>
-              </a:ext>
-              <a:ext uri="{C183D7F6-B498-43B3-948B-1728B52AA6E4}">
-                <adec:decorative xmlns:adec="http://schemas.microsoft.com/office/drawing/2017/decorative" val="1"/>
-              </a:ext>
-            </a:extLst>
-          </p:cNvPr>
-          <p:cNvSpPr>
-            <a:spLocks noGrp="1" noRot="1" noChangeAspect="1" noMove="1" noResize="1" noEditPoints="1" noAdjustHandles="1" noChangeArrowheads="1" noChangeShapeType="1" noTextEdit="1"/>
-          </p:cNvSpPr>
-          <p:nvPr>
-            <p:extLst>
-              <p:ext uri="{386F3935-93C4-4BCD-93E2-E3B085C9AB24}">
-                <p16:designElem xmlns:p16="http://schemas.microsoft.com/office/powerpoint/2015/main" val="1"/>
-              </p:ext>
-            </p:extLst>
-          </p:nvPr>
-        </p:nvSpPr>
-        <p:spPr>
-          <a:xfrm rot="2700000">
-            <a:off x="3401311" y="734311"/>
-            <a:ext cx="5389379" cy="5389379"/>
-          </a:xfrm>
-          <a:custGeom>
-            <a:avLst/>
-            <a:gdLst>
-              <a:gd name="connsiteX0" fmla="*/ 0 w 5389379"/>
-              <a:gd name="connsiteY0" fmla="*/ 540040 h 5389379"/>
-              <a:gd name="connsiteX1" fmla="*/ 540040 w 5389379"/>
-              <a:gd name="connsiteY1" fmla="*/ 0 h 5389379"/>
-              <a:gd name="connsiteX2" fmla="*/ 5389379 w 5389379"/>
-              <a:gd name="connsiteY2" fmla="*/ 0 h 5389379"/>
-              <a:gd name="connsiteX3" fmla="*/ 5389379 w 5389379"/>
-              <a:gd name="connsiteY3" fmla="*/ 4838655 h 5389379"/>
-              <a:gd name="connsiteX4" fmla="*/ 4838655 w 5389379"/>
-              <a:gd name="connsiteY4" fmla="*/ 5389379 h 5389379"/>
-              <a:gd name="connsiteX5" fmla="*/ 0 w 5389379"/>
-              <a:gd name="connsiteY5" fmla="*/ 5389379 h 5389379"/>
-            </a:gdLst>
-            <a:ahLst/>
-            <a:cxnLst>
-              <a:cxn ang="0">
-                <a:pos x="connsiteX0" y="connsiteY0"/>
-              </a:cxn>
-              <a:cxn ang="0">
-                <a:pos x="connsiteX1" y="connsiteY1"/>
-              </a:cxn>
-              <a:cxn ang="0">
-                <a:pos x="connsiteX2" y="connsiteY2"/>
-              </a:cxn>
-              <a:cxn ang="0">
-                <a:pos x="connsiteX3" y="connsiteY3"/>
-              </a:cxn>
-              <a:cxn ang="0">
-                <a:pos x="connsiteX4" y="connsiteY4"/>
-              </a:cxn>
-              <a:cxn ang="0">
-                <a:pos x="connsiteX5" y="connsiteY5"/>
-              </a:cxn>
-            </a:cxnLst>
-            <a:rect l="l" t="t" r="r" b="b"/>
-            <a:pathLst>
-              <a:path w="5389379" h="5389379">
-                <a:moveTo>
-                  <a:pt x="0" y="540040"/>
-                </a:moveTo>
-                <a:lnTo>
-                  <a:pt x="540040" y="0"/>
-                </a:lnTo>
-                <a:lnTo>
-                  <a:pt x="5389379" y="0"/>
-                </a:lnTo>
-                <a:lnTo>
-                  <a:pt x="5389379" y="4838655"/>
-                </a:lnTo>
-                <a:lnTo>
-                  <a:pt x="4838655" y="5389379"/>
-                </a:lnTo>
-                <a:lnTo>
-                  <a:pt x="0" y="5389379"/>
-                </a:lnTo>
-                <a:close/>
-              </a:path>
-            </a:pathLst>
-          </a:custGeom>
-          <a:solidFill>
-            <a:srgbClr val="FFFFFF"/>
-          </a:solidFill>
-          <a:ln>
-            <a:noFill/>
-          </a:ln>
-        </p:spPr>
-        <p:style>
-          <a:lnRef idx="2">
-            <a:schemeClr val="accent1">
-              <a:shade val="50000"/>
-            </a:schemeClr>
-          </a:lnRef>
-          <a:fillRef idx="1">
-            <a:schemeClr val="accent1"/>
-          </a:fillRef>
-          <a:effectRef idx="0">
-            <a:schemeClr val="accent1"/>
-          </a:effectRef>
-          <a:fontRef idx="minor">
-            <a:schemeClr val="lt1"/>
-          </a:fontRef>
-        </p:style>
-        <p:txBody>
-          <a:bodyPr wrap="square" rtlCol="0" anchor="ctr">
-            <a:noAutofit/>
-          </a:bodyPr>
-          <a:lstStyle/>
-          <a:p>
-            <a:pPr algn="ctr"/>
-            <a:endParaRPr lang="en-US"/>
-          </a:p>
-        </p:txBody>
-      </p:sp>
-      <p:sp>
-        <p:nvSpPr>
-          <p:cNvPr id="24" name="Freeform: Shape 23">
-            <a:extLst>
-              <a:ext uri="{FF2B5EF4-FFF2-40B4-BE49-F238E27FC236}">
-                <a16:creationId xmlns:a16="http://schemas.microsoft.com/office/drawing/2014/main" id="{973272FE-A474-4CAE-8CA2-BCC8B476C3F4}"/>
-              </a:ext>
-              <a:ext uri="{C183D7F6-B498-43B3-948B-1728B52AA6E4}">
-                <adec:decorative xmlns:adec="http://schemas.microsoft.com/office/drawing/2017/decorative" val="1"/>
-              </a:ext>
-            </a:extLst>
-          </p:cNvPr>
-          <p:cNvSpPr>
-            <a:spLocks noGrp="1" noRot="1" noChangeAspect="1" noMove="1" noResize="1" noEditPoints="1" noAdjustHandles="1" noChangeArrowheads="1" noChangeShapeType="1" noTextEdit="1"/>
-          </p:cNvSpPr>
-          <p:nvPr>
-            <p:extLst>
-              <p:ext uri="{386F3935-93C4-4BCD-93E2-E3B085C9AB24}">
-                <p16:designElem xmlns:p16="http://schemas.microsoft.com/office/powerpoint/2015/main" val="1"/>
-              </p:ext>
-            </p:extLst>
-          </p:nvPr>
-        </p:nvSpPr>
-        <p:spPr>
-          <a:xfrm rot="2700000">
-            <a:off x="2700283" y="33283"/>
-            <a:ext cx="6791435" cy="6791435"/>
-          </a:xfrm>
-          <a:custGeom>
-            <a:avLst/>
-            <a:gdLst>
-              <a:gd name="connsiteX0" fmla="*/ 1860938 w 6791435"/>
-              <a:gd name="connsiteY0" fmla="*/ 81158 h 6791435"/>
-              <a:gd name="connsiteX1" fmla="*/ 1942096 w 6791435"/>
-              <a:gd name="connsiteY1" fmla="*/ 0 h 6791435"/>
-              <a:gd name="connsiteX2" fmla="*/ 6791435 w 6791435"/>
-              <a:gd name="connsiteY2" fmla="*/ 0 h 6791435"/>
-              <a:gd name="connsiteX3" fmla="*/ 6791435 w 6791435"/>
-              <a:gd name="connsiteY3" fmla="*/ 4838655 h 6791435"/>
-              <a:gd name="connsiteX4" fmla="*/ 6710277 w 6791435"/>
-              <a:gd name="connsiteY4" fmla="*/ 4919813 h 6791435"/>
-              <a:gd name="connsiteX5" fmla="*/ 6710277 w 6791435"/>
-              <a:gd name="connsiteY5" fmla="*/ 81158 h 6791435"/>
-              <a:gd name="connsiteX6" fmla="*/ 0 w 6791435"/>
-              <a:gd name="connsiteY6" fmla="*/ 1942096 h 6791435"/>
-              <a:gd name="connsiteX7" fmla="*/ 81158 w 6791435"/>
-              <a:gd name="connsiteY7" fmla="*/ 1860938 h 6791435"/>
-              <a:gd name="connsiteX8" fmla="*/ 81158 w 6791435"/>
-              <a:gd name="connsiteY8" fmla="*/ 6710277 h 6791435"/>
-              <a:gd name="connsiteX9" fmla="*/ 4919813 w 6791435"/>
-              <a:gd name="connsiteY9" fmla="*/ 6710277 h 6791435"/>
-              <a:gd name="connsiteX10" fmla="*/ 4838655 w 6791435"/>
-              <a:gd name="connsiteY10" fmla="*/ 6791435 h 6791435"/>
-              <a:gd name="connsiteX11" fmla="*/ 0 w 6791435"/>
-              <a:gd name="connsiteY11" fmla="*/ 6791435 h 6791435"/>
-            </a:gdLst>
-            <a:ahLst/>
-            <a:cxnLst>
-              <a:cxn ang="0">
-                <a:pos x="connsiteX0" y="connsiteY0"/>
-              </a:cxn>
-              <a:cxn ang="0">
-                <a:pos x="connsiteX1" y="connsiteY1"/>
-              </a:cxn>
-              <a:cxn ang="0">
-                <a:pos x="connsiteX2" y="connsiteY2"/>
-              </a:cxn>
-              <a:cxn ang="0">
-                <a:pos x="connsiteX3" y="connsiteY3"/>
-              </a:cxn>
-              <a:cxn ang="0">
-                <a:pos x="connsiteX4" y="connsiteY4"/>
-              </a:cxn>
-              <a:cxn ang="0">
-                <a:pos x="connsiteX5" y="connsiteY5"/>
-              </a:cxn>
-              <a:cxn ang="0">
-                <a:pos x="connsiteX6" y="connsiteY6"/>
-              </a:cxn>
-              <a:cxn ang="0">
-                <a:pos x="connsiteX7" y="connsiteY7"/>
-              </a:cxn>
-              <a:cxn ang="0">
-                <a:pos x="connsiteX8" y="connsiteY8"/>
-              </a:cxn>
-              <a:cxn ang="0">
-                <a:pos x="connsiteX9" y="connsiteY9"/>
-              </a:cxn>
-              <a:cxn ang="0">
-                <a:pos x="connsiteX10" y="connsiteY10"/>
-              </a:cxn>
-              <a:cxn ang="0">
-                <a:pos x="connsiteX11" y="connsiteY11"/>
-              </a:cxn>
-            </a:cxnLst>
-            <a:rect l="l" t="t" r="r" b="b"/>
-            <a:pathLst>
-              <a:path w="6791435" h="6791435">
-                <a:moveTo>
-                  <a:pt x="1860938" y="81158"/>
-                </a:moveTo>
-                <a:lnTo>
-                  <a:pt x="1942096" y="0"/>
-                </a:lnTo>
-                <a:lnTo>
-                  <a:pt x="6791435" y="0"/>
-                </a:lnTo>
-                <a:lnTo>
-                  <a:pt x="6791435" y="4838655"/>
-                </a:lnTo>
-                <a:lnTo>
-                  <a:pt x="6710277" y="4919813"/>
-                </a:lnTo>
-                <a:lnTo>
-                  <a:pt x="6710277" y="81158"/>
-                </a:lnTo>
-                <a:close/>
-                <a:moveTo>
-                  <a:pt x="0" y="1942096"/>
-                </a:moveTo>
-                <a:lnTo>
-                  <a:pt x="81158" y="1860938"/>
-                </a:lnTo>
-                <a:lnTo>
-                  <a:pt x="81158" y="6710277"/>
-                </a:lnTo>
-                <a:lnTo>
-                  <a:pt x="4919813" y="6710277"/>
-                </a:lnTo>
-                <a:lnTo>
-                  <a:pt x="4838655" y="6791435"/>
-                </a:lnTo>
-                <a:lnTo>
-                  <a:pt x="0" y="6791435"/>
-                </a:lnTo>
-                <a:close/>
-              </a:path>
-            </a:pathLst>
-          </a:custGeom>
-          <a:solidFill>
-            <a:srgbClr val="FFFFFF">
-              <a:alpha val="60000"/>
-            </a:srgbClr>
-          </a:solidFill>
-          <a:ln>
-            <a:noFill/>
-          </a:ln>
-        </p:spPr>
-        <p:style>
-          <a:lnRef idx="2">
-            <a:schemeClr val="accent1">
-              <a:shade val="50000"/>
-            </a:schemeClr>
-          </a:lnRef>
-          <a:fillRef idx="1">
-            <a:schemeClr val="accent1"/>
-          </a:fillRef>
-          <a:effectRef idx="0">
-            <a:schemeClr val="accent1"/>
-          </a:effectRef>
-          <a:fontRef idx="minor">
-            <a:schemeClr val="lt1"/>
-          </a:fontRef>
-        </p:style>
-        <p:txBody>
-          <a:bodyPr wrap="square" rtlCol="0" anchor="ctr">
-            <a:noAutofit/>
-          </a:bodyPr>
-          <a:lstStyle/>
-          <a:p>
-            <a:pPr algn="ctr"/>
-            <a:endParaRPr lang="en-US">
-              <a:solidFill>
-                <a:schemeClr val="tx1"/>
-              </a:solidFill>
-            </a:endParaRPr>
-          </a:p>
-        </p:txBody>
-      </p:sp>
-      <p:sp>
-        <p:nvSpPr>
-          <p:cNvPr id="26" name="Freeform: Shape 25">
-            <a:extLst>
-              <a:ext uri="{FF2B5EF4-FFF2-40B4-BE49-F238E27FC236}">
-                <a16:creationId xmlns:a16="http://schemas.microsoft.com/office/drawing/2014/main" id="{E07981EA-05A6-437C-88D7-B377B92B031D}"/>
-              </a:ext>
-              <a:ext uri="{C183D7F6-B498-43B3-948B-1728B52AA6E4}">
-                <adec:decorative xmlns:adec="http://schemas.microsoft.com/office/drawing/2017/decorative" val="1"/>
-              </a:ext>
-            </a:extLst>
-          </p:cNvPr>
-          <p:cNvSpPr>
-            <a:spLocks noGrp="1" noRot="1" noChangeAspect="1" noMove="1" noResize="1" noEditPoints="1" noAdjustHandles="1" noChangeArrowheads="1" noChangeShapeType="1" noTextEdit="1"/>
-          </p:cNvSpPr>
-          <p:nvPr>
-            <p:extLst>
-              <p:ext uri="{386F3935-93C4-4BCD-93E2-E3B085C9AB24}">
-                <p16:designElem xmlns:p16="http://schemas.microsoft.com/office/powerpoint/2015/main" val="1"/>
-              </p:ext>
-            </p:extLst>
-          </p:nvPr>
-        </p:nvSpPr>
-        <p:spPr>
-          <a:xfrm rot="2700000">
-            <a:off x="9629823" y="5457591"/>
-            <a:ext cx="2231794" cy="2568811"/>
-          </a:xfrm>
-          <a:custGeom>
-            <a:avLst/>
-            <a:gdLst>
-              <a:gd name="connsiteX0" fmla="*/ 0 w 2940086"/>
-              <a:gd name="connsiteY0" fmla="*/ 0 h 3384061"/>
-              <a:gd name="connsiteX1" fmla="*/ 2496112 w 2940086"/>
-              <a:gd name="connsiteY1" fmla="*/ 0 h 3384061"/>
-              <a:gd name="connsiteX2" fmla="*/ 2940086 w 2940086"/>
-              <a:gd name="connsiteY2" fmla="*/ 443975 h 3384061"/>
-              <a:gd name="connsiteX3" fmla="*/ 0 w 2940086"/>
-              <a:gd name="connsiteY3" fmla="*/ 3384061 h 3384061"/>
-            </a:gdLst>
-            <a:ahLst/>
-            <a:cxnLst>
-              <a:cxn ang="0">
-                <a:pos x="connsiteX0" y="connsiteY0"/>
-              </a:cxn>
-              <a:cxn ang="0">
-                <a:pos x="connsiteX1" y="connsiteY1"/>
-              </a:cxn>
-              <a:cxn ang="0">
-                <a:pos x="connsiteX2" y="connsiteY2"/>
-              </a:cxn>
-              <a:cxn ang="0">
-                <a:pos x="connsiteX3" y="connsiteY3"/>
-              </a:cxn>
-            </a:cxnLst>
-            <a:rect l="l" t="t" r="r" b="b"/>
-            <a:pathLst>
-              <a:path w="2940086" h="3384061">
-                <a:moveTo>
-                  <a:pt x="0" y="0"/>
-                </a:moveTo>
-                <a:lnTo>
-                  <a:pt x="2496112" y="0"/>
-                </a:lnTo>
-                <a:lnTo>
-                  <a:pt x="2940086" y="443975"/>
-                </a:lnTo>
-                <a:lnTo>
-                  <a:pt x="0" y="3384061"/>
-                </a:lnTo>
-                <a:close/>
-              </a:path>
-            </a:pathLst>
-          </a:custGeom>
-          <a:solidFill>
-            <a:schemeClr val="accent4">
-              <a:alpha val="40000"/>
-            </a:schemeClr>
-          </a:solidFill>
-          <a:ln>
-            <a:noFill/>
-          </a:ln>
-        </p:spPr>
-        <p:style>
-          <a:lnRef idx="2">
-            <a:schemeClr val="accent1">
-              <a:shade val="50000"/>
-            </a:schemeClr>
-          </a:lnRef>
-          <a:fillRef idx="1">
-            <a:schemeClr val="accent1"/>
-          </a:fillRef>
-          <a:effectRef idx="0">
-            <a:schemeClr val="accent1"/>
-          </a:effectRef>
-          <a:fontRef idx="minor">
-            <a:schemeClr val="lt1"/>
-          </a:fontRef>
-        </p:style>
-        <p:txBody>
-          <a:bodyPr wrap="square" rtlCol="0" anchor="ctr">
-            <a:noAutofit/>
-          </a:bodyPr>
-          <a:lstStyle/>
-          <a:p>
-            <a:pPr algn="ctr"/>
-            <a:endParaRPr lang="en-US"/>
-          </a:p>
-        </p:txBody>
-      </p:sp>
-      <p:sp>
-        <p:nvSpPr>
-          <p:cNvPr id="28" name="Rectangle 27">
-            <a:extLst>
-              <a:ext uri="{FF2B5EF4-FFF2-40B4-BE49-F238E27FC236}">
-                <a16:creationId xmlns:a16="http://schemas.microsoft.com/office/drawing/2014/main" id="{15E3C750-986E-4769-B1AE-49289FBEE757}"/>
-              </a:ext>
-              <a:ext uri="{C183D7F6-B498-43B3-948B-1728B52AA6E4}">
-                <adec:decorative xmlns:adec="http://schemas.microsoft.com/office/drawing/2017/decorative" val="1"/>
-              </a:ext>
-            </a:extLst>
-          </p:cNvPr>
-          <p:cNvSpPr>
-            <a:spLocks noGrp="1" noRot="1" noChangeAspect="1" noMove="1" noResize="1" noEditPoints="1" noAdjustHandles="1" noChangeArrowheads="1" noChangeShapeType="1" noTextEdit="1"/>
-          </p:cNvSpPr>
-          <p:nvPr>
-            <p:extLst>
-              <p:ext uri="{386F3935-93C4-4BCD-93E2-E3B085C9AB24}">
-                <p16:designElem xmlns:p16="http://schemas.microsoft.com/office/powerpoint/2015/main" val="1"/>
-              </p:ext>
-            </p:extLst>
-          </p:nvPr>
-        </p:nvSpPr>
-        <p:spPr>
-          <a:xfrm rot="2700000">
-            <a:off x="9720059" y="5243545"/>
-            <a:ext cx="959985" cy="959985"/>
-          </a:xfrm>
-          <a:prstGeom prst="rect">
-            <a:avLst/>
-          </a:prstGeom>
-          <a:solidFill>
-            <a:schemeClr val="accent4">
-              <a:alpha val="40000"/>
-            </a:schemeClr>
-          </a:solidFill>
-          <a:ln>
-            <a:noFill/>
-          </a:ln>
-        </p:spPr>
-        <p:style>
-          <a:lnRef idx="2">
-            <a:schemeClr val="accent1">
-              <a:shade val="50000"/>
-            </a:schemeClr>
-          </a:lnRef>
-          <a:fillRef idx="1">
-            <a:schemeClr val="accent1"/>
-          </a:fillRef>
-          <a:effectRef idx="0">
-            <a:schemeClr val="accent1"/>
-          </a:effectRef>
-          <a:fontRef idx="minor">
-            <a:schemeClr val="lt1"/>
-          </a:fontRef>
-        </p:style>
-        <p:txBody>
-          <a:bodyPr wrap="square" rtlCol="0" anchor="ctr">
-            <a:noAutofit/>
-          </a:bodyPr>
-          <a:lstStyle/>
-          <a:p>
-            <a:pPr algn="ctr"/>
-            <a:endParaRPr lang="en-US"/>
-          </a:p>
-        </p:txBody>
-      </p:sp>
-      <p:sp>
-        <p:nvSpPr>
-          <p:cNvPr id="17" name="TextBox 16">
-            <a:extLst>
-              <a:ext uri="{FF2B5EF4-FFF2-40B4-BE49-F238E27FC236}">
-                <a16:creationId xmlns:a16="http://schemas.microsoft.com/office/drawing/2014/main" id="{C46B169A-8A89-400B-983F-06F7DEBA1D27}"/>
-              </a:ext>
-            </a:extLst>
-          </p:cNvPr>
-          <p:cNvSpPr txBox="1"/>
-          <p:nvPr/>
-        </p:nvSpPr>
-        <p:spPr>
-          <a:xfrm>
-            <a:off x="1489204" y="352315"/>
-            <a:ext cx="6107184" cy="646331"/>
-          </a:xfrm>
-          <a:prstGeom prst="rect">
-            <a:avLst/>
-          </a:prstGeom>
-          <a:noFill/>
-        </p:spPr>
-        <p:txBody>
-          <a:bodyPr wrap="square">
-            <a:spAutoFit/>
-          </a:bodyPr>
-          <a:lstStyle/>
-          <a:p>
-            <a:r>
-              <a:rPr lang="en-IN" sz="3600" b="1" u="sng" dirty="0">
-                <a:latin typeface="Times New Roman" panose="02020603050405020304" pitchFamily="18" charset="0"/>
-                <a:cs typeface="Times New Roman" panose="02020603050405020304" pitchFamily="18" charset="0"/>
-              </a:rPr>
-              <a:t>Git Revert</a:t>
-            </a:r>
-          </a:p>
-        </p:txBody>
-      </p:sp>
-      <p:sp>
-        <p:nvSpPr>
-          <p:cNvPr id="19" name="TextBox 18">
-            <a:extLst>
-              <a:ext uri="{FF2B5EF4-FFF2-40B4-BE49-F238E27FC236}">
-                <a16:creationId xmlns:a16="http://schemas.microsoft.com/office/drawing/2014/main" id="{8C0BDDD6-609E-4C48-9466-72DB42AE109A}"/>
-              </a:ext>
-            </a:extLst>
-          </p:cNvPr>
-          <p:cNvSpPr txBox="1"/>
-          <p:nvPr/>
-        </p:nvSpPr>
-        <p:spPr>
-          <a:xfrm>
-            <a:off x="1489204" y="1578245"/>
-            <a:ext cx="9389660" cy="5816977"/>
-          </a:xfrm>
-          <a:prstGeom prst="rect">
-            <a:avLst/>
-          </a:prstGeom>
-          <a:noFill/>
-        </p:spPr>
-        <p:txBody>
-          <a:bodyPr wrap="square">
-            <a:spAutoFit/>
-          </a:bodyPr>
-          <a:lstStyle/>
-          <a:p>
-            <a:r>
-              <a:rPr lang="en-US" sz="2400" dirty="0"/>
-              <a:t>In Git, the term revert is used to revert some changes. The git revert command is used to apply revert operation. It is an undo type command. However, it is not a traditional undo alternative. It does not delete any data in this process; instead, it will create a new change with the opposite effect and thereby undo the specified commit. Generally, git revert is a commit.</a:t>
-            </a:r>
-          </a:p>
-          <a:p>
-            <a:endParaRPr lang="en-US" sz="2400" dirty="0"/>
-          </a:p>
-          <a:p>
-            <a:endParaRPr lang="en-US" sz="2400" dirty="0"/>
-          </a:p>
-          <a:p>
-            <a:r>
-              <a:rPr lang="en-US" sz="3200" u="sng" dirty="0"/>
-              <a:t>Syntax-</a:t>
-            </a:r>
-          </a:p>
-          <a:p>
-            <a:pPr marL="342900" indent="-342900">
-              <a:buFont typeface="Arial" panose="020B0604020202020204" pitchFamily="34" charset="0"/>
-              <a:buChar char="•"/>
-            </a:pPr>
-            <a:r>
-              <a:rPr kumimoji="0" lang="en-US" altLang="en-US" sz="2400" b="0" i="1" u="none" strike="noStrike" cap="none" normalizeH="0" baseline="0" dirty="0">
-                <a:ln>
-                  <a:noFill/>
-                </a:ln>
-                <a:solidFill>
-                  <a:schemeClr val="tx1"/>
-                </a:solidFill>
-                <a:effectLst/>
-                <a:latin typeface="Arial Unicode MS"/>
-              </a:rPr>
-              <a:t>git revert</a:t>
-            </a:r>
-            <a:r>
-              <a:rPr kumimoji="0" lang="en-US" altLang="en-US" sz="2400" b="0" i="0" u="none" strike="noStrike" cap="none" normalizeH="0" baseline="0" dirty="0">
-                <a:ln>
-                  <a:noFill/>
-                </a:ln>
-                <a:solidFill>
-                  <a:schemeClr val="tx1"/>
-                </a:solidFill>
-                <a:effectLst/>
-                <a:latin typeface="Arial Unicode MS"/>
-              </a:rPr>
-              <a:t> [--[no-]edit] [-n] [-m parent-number] [-s] [-	S[&lt;</a:t>
-            </a:r>
-            <a:r>
-              <a:rPr kumimoji="0" lang="en-US" altLang="en-US" sz="2400" b="0" i="0" u="none" strike="noStrike" cap="none" normalizeH="0" baseline="0" dirty="0" err="1">
-                <a:ln>
-                  <a:noFill/>
-                </a:ln>
-                <a:solidFill>
-                  <a:schemeClr val="tx1"/>
-                </a:solidFill>
-                <a:effectLst/>
-                <a:latin typeface="Arial Unicode MS"/>
-              </a:rPr>
-              <a:t>keyid</a:t>
-            </a:r>
-            <a:r>
-              <a:rPr kumimoji="0" lang="en-US" altLang="en-US" sz="2400" b="0" i="0" u="none" strike="noStrike" cap="none" normalizeH="0" baseline="0" dirty="0">
-                <a:ln>
-                  <a:noFill/>
-                </a:ln>
-                <a:solidFill>
-                  <a:schemeClr val="tx1"/>
-                </a:solidFill>
-                <a:effectLst/>
-                <a:latin typeface="Arial Unicode MS"/>
-              </a:rPr>
-              <a:t>&gt;]] &lt;commit&gt;…​ </a:t>
-            </a:r>
-          </a:p>
-          <a:p>
-            <a:pPr marL="342900" indent="-342900">
-              <a:buFont typeface="Arial" panose="020B0604020202020204" pitchFamily="34" charset="0"/>
-              <a:buChar char="•"/>
-            </a:pPr>
-            <a:r>
-              <a:rPr kumimoji="0" lang="en-US" altLang="en-US" sz="2400" b="0" i="1" u="none" strike="noStrike" cap="none" normalizeH="0" baseline="0" dirty="0">
-                <a:ln>
-                  <a:noFill/>
-                </a:ln>
-                <a:solidFill>
-                  <a:schemeClr val="tx1"/>
-                </a:solidFill>
-                <a:effectLst/>
-                <a:latin typeface="Arial Unicode MS"/>
-              </a:rPr>
-              <a:t>git revert</a:t>
-            </a:r>
-            <a:r>
-              <a:rPr kumimoji="0" lang="en-US" altLang="en-US" sz="2400" b="0" i="0" u="none" strike="noStrike" cap="none" normalizeH="0" baseline="0" dirty="0">
-                <a:ln>
-                  <a:noFill/>
-                </a:ln>
-                <a:solidFill>
-                  <a:schemeClr val="tx1"/>
-                </a:solidFill>
-                <a:effectLst/>
-                <a:latin typeface="Arial Unicode MS"/>
-              </a:rPr>
-              <a:t> (--continue | --skip | --abort | --quit)</a:t>
-            </a:r>
-            <a:r>
-              <a:rPr kumimoji="0" lang="en-US" altLang="en-US" sz="1800" b="0" i="0" u="none" strike="noStrike" cap="none" normalizeH="0" baseline="0" dirty="0">
-                <a:ln>
-                  <a:noFill/>
-                </a:ln>
-                <a:solidFill>
-                  <a:schemeClr val="tx1"/>
-                </a:solidFill>
-                <a:effectLst/>
-              </a:rPr>
-              <a:t> </a:t>
-            </a:r>
-            <a:endParaRPr kumimoji="0" lang="en-US" altLang="en-US" sz="4800" b="0" i="0" u="none" strike="noStrike" cap="none" normalizeH="0" baseline="0" dirty="0">
-              <a:ln>
-                <a:noFill/>
-              </a:ln>
-              <a:solidFill>
-                <a:schemeClr val="tx1"/>
-              </a:solidFill>
-              <a:effectLst/>
-              <a:latin typeface="Arial" panose="020B0604020202020204" pitchFamily="34" charset="0"/>
-            </a:endParaRPr>
-          </a:p>
-          <a:p>
-            <a:endParaRPr lang="en-US" sz="2400" u="sng" dirty="0"/>
-          </a:p>
-          <a:p>
-            <a:endParaRPr lang="en-US" sz="2400" dirty="0"/>
-          </a:p>
-          <a:p>
-            <a:r>
-              <a:rPr lang="en-IN" sz="2800" dirty="0"/>
-              <a:t>	</a:t>
-            </a:r>
-          </a:p>
-        </p:txBody>
-      </p:sp>
-    </p:spTree>
-    <p:extLst>
-      <p:ext uri="{BB962C8B-B14F-4D97-AF65-F5344CB8AC3E}">
-        <p14:creationId xmlns:p14="http://schemas.microsoft.com/office/powerpoint/2010/main" val="1601825883"/>
-      </p:ext>
-    </p:extLst>
-  </p:cSld>
-  <p:clrMapOvr>
-    <a:masterClrMapping/>
-  </p:clrMapOvr>
-</p:sld>
-</file>
-
 <file path=ppt/theme/theme1.xml><?xml version="1.0" encoding="utf-8"?>
 <a:theme xmlns:a="http://schemas.openxmlformats.org/drawingml/2006/main" name="Office Theme">
   <a:themeElements>

</xml_diff>

<commit_message>
PPT final updation with live examples
</commit_message>
<xml_diff>
--- a/Revert.pptx
+++ b/Revert.pptx
@@ -9,6 +9,10 @@
     <p:sldId id="259" r:id="rId3"/>
     <p:sldId id="261" r:id="rId4"/>
     <p:sldId id="260" r:id="rId5"/>
+    <p:sldId id="262" r:id="rId6"/>
+    <p:sldId id="263" r:id="rId7"/>
+    <p:sldId id="264" r:id="rId8"/>
+    <p:sldId id="265" r:id="rId9"/>
   </p:sldIdLst>
   <p:sldSz cx="12192000" cy="6858000"/>
   <p:notesSz cx="6858000" cy="9144000"/>
@@ -109,7 +113,7 @@
   </p:defaultTextStyle>
   <p:extLst>
     <p:ext uri="{EFAFB233-063F-42B5-8137-9DF3F51BA10A}">
-      <p15:sldGuideLst xmlns:p15="http://schemas.microsoft.com/office/powerpoint/2012/main"/>
+      <p15:sldGuideLst xmlns:p15="http://schemas.microsoft.com/office/powerpoint/2012/main" xmlns=""/>
     </p:ext>
   </p:extLst>
 </p:presentation>
@@ -137,7 +141,7 @@
           <p:cNvPr id="2" name="Title 1">
             <a:extLst>
               <a:ext uri="{FF2B5EF4-FFF2-40B4-BE49-F238E27FC236}">
-                <a16:creationId xmlns:a16="http://schemas.microsoft.com/office/drawing/2014/main" id="{3CFD94F6-1520-4E95-A439-05C3BC6EDB00}"/>
+                <a16:creationId xmlns:a16="http://schemas.microsoft.com/office/drawing/2014/main" xmlns="" id="{3CFD94F6-1520-4E95-A439-05C3BC6EDB00}"/>
               </a:ext>
             </a:extLst>
           </p:cNvPr>
@@ -175,7 +179,7 @@
           <p:cNvPr id="3" name="Subtitle 2">
             <a:extLst>
               <a:ext uri="{FF2B5EF4-FFF2-40B4-BE49-F238E27FC236}">
-                <a16:creationId xmlns:a16="http://schemas.microsoft.com/office/drawing/2014/main" id="{613D3062-C62C-43AB-9476-78CEF28CE7C3}"/>
+                <a16:creationId xmlns:a16="http://schemas.microsoft.com/office/drawing/2014/main" xmlns="" id="{613D3062-C62C-43AB-9476-78CEF28CE7C3}"/>
               </a:ext>
             </a:extLst>
           </p:cNvPr>
@@ -246,7 +250,7 @@
           <p:cNvPr id="4" name="Date Placeholder 3">
             <a:extLst>
               <a:ext uri="{FF2B5EF4-FFF2-40B4-BE49-F238E27FC236}">
-                <a16:creationId xmlns:a16="http://schemas.microsoft.com/office/drawing/2014/main" id="{C82F7F79-998F-4DE8-8BDE-0895B046A282}"/>
+                <a16:creationId xmlns:a16="http://schemas.microsoft.com/office/drawing/2014/main" xmlns="" id="{C82F7F79-998F-4DE8-8BDE-0895B046A282}"/>
               </a:ext>
             </a:extLst>
           </p:cNvPr>
@@ -264,6 +268,7 @@
           <a:p>
             <a:fld id="{3C0888B6-2611-455B-98C8-35DDD406881E}" type="datetimeFigureOut">
               <a:rPr lang="en-IN" smtClean="0"/>
+              <a:pPr/>
               <a:t>12-01-2021</a:t>
             </a:fld>
             <a:endParaRPr lang="en-IN"/>
@@ -275,7 +280,7 @@
           <p:cNvPr id="5" name="Footer Placeholder 4">
             <a:extLst>
               <a:ext uri="{FF2B5EF4-FFF2-40B4-BE49-F238E27FC236}">
-                <a16:creationId xmlns:a16="http://schemas.microsoft.com/office/drawing/2014/main" id="{3B1EE5E3-EA9D-470D-9203-8D6BFF4F80C3}"/>
+                <a16:creationId xmlns:a16="http://schemas.microsoft.com/office/drawing/2014/main" xmlns="" id="{3B1EE5E3-EA9D-470D-9203-8D6BFF4F80C3}"/>
               </a:ext>
             </a:extLst>
           </p:cNvPr>
@@ -300,7 +305,7 @@
           <p:cNvPr id="6" name="Slide Number Placeholder 5">
             <a:extLst>
               <a:ext uri="{FF2B5EF4-FFF2-40B4-BE49-F238E27FC236}">
-                <a16:creationId xmlns:a16="http://schemas.microsoft.com/office/drawing/2014/main" id="{E5224350-D38F-4171-930D-6EB84E6578CF}"/>
+                <a16:creationId xmlns:a16="http://schemas.microsoft.com/office/drawing/2014/main" xmlns="" id="{E5224350-D38F-4171-930D-6EB84E6578CF}"/>
               </a:ext>
             </a:extLst>
           </p:cNvPr>
@@ -318,6 +323,7 @@
           <a:p>
             <a:fld id="{CAB1F108-064F-475E-A462-4516EB720120}" type="slidenum">
               <a:rPr lang="en-IN" smtClean="0"/>
+              <a:pPr/>
               <a:t>‹#›</a:t>
             </a:fld>
             <a:endParaRPr lang="en-IN"/>
@@ -327,7 +333,7 @@
     </p:spTree>
     <p:extLst>
       <p:ext uri="{BB962C8B-B14F-4D97-AF65-F5344CB8AC3E}">
-        <p14:creationId xmlns:p14="http://schemas.microsoft.com/office/powerpoint/2010/main" val="3523716442"/>
+        <p14:creationId xmlns:p14="http://schemas.microsoft.com/office/powerpoint/2010/main" xmlns="" val="3523716442"/>
       </p:ext>
     </p:extLst>
   </p:cSld>
@@ -359,7 +365,7 @@
           <p:cNvPr id="2" name="Title 1">
             <a:extLst>
               <a:ext uri="{FF2B5EF4-FFF2-40B4-BE49-F238E27FC236}">
-                <a16:creationId xmlns:a16="http://schemas.microsoft.com/office/drawing/2014/main" id="{DAC63F73-C507-47B4-BF95-1B4E18468E19}"/>
+                <a16:creationId xmlns:a16="http://schemas.microsoft.com/office/drawing/2014/main" xmlns="" id="{DAC63F73-C507-47B4-BF95-1B4E18468E19}"/>
               </a:ext>
             </a:extLst>
           </p:cNvPr>
@@ -388,7 +394,7 @@
           <p:cNvPr id="3" name="Vertical Text Placeholder 2">
             <a:extLst>
               <a:ext uri="{FF2B5EF4-FFF2-40B4-BE49-F238E27FC236}">
-                <a16:creationId xmlns:a16="http://schemas.microsoft.com/office/drawing/2014/main" id="{DF401005-868B-48E7-9ECB-5B184A4155FF}"/>
+                <a16:creationId xmlns:a16="http://schemas.microsoft.com/office/drawing/2014/main" xmlns="" id="{DF401005-868B-48E7-9ECB-5B184A4155FF}"/>
               </a:ext>
             </a:extLst>
           </p:cNvPr>
@@ -446,7 +452,7 @@
           <p:cNvPr id="4" name="Date Placeholder 3">
             <a:extLst>
               <a:ext uri="{FF2B5EF4-FFF2-40B4-BE49-F238E27FC236}">
-                <a16:creationId xmlns:a16="http://schemas.microsoft.com/office/drawing/2014/main" id="{60026E07-AF34-4833-BB47-E5FA5D84A6A6}"/>
+                <a16:creationId xmlns:a16="http://schemas.microsoft.com/office/drawing/2014/main" xmlns="" id="{60026E07-AF34-4833-BB47-E5FA5D84A6A6}"/>
               </a:ext>
             </a:extLst>
           </p:cNvPr>
@@ -464,6 +470,7 @@
           <a:p>
             <a:fld id="{3C0888B6-2611-455B-98C8-35DDD406881E}" type="datetimeFigureOut">
               <a:rPr lang="en-IN" smtClean="0"/>
+              <a:pPr/>
               <a:t>12-01-2021</a:t>
             </a:fld>
             <a:endParaRPr lang="en-IN"/>
@@ -475,7 +482,7 @@
           <p:cNvPr id="5" name="Footer Placeholder 4">
             <a:extLst>
               <a:ext uri="{FF2B5EF4-FFF2-40B4-BE49-F238E27FC236}">
-                <a16:creationId xmlns:a16="http://schemas.microsoft.com/office/drawing/2014/main" id="{448FAA5A-0D19-4868-AF7B-C2E10CBF6C87}"/>
+                <a16:creationId xmlns:a16="http://schemas.microsoft.com/office/drawing/2014/main" xmlns="" id="{448FAA5A-0D19-4868-AF7B-C2E10CBF6C87}"/>
               </a:ext>
             </a:extLst>
           </p:cNvPr>
@@ -500,7 +507,7 @@
           <p:cNvPr id="6" name="Slide Number Placeholder 5">
             <a:extLst>
               <a:ext uri="{FF2B5EF4-FFF2-40B4-BE49-F238E27FC236}">
-                <a16:creationId xmlns:a16="http://schemas.microsoft.com/office/drawing/2014/main" id="{949909D1-C4CB-4094-9FF3-416F2DA933FB}"/>
+                <a16:creationId xmlns:a16="http://schemas.microsoft.com/office/drawing/2014/main" xmlns="" id="{949909D1-C4CB-4094-9FF3-416F2DA933FB}"/>
               </a:ext>
             </a:extLst>
           </p:cNvPr>
@@ -518,6 +525,7 @@
           <a:p>
             <a:fld id="{CAB1F108-064F-475E-A462-4516EB720120}" type="slidenum">
               <a:rPr lang="en-IN" smtClean="0"/>
+              <a:pPr/>
               <a:t>‹#›</a:t>
             </a:fld>
             <a:endParaRPr lang="en-IN"/>
@@ -527,7 +535,7 @@
     </p:spTree>
     <p:extLst>
       <p:ext uri="{BB962C8B-B14F-4D97-AF65-F5344CB8AC3E}">
-        <p14:creationId xmlns:p14="http://schemas.microsoft.com/office/powerpoint/2010/main" val="2642080596"/>
+        <p14:creationId xmlns:p14="http://schemas.microsoft.com/office/powerpoint/2010/main" xmlns="" val="2642080596"/>
       </p:ext>
     </p:extLst>
   </p:cSld>
@@ -559,7 +567,7 @@
           <p:cNvPr id="2" name="Vertical Title 1">
             <a:extLst>
               <a:ext uri="{FF2B5EF4-FFF2-40B4-BE49-F238E27FC236}">
-                <a16:creationId xmlns:a16="http://schemas.microsoft.com/office/drawing/2014/main" id="{FB2F168C-63A0-4BFB-8BAD-8A04A4A65A4C}"/>
+                <a16:creationId xmlns:a16="http://schemas.microsoft.com/office/drawing/2014/main" xmlns="" id="{FB2F168C-63A0-4BFB-8BAD-8A04A4A65A4C}"/>
               </a:ext>
             </a:extLst>
           </p:cNvPr>
@@ -593,7 +601,7 @@
           <p:cNvPr id="3" name="Vertical Text Placeholder 2">
             <a:extLst>
               <a:ext uri="{FF2B5EF4-FFF2-40B4-BE49-F238E27FC236}">
-                <a16:creationId xmlns:a16="http://schemas.microsoft.com/office/drawing/2014/main" id="{A409D7A2-92C3-4001-A14C-9AADB1D4A6F9}"/>
+                <a16:creationId xmlns:a16="http://schemas.microsoft.com/office/drawing/2014/main" xmlns="" id="{A409D7A2-92C3-4001-A14C-9AADB1D4A6F9}"/>
               </a:ext>
             </a:extLst>
           </p:cNvPr>
@@ -656,7 +664,7 @@
           <p:cNvPr id="4" name="Date Placeholder 3">
             <a:extLst>
               <a:ext uri="{FF2B5EF4-FFF2-40B4-BE49-F238E27FC236}">
-                <a16:creationId xmlns:a16="http://schemas.microsoft.com/office/drawing/2014/main" id="{662ABE0E-E95A-4ED8-B9B9-A330B7E4E9A0}"/>
+                <a16:creationId xmlns:a16="http://schemas.microsoft.com/office/drawing/2014/main" xmlns="" id="{662ABE0E-E95A-4ED8-B9B9-A330B7E4E9A0}"/>
               </a:ext>
             </a:extLst>
           </p:cNvPr>
@@ -674,6 +682,7 @@
           <a:p>
             <a:fld id="{3C0888B6-2611-455B-98C8-35DDD406881E}" type="datetimeFigureOut">
               <a:rPr lang="en-IN" smtClean="0"/>
+              <a:pPr/>
               <a:t>12-01-2021</a:t>
             </a:fld>
             <a:endParaRPr lang="en-IN"/>
@@ -685,7 +694,7 @@
           <p:cNvPr id="5" name="Footer Placeholder 4">
             <a:extLst>
               <a:ext uri="{FF2B5EF4-FFF2-40B4-BE49-F238E27FC236}">
-                <a16:creationId xmlns:a16="http://schemas.microsoft.com/office/drawing/2014/main" id="{7421A73E-E77F-4501-9FE4-ED3B50B10A1E}"/>
+                <a16:creationId xmlns:a16="http://schemas.microsoft.com/office/drawing/2014/main" xmlns="" id="{7421A73E-E77F-4501-9FE4-ED3B50B10A1E}"/>
               </a:ext>
             </a:extLst>
           </p:cNvPr>
@@ -710,7 +719,7 @@
           <p:cNvPr id="6" name="Slide Number Placeholder 5">
             <a:extLst>
               <a:ext uri="{FF2B5EF4-FFF2-40B4-BE49-F238E27FC236}">
-                <a16:creationId xmlns:a16="http://schemas.microsoft.com/office/drawing/2014/main" id="{C394E5BC-E167-45BC-BF1E-7DE26EB3FB29}"/>
+                <a16:creationId xmlns:a16="http://schemas.microsoft.com/office/drawing/2014/main" xmlns="" id="{C394E5BC-E167-45BC-BF1E-7DE26EB3FB29}"/>
               </a:ext>
             </a:extLst>
           </p:cNvPr>
@@ -728,6 +737,7 @@
           <a:p>
             <a:fld id="{CAB1F108-064F-475E-A462-4516EB720120}" type="slidenum">
               <a:rPr lang="en-IN" smtClean="0"/>
+              <a:pPr/>
               <a:t>‹#›</a:t>
             </a:fld>
             <a:endParaRPr lang="en-IN"/>
@@ -737,7 +747,7 @@
     </p:spTree>
     <p:extLst>
       <p:ext uri="{BB962C8B-B14F-4D97-AF65-F5344CB8AC3E}">
-        <p14:creationId xmlns:p14="http://schemas.microsoft.com/office/powerpoint/2010/main" val="4091481572"/>
+        <p14:creationId xmlns:p14="http://schemas.microsoft.com/office/powerpoint/2010/main" xmlns="" val="4091481572"/>
       </p:ext>
     </p:extLst>
   </p:cSld>
@@ -769,7 +779,7 @@
           <p:cNvPr id="2" name="Title 1">
             <a:extLst>
               <a:ext uri="{FF2B5EF4-FFF2-40B4-BE49-F238E27FC236}">
-                <a16:creationId xmlns:a16="http://schemas.microsoft.com/office/drawing/2014/main" id="{094F983C-13C6-40A5-81B5-07B7E1F335F1}"/>
+                <a16:creationId xmlns:a16="http://schemas.microsoft.com/office/drawing/2014/main" xmlns="" id="{094F983C-13C6-40A5-81B5-07B7E1F335F1}"/>
               </a:ext>
             </a:extLst>
           </p:cNvPr>
@@ -798,7 +808,7 @@
           <p:cNvPr id="3" name="Content Placeholder 2">
             <a:extLst>
               <a:ext uri="{FF2B5EF4-FFF2-40B4-BE49-F238E27FC236}">
-                <a16:creationId xmlns:a16="http://schemas.microsoft.com/office/drawing/2014/main" id="{E854278A-9A96-4179-BAB5-730634D65BD7}"/>
+                <a16:creationId xmlns:a16="http://schemas.microsoft.com/office/drawing/2014/main" xmlns="" id="{E854278A-9A96-4179-BAB5-730634D65BD7}"/>
               </a:ext>
             </a:extLst>
           </p:cNvPr>
@@ -856,7 +866,7 @@
           <p:cNvPr id="4" name="Date Placeholder 3">
             <a:extLst>
               <a:ext uri="{FF2B5EF4-FFF2-40B4-BE49-F238E27FC236}">
-                <a16:creationId xmlns:a16="http://schemas.microsoft.com/office/drawing/2014/main" id="{B0AE02A8-E8B4-473A-A3C3-A4C595DAFF9F}"/>
+                <a16:creationId xmlns:a16="http://schemas.microsoft.com/office/drawing/2014/main" xmlns="" id="{B0AE02A8-E8B4-473A-A3C3-A4C595DAFF9F}"/>
               </a:ext>
             </a:extLst>
           </p:cNvPr>
@@ -874,6 +884,7 @@
           <a:p>
             <a:fld id="{3C0888B6-2611-455B-98C8-35DDD406881E}" type="datetimeFigureOut">
               <a:rPr lang="en-IN" smtClean="0"/>
+              <a:pPr/>
               <a:t>12-01-2021</a:t>
             </a:fld>
             <a:endParaRPr lang="en-IN"/>
@@ -885,7 +896,7 @@
           <p:cNvPr id="5" name="Footer Placeholder 4">
             <a:extLst>
               <a:ext uri="{FF2B5EF4-FFF2-40B4-BE49-F238E27FC236}">
-                <a16:creationId xmlns:a16="http://schemas.microsoft.com/office/drawing/2014/main" id="{9584788E-748A-4451-AD3E-5A04E3B16B1C}"/>
+                <a16:creationId xmlns:a16="http://schemas.microsoft.com/office/drawing/2014/main" xmlns="" id="{9584788E-748A-4451-AD3E-5A04E3B16B1C}"/>
               </a:ext>
             </a:extLst>
           </p:cNvPr>
@@ -910,7 +921,7 @@
           <p:cNvPr id="6" name="Slide Number Placeholder 5">
             <a:extLst>
               <a:ext uri="{FF2B5EF4-FFF2-40B4-BE49-F238E27FC236}">
-                <a16:creationId xmlns:a16="http://schemas.microsoft.com/office/drawing/2014/main" id="{D7CE435E-FBAB-44D1-9BEC-6B4CE1224818}"/>
+                <a16:creationId xmlns:a16="http://schemas.microsoft.com/office/drawing/2014/main" xmlns="" id="{D7CE435E-FBAB-44D1-9BEC-6B4CE1224818}"/>
               </a:ext>
             </a:extLst>
           </p:cNvPr>
@@ -928,6 +939,7 @@
           <a:p>
             <a:fld id="{CAB1F108-064F-475E-A462-4516EB720120}" type="slidenum">
               <a:rPr lang="en-IN" smtClean="0"/>
+              <a:pPr/>
               <a:t>‹#›</a:t>
             </a:fld>
             <a:endParaRPr lang="en-IN"/>
@@ -937,7 +949,7 @@
     </p:spTree>
     <p:extLst>
       <p:ext uri="{BB962C8B-B14F-4D97-AF65-F5344CB8AC3E}">
-        <p14:creationId xmlns:p14="http://schemas.microsoft.com/office/powerpoint/2010/main" val="3964229199"/>
+        <p14:creationId xmlns:p14="http://schemas.microsoft.com/office/powerpoint/2010/main" xmlns="" val="3964229199"/>
       </p:ext>
     </p:extLst>
   </p:cSld>
@@ -969,7 +981,7 @@
           <p:cNvPr id="2" name="Title 1">
             <a:extLst>
               <a:ext uri="{FF2B5EF4-FFF2-40B4-BE49-F238E27FC236}">
-                <a16:creationId xmlns:a16="http://schemas.microsoft.com/office/drawing/2014/main" id="{8BCA9053-5AB5-4227-B426-4C00F6BF456F}"/>
+                <a16:creationId xmlns:a16="http://schemas.microsoft.com/office/drawing/2014/main" xmlns="" id="{8BCA9053-5AB5-4227-B426-4C00F6BF456F}"/>
               </a:ext>
             </a:extLst>
           </p:cNvPr>
@@ -1007,7 +1019,7 @@
           <p:cNvPr id="3" name="Text Placeholder 2">
             <a:extLst>
               <a:ext uri="{FF2B5EF4-FFF2-40B4-BE49-F238E27FC236}">
-                <a16:creationId xmlns:a16="http://schemas.microsoft.com/office/drawing/2014/main" id="{3433D4BD-269A-4563-B331-ED171A284F49}"/>
+                <a16:creationId xmlns:a16="http://schemas.microsoft.com/office/drawing/2014/main" xmlns="" id="{3433D4BD-269A-4563-B331-ED171A284F49}"/>
               </a:ext>
             </a:extLst>
           </p:cNvPr>
@@ -1132,7 +1144,7 @@
           <p:cNvPr id="4" name="Date Placeholder 3">
             <a:extLst>
               <a:ext uri="{FF2B5EF4-FFF2-40B4-BE49-F238E27FC236}">
-                <a16:creationId xmlns:a16="http://schemas.microsoft.com/office/drawing/2014/main" id="{321A2350-E2EB-49F4-A880-A52AA26B907D}"/>
+                <a16:creationId xmlns:a16="http://schemas.microsoft.com/office/drawing/2014/main" xmlns="" id="{321A2350-E2EB-49F4-A880-A52AA26B907D}"/>
               </a:ext>
             </a:extLst>
           </p:cNvPr>
@@ -1150,6 +1162,7 @@
           <a:p>
             <a:fld id="{3C0888B6-2611-455B-98C8-35DDD406881E}" type="datetimeFigureOut">
               <a:rPr lang="en-IN" smtClean="0"/>
+              <a:pPr/>
               <a:t>12-01-2021</a:t>
             </a:fld>
             <a:endParaRPr lang="en-IN"/>
@@ -1161,7 +1174,7 @@
           <p:cNvPr id="5" name="Footer Placeholder 4">
             <a:extLst>
               <a:ext uri="{FF2B5EF4-FFF2-40B4-BE49-F238E27FC236}">
-                <a16:creationId xmlns:a16="http://schemas.microsoft.com/office/drawing/2014/main" id="{E8C87EC2-EB30-47E4-936E-5DC8CCBA0691}"/>
+                <a16:creationId xmlns:a16="http://schemas.microsoft.com/office/drawing/2014/main" xmlns="" id="{E8C87EC2-EB30-47E4-936E-5DC8CCBA0691}"/>
               </a:ext>
             </a:extLst>
           </p:cNvPr>
@@ -1186,7 +1199,7 @@
           <p:cNvPr id="6" name="Slide Number Placeholder 5">
             <a:extLst>
               <a:ext uri="{FF2B5EF4-FFF2-40B4-BE49-F238E27FC236}">
-                <a16:creationId xmlns:a16="http://schemas.microsoft.com/office/drawing/2014/main" id="{FB5797C8-4CD5-4F0D-9E3D-431415B754B0}"/>
+                <a16:creationId xmlns:a16="http://schemas.microsoft.com/office/drawing/2014/main" xmlns="" id="{FB5797C8-4CD5-4F0D-9E3D-431415B754B0}"/>
               </a:ext>
             </a:extLst>
           </p:cNvPr>
@@ -1204,6 +1217,7 @@
           <a:p>
             <a:fld id="{CAB1F108-064F-475E-A462-4516EB720120}" type="slidenum">
               <a:rPr lang="en-IN" smtClean="0"/>
+              <a:pPr/>
               <a:t>‹#›</a:t>
             </a:fld>
             <a:endParaRPr lang="en-IN"/>
@@ -1213,7 +1227,7 @@
     </p:spTree>
     <p:extLst>
       <p:ext uri="{BB962C8B-B14F-4D97-AF65-F5344CB8AC3E}">
-        <p14:creationId xmlns:p14="http://schemas.microsoft.com/office/powerpoint/2010/main" val="2380043084"/>
+        <p14:creationId xmlns:p14="http://schemas.microsoft.com/office/powerpoint/2010/main" xmlns="" val="2380043084"/>
       </p:ext>
     </p:extLst>
   </p:cSld>
@@ -1245,7 +1259,7 @@
           <p:cNvPr id="2" name="Title 1">
             <a:extLst>
               <a:ext uri="{FF2B5EF4-FFF2-40B4-BE49-F238E27FC236}">
-                <a16:creationId xmlns:a16="http://schemas.microsoft.com/office/drawing/2014/main" id="{41663BCE-9CE0-49D2-9BC6-D9E806527B84}"/>
+                <a16:creationId xmlns:a16="http://schemas.microsoft.com/office/drawing/2014/main" xmlns="" id="{41663BCE-9CE0-49D2-9BC6-D9E806527B84}"/>
               </a:ext>
             </a:extLst>
           </p:cNvPr>
@@ -1274,7 +1288,7 @@
           <p:cNvPr id="3" name="Content Placeholder 2">
             <a:extLst>
               <a:ext uri="{FF2B5EF4-FFF2-40B4-BE49-F238E27FC236}">
-                <a16:creationId xmlns:a16="http://schemas.microsoft.com/office/drawing/2014/main" id="{8E8EB5C3-41C6-4A2C-A96D-B5221FF7CCB8}"/>
+                <a16:creationId xmlns:a16="http://schemas.microsoft.com/office/drawing/2014/main" xmlns="" id="{8E8EB5C3-41C6-4A2C-A96D-B5221FF7CCB8}"/>
               </a:ext>
             </a:extLst>
           </p:cNvPr>
@@ -1337,7 +1351,7 @@
           <p:cNvPr id="4" name="Content Placeholder 3">
             <a:extLst>
               <a:ext uri="{FF2B5EF4-FFF2-40B4-BE49-F238E27FC236}">
-                <a16:creationId xmlns:a16="http://schemas.microsoft.com/office/drawing/2014/main" id="{CC6171D5-45C8-4B3D-BDE3-EEB9A8B0D3C8}"/>
+                <a16:creationId xmlns:a16="http://schemas.microsoft.com/office/drawing/2014/main" xmlns="" id="{CC6171D5-45C8-4B3D-BDE3-EEB9A8B0D3C8}"/>
               </a:ext>
             </a:extLst>
           </p:cNvPr>
@@ -1400,7 +1414,7 @@
           <p:cNvPr id="5" name="Date Placeholder 4">
             <a:extLst>
               <a:ext uri="{FF2B5EF4-FFF2-40B4-BE49-F238E27FC236}">
-                <a16:creationId xmlns:a16="http://schemas.microsoft.com/office/drawing/2014/main" id="{64E51CA5-632A-41B1-BD4F-AF71C4AF0CFE}"/>
+                <a16:creationId xmlns:a16="http://schemas.microsoft.com/office/drawing/2014/main" xmlns="" id="{64E51CA5-632A-41B1-BD4F-AF71C4AF0CFE}"/>
               </a:ext>
             </a:extLst>
           </p:cNvPr>
@@ -1418,6 +1432,7 @@
           <a:p>
             <a:fld id="{3C0888B6-2611-455B-98C8-35DDD406881E}" type="datetimeFigureOut">
               <a:rPr lang="en-IN" smtClean="0"/>
+              <a:pPr/>
               <a:t>12-01-2021</a:t>
             </a:fld>
             <a:endParaRPr lang="en-IN"/>
@@ -1429,7 +1444,7 @@
           <p:cNvPr id="6" name="Footer Placeholder 5">
             <a:extLst>
               <a:ext uri="{FF2B5EF4-FFF2-40B4-BE49-F238E27FC236}">
-                <a16:creationId xmlns:a16="http://schemas.microsoft.com/office/drawing/2014/main" id="{78B3903F-7888-4FA0-8AA9-4CC379194F40}"/>
+                <a16:creationId xmlns:a16="http://schemas.microsoft.com/office/drawing/2014/main" xmlns="" id="{78B3903F-7888-4FA0-8AA9-4CC379194F40}"/>
               </a:ext>
             </a:extLst>
           </p:cNvPr>
@@ -1454,7 +1469,7 @@
           <p:cNvPr id="7" name="Slide Number Placeholder 6">
             <a:extLst>
               <a:ext uri="{FF2B5EF4-FFF2-40B4-BE49-F238E27FC236}">
-                <a16:creationId xmlns:a16="http://schemas.microsoft.com/office/drawing/2014/main" id="{EB8371C4-E73F-40B8-8112-89872F72D1F3}"/>
+                <a16:creationId xmlns:a16="http://schemas.microsoft.com/office/drawing/2014/main" xmlns="" id="{EB8371C4-E73F-40B8-8112-89872F72D1F3}"/>
               </a:ext>
             </a:extLst>
           </p:cNvPr>
@@ -1472,6 +1487,7 @@
           <a:p>
             <a:fld id="{CAB1F108-064F-475E-A462-4516EB720120}" type="slidenum">
               <a:rPr lang="en-IN" smtClean="0"/>
+              <a:pPr/>
               <a:t>‹#›</a:t>
             </a:fld>
             <a:endParaRPr lang="en-IN"/>
@@ -1481,7 +1497,7 @@
     </p:spTree>
     <p:extLst>
       <p:ext uri="{BB962C8B-B14F-4D97-AF65-F5344CB8AC3E}">
-        <p14:creationId xmlns:p14="http://schemas.microsoft.com/office/powerpoint/2010/main" val="2528155282"/>
+        <p14:creationId xmlns:p14="http://schemas.microsoft.com/office/powerpoint/2010/main" xmlns="" val="2528155282"/>
       </p:ext>
     </p:extLst>
   </p:cSld>
@@ -1513,7 +1529,7 @@
           <p:cNvPr id="2" name="Title 1">
             <a:extLst>
               <a:ext uri="{FF2B5EF4-FFF2-40B4-BE49-F238E27FC236}">
-                <a16:creationId xmlns:a16="http://schemas.microsoft.com/office/drawing/2014/main" id="{D2F7478E-9032-40D7-981A-525783058871}"/>
+                <a16:creationId xmlns:a16="http://schemas.microsoft.com/office/drawing/2014/main" xmlns="" id="{D2F7478E-9032-40D7-981A-525783058871}"/>
               </a:ext>
             </a:extLst>
           </p:cNvPr>
@@ -1547,7 +1563,7 @@
           <p:cNvPr id="3" name="Text Placeholder 2">
             <a:extLst>
               <a:ext uri="{FF2B5EF4-FFF2-40B4-BE49-F238E27FC236}">
-                <a16:creationId xmlns:a16="http://schemas.microsoft.com/office/drawing/2014/main" id="{7589390F-0871-4DF5-98E1-7AC167A9813C}"/>
+                <a16:creationId xmlns:a16="http://schemas.microsoft.com/office/drawing/2014/main" xmlns="" id="{7589390F-0871-4DF5-98E1-7AC167A9813C}"/>
               </a:ext>
             </a:extLst>
           </p:cNvPr>
@@ -1618,7 +1634,7 @@
           <p:cNvPr id="4" name="Content Placeholder 3">
             <a:extLst>
               <a:ext uri="{FF2B5EF4-FFF2-40B4-BE49-F238E27FC236}">
-                <a16:creationId xmlns:a16="http://schemas.microsoft.com/office/drawing/2014/main" id="{3628CF19-3F30-420A-91A3-105BBB8EA5DD}"/>
+                <a16:creationId xmlns:a16="http://schemas.microsoft.com/office/drawing/2014/main" xmlns="" id="{3628CF19-3F30-420A-91A3-105BBB8EA5DD}"/>
               </a:ext>
             </a:extLst>
           </p:cNvPr>
@@ -1681,7 +1697,7 @@
           <p:cNvPr id="5" name="Text Placeholder 4">
             <a:extLst>
               <a:ext uri="{FF2B5EF4-FFF2-40B4-BE49-F238E27FC236}">
-                <a16:creationId xmlns:a16="http://schemas.microsoft.com/office/drawing/2014/main" id="{4FAC3A9A-2E4C-4D13-BA93-7D9C7F53C4B6}"/>
+                <a16:creationId xmlns:a16="http://schemas.microsoft.com/office/drawing/2014/main" xmlns="" id="{4FAC3A9A-2E4C-4D13-BA93-7D9C7F53C4B6}"/>
               </a:ext>
             </a:extLst>
           </p:cNvPr>
@@ -1752,7 +1768,7 @@
           <p:cNvPr id="6" name="Content Placeholder 5">
             <a:extLst>
               <a:ext uri="{FF2B5EF4-FFF2-40B4-BE49-F238E27FC236}">
-                <a16:creationId xmlns:a16="http://schemas.microsoft.com/office/drawing/2014/main" id="{AF379CF9-FA34-4CA5-B62B-57F398115ECA}"/>
+                <a16:creationId xmlns:a16="http://schemas.microsoft.com/office/drawing/2014/main" xmlns="" id="{AF379CF9-FA34-4CA5-B62B-57F398115ECA}"/>
               </a:ext>
             </a:extLst>
           </p:cNvPr>
@@ -1815,7 +1831,7 @@
           <p:cNvPr id="7" name="Date Placeholder 6">
             <a:extLst>
               <a:ext uri="{FF2B5EF4-FFF2-40B4-BE49-F238E27FC236}">
-                <a16:creationId xmlns:a16="http://schemas.microsoft.com/office/drawing/2014/main" id="{5EFD0649-D640-4437-AE07-47F6F3D82516}"/>
+                <a16:creationId xmlns:a16="http://schemas.microsoft.com/office/drawing/2014/main" xmlns="" id="{5EFD0649-D640-4437-AE07-47F6F3D82516}"/>
               </a:ext>
             </a:extLst>
           </p:cNvPr>
@@ -1833,6 +1849,7 @@
           <a:p>
             <a:fld id="{3C0888B6-2611-455B-98C8-35DDD406881E}" type="datetimeFigureOut">
               <a:rPr lang="en-IN" smtClean="0"/>
+              <a:pPr/>
               <a:t>12-01-2021</a:t>
             </a:fld>
             <a:endParaRPr lang="en-IN"/>
@@ -1844,7 +1861,7 @@
           <p:cNvPr id="8" name="Footer Placeholder 7">
             <a:extLst>
               <a:ext uri="{FF2B5EF4-FFF2-40B4-BE49-F238E27FC236}">
-                <a16:creationId xmlns:a16="http://schemas.microsoft.com/office/drawing/2014/main" id="{74039094-2D84-4CB7-8870-6C4BC9B55C31}"/>
+                <a16:creationId xmlns:a16="http://schemas.microsoft.com/office/drawing/2014/main" xmlns="" id="{74039094-2D84-4CB7-8870-6C4BC9B55C31}"/>
               </a:ext>
             </a:extLst>
           </p:cNvPr>
@@ -1869,7 +1886,7 @@
           <p:cNvPr id="9" name="Slide Number Placeholder 8">
             <a:extLst>
               <a:ext uri="{FF2B5EF4-FFF2-40B4-BE49-F238E27FC236}">
-                <a16:creationId xmlns:a16="http://schemas.microsoft.com/office/drawing/2014/main" id="{9B00BBF3-6934-4C03-8CB1-6F10D2D8A88E}"/>
+                <a16:creationId xmlns:a16="http://schemas.microsoft.com/office/drawing/2014/main" xmlns="" id="{9B00BBF3-6934-4C03-8CB1-6F10D2D8A88E}"/>
               </a:ext>
             </a:extLst>
           </p:cNvPr>
@@ -1887,6 +1904,7 @@
           <a:p>
             <a:fld id="{CAB1F108-064F-475E-A462-4516EB720120}" type="slidenum">
               <a:rPr lang="en-IN" smtClean="0"/>
+              <a:pPr/>
               <a:t>‹#›</a:t>
             </a:fld>
             <a:endParaRPr lang="en-IN"/>
@@ -1896,7 +1914,7 @@
     </p:spTree>
     <p:extLst>
       <p:ext uri="{BB962C8B-B14F-4D97-AF65-F5344CB8AC3E}">
-        <p14:creationId xmlns:p14="http://schemas.microsoft.com/office/powerpoint/2010/main" val="1062193947"/>
+        <p14:creationId xmlns:p14="http://schemas.microsoft.com/office/powerpoint/2010/main" xmlns="" val="1062193947"/>
       </p:ext>
     </p:extLst>
   </p:cSld>
@@ -1928,7 +1946,7 @@
           <p:cNvPr id="2" name="Title 1">
             <a:extLst>
               <a:ext uri="{FF2B5EF4-FFF2-40B4-BE49-F238E27FC236}">
-                <a16:creationId xmlns:a16="http://schemas.microsoft.com/office/drawing/2014/main" id="{CC7D38C4-7924-4712-9F1C-A30FDD13022F}"/>
+                <a16:creationId xmlns:a16="http://schemas.microsoft.com/office/drawing/2014/main" xmlns="" id="{CC7D38C4-7924-4712-9F1C-A30FDD13022F}"/>
               </a:ext>
             </a:extLst>
           </p:cNvPr>
@@ -1957,7 +1975,7 @@
           <p:cNvPr id="3" name="Date Placeholder 2">
             <a:extLst>
               <a:ext uri="{FF2B5EF4-FFF2-40B4-BE49-F238E27FC236}">
-                <a16:creationId xmlns:a16="http://schemas.microsoft.com/office/drawing/2014/main" id="{5E27CFE3-4B64-44A1-9D25-F80A3C161BCC}"/>
+                <a16:creationId xmlns:a16="http://schemas.microsoft.com/office/drawing/2014/main" xmlns="" id="{5E27CFE3-4B64-44A1-9D25-F80A3C161BCC}"/>
               </a:ext>
             </a:extLst>
           </p:cNvPr>
@@ -1975,6 +1993,7 @@
           <a:p>
             <a:fld id="{3C0888B6-2611-455B-98C8-35DDD406881E}" type="datetimeFigureOut">
               <a:rPr lang="en-IN" smtClean="0"/>
+              <a:pPr/>
               <a:t>12-01-2021</a:t>
             </a:fld>
             <a:endParaRPr lang="en-IN"/>
@@ -1986,7 +2005,7 @@
           <p:cNvPr id="4" name="Footer Placeholder 3">
             <a:extLst>
               <a:ext uri="{FF2B5EF4-FFF2-40B4-BE49-F238E27FC236}">
-                <a16:creationId xmlns:a16="http://schemas.microsoft.com/office/drawing/2014/main" id="{B1FA82DF-84FE-4188-8CBF-4C8322CDAD3E}"/>
+                <a16:creationId xmlns:a16="http://schemas.microsoft.com/office/drawing/2014/main" xmlns="" id="{B1FA82DF-84FE-4188-8CBF-4C8322CDAD3E}"/>
               </a:ext>
             </a:extLst>
           </p:cNvPr>
@@ -2011,7 +2030,7 @@
           <p:cNvPr id="5" name="Slide Number Placeholder 4">
             <a:extLst>
               <a:ext uri="{FF2B5EF4-FFF2-40B4-BE49-F238E27FC236}">
-                <a16:creationId xmlns:a16="http://schemas.microsoft.com/office/drawing/2014/main" id="{419290C7-AC76-46EE-93E5-76D208F14181}"/>
+                <a16:creationId xmlns:a16="http://schemas.microsoft.com/office/drawing/2014/main" xmlns="" id="{419290C7-AC76-46EE-93E5-76D208F14181}"/>
               </a:ext>
             </a:extLst>
           </p:cNvPr>
@@ -2029,6 +2048,7 @@
           <a:p>
             <a:fld id="{CAB1F108-064F-475E-A462-4516EB720120}" type="slidenum">
               <a:rPr lang="en-IN" smtClean="0"/>
+              <a:pPr/>
               <a:t>‹#›</a:t>
             </a:fld>
             <a:endParaRPr lang="en-IN"/>
@@ -2038,7 +2058,7 @@
     </p:spTree>
     <p:extLst>
       <p:ext uri="{BB962C8B-B14F-4D97-AF65-F5344CB8AC3E}">
-        <p14:creationId xmlns:p14="http://schemas.microsoft.com/office/powerpoint/2010/main" val="1452368178"/>
+        <p14:creationId xmlns:p14="http://schemas.microsoft.com/office/powerpoint/2010/main" xmlns="" val="1452368178"/>
       </p:ext>
     </p:extLst>
   </p:cSld>
@@ -2070,7 +2090,7 @@
           <p:cNvPr id="2" name="Date Placeholder 1">
             <a:extLst>
               <a:ext uri="{FF2B5EF4-FFF2-40B4-BE49-F238E27FC236}">
-                <a16:creationId xmlns:a16="http://schemas.microsoft.com/office/drawing/2014/main" id="{9FFFD8D1-B902-4402-AAE3-FB46C0652B38}"/>
+                <a16:creationId xmlns:a16="http://schemas.microsoft.com/office/drawing/2014/main" xmlns="" id="{9FFFD8D1-B902-4402-AAE3-FB46C0652B38}"/>
               </a:ext>
             </a:extLst>
           </p:cNvPr>
@@ -2088,6 +2108,7 @@
           <a:p>
             <a:fld id="{3C0888B6-2611-455B-98C8-35DDD406881E}" type="datetimeFigureOut">
               <a:rPr lang="en-IN" smtClean="0"/>
+              <a:pPr/>
               <a:t>12-01-2021</a:t>
             </a:fld>
             <a:endParaRPr lang="en-IN"/>
@@ -2099,7 +2120,7 @@
           <p:cNvPr id="3" name="Footer Placeholder 2">
             <a:extLst>
               <a:ext uri="{FF2B5EF4-FFF2-40B4-BE49-F238E27FC236}">
-                <a16:creationId xmlns:a16="http://schemas.microsoft.com/office/drawing/2014/main" id="{6E979347-9ABD-4780-BD0A-0F50D9ED1221}"/>
+                <a16:creationId xmlns:a16="http://schemas.microsoft.com/office/drawing/2014/main" xmlns="" id="{6E979347-9ABD-4780-BD0A-0F50D9ED1221}"/>
               </a:ext>
             </a:extLst>
           </p:cNvPr>
@@ -2124,7 +2145,7 @@
           <p:cNvPr id="4" name="Slide Number Placeholder 3">
             <a:extLst>
               <a:ext uri="{FF2B5EF4-FFF2-40B4-BE49-F238E27FC236}">
-                <a16:creationId xmlns:a16="http://schemas.microsoft.com/office/drawing/2014/main" id="{218A6041-0D6F-4539-B50C-CE10A2979AC7}"/>
+                <a16:creationId xmlns:a16="http://schemas.microsoft.com/office/drawing/2014/main" xmlns="" id="{218A6041-0D6F-4539-B50C-CE10A2979AC7}"/>
               </a:ext>
             </a:extLst>
           </p:cNvPr>
@@ -2142,6 +2163,7 @@
           <a:p>
             <a:fld id="{CAB1F108-064F-475E-A462-4516EB720120}" type="slidenum">
               <a:rPr lang="en-IN" smtClean="0"/>
+              <a:pPr/>
               <a:t>‹#›</a:t>
             </a:fld>
             <a:endParaRPr lang="en-IN"/>
@@ -2151,7 +2173,7 @@
     </p:spTree>
     <p:extLst>
       <p:ext uri="{BB962C8B-B14F-4D97-AF65-F5344CB8AC3E}">
-        <p14:creationId xmlns:p14="http://schemas.microsoft.com/office/powerpoint/2010/main" val="944180658"/>
+        <p14:creationId xmlns:p14="http://schemas.microsoft.com/office/powerpoint/2010/main" xmlns="" val="944180658"/>
       </p:ext>
     </p:extLst>
   </p:cSld>
@@ -2183,7 +2205,7 @@
           <p:cNvPr id="2" name="Title 1">
             <a:extLst>
               <a:ext uri="{FF2B5EF4-FFF2-40B4-BE49-F238E27FC236}">
-                <a16:creationId xmlns:a16="http://schemas.microsoft.com/office/drawing/2014/main" id="{FB85F2B6-9FD1-4FD9-ABAF-C41263DA981E}"/>
+                <a16:creationId xmlns:a16="http://schemas.microsoft.com/office/drawing/2014/main" xmlns="" id="{FB85F2B6-9FD1-4FD9-ABAF-C41263DA981E}"/>
               </a:ext>
             </a:extLst>
           </p:cNvPr>
@@ -2221,7 +2243,7 @@
           <p:cNvPr id="3" name="Content Placeholder 2">
             <a:extLst>
               <a:ext uri="{FF2B5EF4-FFF2-40B4-BE49-F238E27FC236}">
-                <a16:creationId xmlns:a16="http://schemas.microsoft.com/office/drawing/2014/main" id="{D3EBE77D-DC71-471D-BDF1-B69A1745488A}"/>
+                <a16:creationId xmlns:a16="http://schemas.microsoft.com/office/drawing/2014/main" xmlns="" id="{D3EBE77D-DC71-471D-BDF1-B69A1745488A}"/>
               </a:ext>
             </a:extLst>
           </p:cNvPr>
@@ -2312,7 +2334,7 @@
           <p:cNvPr id="4" name="Text Placeholder 3">
             <a:extLst>
               <a:ext uri="{FF2B5EF4-FFF2-40B4-BE49-F238E27FC236}">
-                <a16:creationId xmlns:a16="http://schemas.microsoft.com/office/drawing/2014/main" id="{76A39BAC-E7BA-4052-BBDB-58CEC953F197}"/>
+                <a16:creationId xmlns:a16="http://schemas.microsoft.com/office/drawing/2014/main" xmlns="" id="{76A39BAC-E7BA-4052-BBDB-58CEC953F197}"/>
               </a:ext>
             </a:extLst>
           </p:cNvPr>
@@ -2383,7 +2405,7 @@
           <p:cNvPr id="5" name="Date Placeholder 4">
             <a:extLst>
               <a:ext uri="{FF2B5EF4-FFF2-40B4-BE49-F238E27FC236}">
-                <a16:creationId xmlns:a16="http://schemas.microsoft.com/office/drawing/2014/main" id="{C10D966E-D90B-440E-B96A-66670F145584}"/>
+                <a16:creationId xmlns:a16="http://schemas.microsoft.com/office/drawing/2014/main" xmlns="" id="{C10D966E-D90B-440E-B96A-66670F145584}"/>
               </a:ext>
             </a:extLst>
           </p:cNvPr>
@@ -2401,6 +2423,7 @@
           <a:p>
             <a:fld id="{3C0888B6-2611-455B-98C8-35DDD406881E}" type="datetimeFigureOut">
               <a:rPr lang="en-IN" smtClean="0"/>
+              <a:pPr/>
               <a:t>12-01-2021</a:t>
             </a:fld>
             <a:endParaRPr lang="en-IN"/>
@@ -2412,7 +2435,7 @@
           <p:cNvPr id="6" name="Footer Placeholder 5">
             <a:extLst>
               <a:ext uri="{FF2B5EF4-FFF2-40B4-BE49-F238E27FC236}">
-                <a16:creationId xmlns:a16="http://schemas.microsoft.com/office/drawing/2014/main" id="{35DF1BB7-42FD-4A07-914B-F8ADF816690D}"/>
+                <a16:creationId xmlns:a16="http://schemas.microsoft.com/office/drawing/2014/main" xmlns="" id="{35DF1BB7-42FD-4A07-914B-F8ADF816690D}"/>
               </a:ext>
             </a:extLst>
           </p:cNvPr>
@@ -2437,7 +2460,7 @@
           <p:cNvPr id="7" name="Slide Number Placeholder 6">
             <a:extLst>
               <a:ext uri="{FF2B5EF4-FFF2-40B4-BE49-F238E27FC236}">
-                <a16:creationId xmlns:a16="http://schemas.microsoft.com/office/drawing/2014/main" id="{34E46074-9BF2-49AA-8410-17BD0DBB6A6C}"/>
+                <a16:creationId xmlns:a16="http://schemas.microsoft.com/office/drawing/2014/main" xmlns="" id="{34E46074-9BF2-49AA-8410-17BD0DBB6A6C}"/>
               </a:ext>
             </a:extLst>
           </p:cNvPr>
@@ -2455,6 +2478,7 @@
           <a:p>
             <a:fld id="{CAB1F108-064F-475E-A462-4516EB720120}" type="slidenum">
               <a:rPr lang="en-IN" smtClean="0"/>
+              <a:pPr/>
               <a:t>‹#›</a:t>
             </a:fld>
             <a:endParaRPr lang="en-IN"/>
@@ -2464,7 +2488,7 @@
     </p:spTree>
     <p:extLst>
       <p:ext uri="{BB962C8B-B14F-4D97-AF65-F5344CB8AC3E}">
-        <p14:creationId xmlns:p14="http://schemas.microsoft.com/office/powerpoint/2010/main" val="2668895941"/>
+        <p14:creationId xmlns:p14="http://schemas.microsoft.com/office/powerpoint/2010/main" xmlns="" val="2668895941"/>
       </p:ext>
     </p:extLst>
   </p:cSld>
@@ -2496,7 +2520,7 @@
           <p:cNvPr id="2" name="Title 1">
             <a:extLst>
               <a:ext uri="{FF2B5EF4-FFF2-40B4-BE49-F238E27FC236}">
-                <a16:creationId xmlns:a16="http://schemas.microsoft.com/office/drawing/2014/main" id="{00F2E5B5-C4DE-4EFD-BDE4-0A133780B14C}"/>
+                <a16:creationId xmlns:a16="http://schemas.microsoft.com/office/drawing/2014/main" xmlns="" id="{00F2E5B5-C4DE-4EFD-BDE4-0A133780B14C}"/>
               </a:ext>
             </a:extLst>
           </p:cNvPr>
@@ -2534,7 +2558,7 @@
           <p:cNvPr id="3" name="Picture Placeholder 2">
             <a:extLst>
               <a:ext uri="{FF2B5EF4-FFF2-40B4-BE49-F238E27FC236}">
-                <a16:creationId xmlns:a16="http://schemas.microsoft.com/office/drawing/2014/main" id="{E7B65338-5EE2-4D65-81BE-AE4C30BF32BF}"/>
+                <a16:creationId xmlns:a16="http://schemas.microsoft.com/office/drawing/2014/main" xmlns="" id="{E7B65338-5EE2-4D65-81BE-AE4C30BF32BF}"/>
               </a:ext>
             </a:extLst>
           </p:cNvPr>
@@ -2601,7 +2625,7 @@
           <p:cNvPr id="4" name="Text Placeholder 3">
             <a:extLst>
               <a:ext uri="{FF2B5EF4-FFF2-40B4-BE49-F238E27FC236}">
-                <a16:creationId xmlns:a16="http://schemas.microsoft.com/office/drawing/2014/main" id="{E9DEF48D-F5FB-4B17-881C-908285AF10EA}"/>
+                <a16:creationId xmlns:a16="http://schemas.microsoft.com/office/drawing/2014/main" xmlns="" id="{E9DEF48D-F5FB-4B17-881C-908285AF10EA}"/>
               </a:ext>
             </a:extLst>
           </p:cNvPr>
@@ -2672,7 +2696,7 @@
           <p:cNvPr id="5" name="Date Placeholder 4">
             <a:extLst>
               <a:ext uri="{FF2B5EF4-FFF2-40B4-BE49-F238E27FC236}">
-                <a16:creationId xmlns:a16="http://schemas.microsoft.com/office/drawing/2014/main" id="{11AECE27-74D3-46D9-ADC6-597C38F4F233}"/>
+                <a16:creationId xmlns:a16="http://schemas.microsoft.com/office/drawing/2014/main" xmlns="" id="{11AECE27-74D3-46D9-ADC6-597C38F4F233}"/>
               </a:ext>
             </a:extLst>
           </p:cNvPr>
@@ -2690,6 +2714,7 @@
           <a:p>
             <a:fld id="{3C0888B6-2611-455B-98C8-35DDD406881E}" type="datetimeFigureOut">
               <a:rPr lang="en-IN" smtClean="0"/>
+              <a:pPr/>
               <a:t>12-01-2021</a:t>
             </a:fld>
             <a:endParaRPr lang="en-IN"/>
@@ -2701,7 +2726,7 @@
           <p:cNvPr id="6" name="Footer Placeholder 5">
             <a:extLst>
               <a:ext uri="{FF2B5EF4-FFF2-40B4-BE49-F238E27FC236}">
-                <a16:creationId xmlns:a16="http://schemas.microsoft.com/office/drawing/2014/main" id="{15F202F8-F2A1-40FE-A44B-610D480E5550}"/>
+                <a16:creationId xmlns:a16="http://schemas.microsoft.com/office/drawing/2014/main" xmlns="" id="{15F202F8-F2A1-40FE-A44B-610D480E5550}"/>
               </a:ext>
             </a:extLst>
           </p:cNvPr>
@@ -2726,7 +2751,7 @@
           <p:cNvPr id="7" name="Slide Number Placeholder 6">
             <a:extLst>
               <a:ext uri="{FF2B5EF4-FFF2-40B4-BE49-F238E27FC236}">
-                <a16:creationId xmlns:a16="http://schemas.microsoft.com/office/drawing/2014/main" id="{83FD616D-3558-4EC7-8B7B-2A034FFDAAFE}"/>
+                <a16:creationId xmlns:a16="http://schemas.microsoft.com/office/drawing/2014/main" xmlns="" id="{83FD616D-3558-4EC7-8B7B-2A034FFDAAFE}"/>
               </a:ext>
             </a:extLst>
           </p:cNvPr>
@@ -2744,6 +2769,7 @@
           <a:p>
             <a:fld id="{CAB1F108-064F-475E-A462-4516EB720120}" type="slidenum">
               <a:rPr lang="en-IN" smtClean="0"/>
+              <a:pPr/>
               <a:t>‹#›</a:t>
             </a:fld>
             <a:endParaRPr lang="en-IN"/>
@@ -2753,7 +2779,7 @@
     </p:spTree>
     <p:extLst>
       <p:ext uri="{BB962C8B-B14F-4D97-AF65-F5344CB8AC3E}">
-        <p14:creationId xmlns:p14="http://schemas.microsoft.com/office/powerpoint/2010/main" val="2184077469"/>
+        <p14:creationId xmlns:p14="http://schemas.microsoft.com/office/powerpoint/2010/main" xmlns="" val="2184077469"/>
       </p:ext>
     </p:extLst>
   </p:cSld>
@@ -2790,7 +2816,7 @@
           <p:cNvPr id="2" name="Title Placeholder 1">
             <a:extLst>
               <a:ext uri="{FF2B5EF4-FFF2-40B4-BE49-F238E27FC236}">
-                <a16:creationId xmlns:a16="http://schemas.microsoft.com/office/drawing/2014/main" id="{FBE6CEDA-3E98-4A26-806B-8F5AFE372393}"/>
+                <a16:creationId xmlns:a16="http://schemas.microsoft.com/office/drawing/2014/main" xmlns="" id="{FBE6CEDA-3E98-4A26-806B-8F5AFE372393}"/>
               </a:ext>
             </a:extLst>
           </p:cNvPr>
@@ -2829,7 +2855,7 @@
           <p:cNvPr id="3" name="Text Placeholder 2">
             <a:extLst>
               <a:ext uri="{FF2B5EF4-FFF2-40B4-BE49-F238E27FC236}">
-                <a16:creationId xmlns:a16="http://schemas.microsoft.com/office/drawing/2014/main" id="{DACF1E77-2589-4E7D-A080-A58209A8DF36}"/>
+                <a16:creationId xmlns:a16="http://schemas.microsoft.com/office/drawing/2014/main" xmlns="" id="{DACF1E77-2589-4E7D-A080-A58209A8DF36}"/>
               </a:ext>
             </a:extLst>
           </p:cNvPr>
@@ -2897,7 +2923,7 @@
           <p:cNvPr id="4" name="Date Placeholder 3">
             <a:extLst>
               <a:ext uri="{FF2B5EF4-FFF2-40B4-BE49-F238E27FC236}">
-                <a16:creationId xmlns:a16="http://schemas.microsoft.com/office/drawing/2014/main" id="{0384E2E4-C02E-4929-9865-9AEB771DC7C9}"/>
+                <a16:creationId xmlns:a16="http://schemas.microsoft.com/office/drawing/2014/main" xmlns="" id="{0384E2E4-C02E-4929-9865-9AEB771DC7C9}"/>
               </a:ext>
             </a:extLst>
           </p:cNvPr>
@@ -2933,6 +2959,7 @@
           <a:p>
             <a:fld id="{3C0888B6-2611-455B-98C8-35DDD406881E}" type="datetimeFigureOut">
               <a:rPr lang="en-IN" smtClean="0"/>
+              <a:pPr/>
               <a:t>12-01-2021</a:t>
             </a:fld>
             <a:endParaRPr lang="en-IN"/>
@@ -2944,7 +2971,7 @@
           <p:cNvPr id="5" name="Footer Placeholder 4">
             <a:extLst>
               <a:ext uri="{FF2B5EF4-FFF2-40B4-BE49-F238E27FC236}">
-                <a16:creationId xmlns:a16="http://schemas.microsoft.com/office/drawing/2014/main" id="{F95FCA53-FA49-476E-9FE8-579B3F0C7D3B}"/>
+                <a16:creationId xmlns:a16="http://schemas.microsoft.com/office/drawing/2014/main" xmlns="" id="{F95FCA53-FA49-476E-9FE8-579B3F0C7D3B}"/>
               </a:ext>
             </a:extLst>
           </p:cNvPr>
@@ -2987,7 +3014,7 @@
           <p:cNvPr id="6" name="Slide Number Placeholder 5">
             <a:extLst>
               <a:ext uri="{FF2B5EF4-FFF2-40B4-BE49-F238E27FC236}">
-                <a16:creationId xmlns:a16="http://schemas.microsoft.com/office/drawing/2014/main" id="{F90733DF-BB0B-484A-887B-293A8504F19C}"/>
+                <a16:creationId xmlns:a16="http://schemas.microsoft.com/office/drawing/2014/main" xmlns="" id="{F90733DF-BB0B-484A-887B-293A8504F19C}"/>
               </a:ext>
             </a:extLst>
           </p:cNvPr>
@@ -3023,6 +3050,7 @@
           <a:p>
             <a:fld id="{CAB1F108-064F-475E-A462-4516EB720120}" type="slidenum">
               <a:rPr lang="en-IN" smtClean="0"/>
+              <a:pPr/>
               <a:t>‹#›</a:t>
             </a:fld>
             <a:endParaRPr lang="en-IN"/>
@@ -3032,7 +3060,7 @@
     </p:spTree>
     <p:extLst>
       <p:ext uri="{BB962C8B-B14F-4D97-AF65-F5344CB8AC3E}">
-        <p14:creationId xmlns:p14="http://schemas.microsoft.com/office/powerpoint/2010/main" val="1815430498"/>
+        <p14:creationId xmlns:p14="http://schemas.microsoft.com/office/powerpoint/2010/main" xmlns="" val="1815430498"/>
       </p:ext>
     </p:extLst>
   </p:cSld>
@@ -3363,10 +3391,10 @@
           <p:cNvPr id="13" name="Rectangle 7">
             <a:extLst>
               <a:ext uri="{FF2B5EF4-FFF2-40B4-BE49-F238E27FC236}">
-                <a16:creationId xmlns:a16="http://schemas.microsoft.com/office/drawing/2014/main" id="{88294908-8B00-4F58-BBBA-20F71A40AA9E}"/>
+                <a16:creationId xmlns:a16="http://schemas.microsoft.com/office/drawing/2014/main" xmlns="" id="{88294908-8B00-4F58-BBBA-20F71A40AA9E}"/>
               </a:ext>
               <a:ext uri="{C183D7F6-B498-43B3-948B-1728B52AA6E4}">
-                <adec:decorative xmlns:adec="http://schemas.microsoft.com/office/drawing/2017/decorative" val="1"/>
+                <adec:decorative xmlns:adec="http://schemas.microsoft.com/office/drawing/2017/decorative" xmlns="" val="1"/>
               </a:ext>
             </a:extLst>
           </p:cNvPr>
@@ -3376,7 +3404,7 @@
           <p:nvPr>
             <p:extLst>
               <p:ext uri="{386F3935-93C4-4BCD-93E2-E3B085C9AB24}">
-                <p16:designElem xmlns:p16="http://schemas.microsoft.com/office/powerpoint/2015/main" val="1"/>
+                <p16:designElem xmlns:p16="http://schemas.microsoft.com/office/powerpoint/2015/main" xmlns="" val="1"/>
               </p:ext>
             </p:extLst>
           </p:nvPr>
@@ -3426,10 +3454,10 @@
           <p:cNvPr id="15" name="Freeform: Shape 9">
             <a:extLst>
               <a:ext uri="{FF2B5EF4-FFF2-40B4-BE49-F238E27FC236}">
-                <a16:creationId xmlns:a16="http://schemas.microsoft.com/office/drawing/2014/main" id="{4364C879-1404-4203-8E9D-CC5DE0A621A2}"/>
+                <a16:creationId xmlns:a16="http://schemas.microsoft.com/office/drawing/2014/main" xmlns="" id="{4364C879-1404-4203-8E9D-CC5DE0A621A2}"/>
               </a:ext>
               <a:ext uri="{C183D7F6-B498-43B3-948B-1728B52AA6E4}">
-                <adec:decorative xmlns:adec="http://schemas.microsoft.com/office/drawing/2017/decorative" val="1"/>
+                <adec:decorative xmlns:adec="http://schemas.microsoft.com/office/drawing/2017/decorative" xmlns="" val="1"/>
               </a:ext>
             </a:extLst>
           </p:cNvPr>
@@ -3439,7 +3467,7 @@
           <p:nvPr>
             <p:extLst>
               <p:ext uri="{386F3935-93C4-4BCD-93E2-E3B085C9AB24}">
-                <p16:designElem xmlns:p16="http://schemas.microsoft.com/office/powerpoint/2015/main" val="1"/>
+                <p16:designElem xmlns:p16="http://schemas.microsoft.com/office/powerpoint/2015/main" xmlns="" val="1"/>
               </p:ext>
             </p:extLst>
           </p:nvPr>
@@ -3536,10 +3564,10 @@
           <p:cNvPr id="12" name="Freeform: Shape 11">
             <a:extLst>
               <a:ext uri="{FF2B5EF4-FFF2-40B4-BE49-F238E27FC236}">
-                <a16:creationId xmlns:a16="http://schemas.microsoft.com/office/drawing/2014/main" id="{84617302-4B0D-4351-A6BB-6F0930D943AC}"/>
+                <a16:creationId xmlns:a16="http://schemas.microsoft.com/office/drawing/2014/main" xmlns="" id="{84617302-4B0D-4351-A6BB-6F0930D943AC}"/>
               </a:ext>
               <a:ext uri="{C183D7F6-B498-43B3-948B-1728B52AA6E4}">
-                <adec:decorative xmlns:adec="http://schemas.microsoft.com/office/drawing/2017/decorative" val="1"/>
+                <adec:decorative xmlns:adec="http://schemas.microsoft.com/office/drawing/2017/decorative" xmlns="" val="1"/>
               </a:ext>
             </a:extLst>
           </p:cNvPr>
@@ -3549,7 +3577,7 @@
           <p:nvPr>
             <p:extLst>
               <p:ext uri="{386F3935-93C4-4BCD-93E2-E3B085C9AB24}">
-                <p16:designElem xmlns:p16="http://schemas.microsoft.com/office/powerpoint/2015/main" val="1"/>
+                <p16:designElem xmlns:p16="http://schemas.microsoft.com/office/powerpoint/2015/main" xmlns="" val="1"/>
               </p:ext>
             </p:extLst>
           </p:nvPr>
@@ -3654,10 +3682,10 @@
           <p:cNvPr id="14" name="Freeform: Shape 13">
             <a:extLst>
               <a:ext uri="{FF2B5EF4-FFF2-40B4-BE49-F238E27FC236}">
-                <a16:creationId xmlns:a16="http://schemas.microsoft.com/office/drawing/2014/main" id="{DA2C7802-C2E0-4218-8F89-8DD7CCD2CD1C}"/>
+                <a16:creationId xmlns:a16="http://schemas.microsoft.com/office/drawing/2014/main" xmlns="" id="{DA2C7802-C2E0-4218-8F89-8DD7CCD2CD1C}"/>
               </a:ext>
               <a:ext uri="{C183D7F6-B498-43B3-948B-1728B52AA6E4}">
-                <adec:decorative xmlns:adec="http://schemas.microsoft.com/office/drawing/2017/decorative" val="1"/>
+                <adec:decorative xmlns:adec="http://schemas.microsoft.com/office/drawing/2017/decorative" xmlns="" val="1"/>
               </a:ext>
             </a:extLst>
           </p:cNvPr>
@@ -3667,7 +3695,7 @@
           <p:nvPr>
             <p:extLst>
               <p:ext uri="{386F3935-93C4-4BCD-93E2-E3B085C9AB24}">
-                <p16:designElem xmlns:p16="http://schemas.microsoft.com/office/powerpoint/2015/main" val="1"/>
+                <p16:designElem xmlns:p16="http://schemas.microsoft.com/office/powerpoint/2015/main" xmlns="" val="1"/>
               </p:ext>
             </p:extLst>
           </p:nvPr>
@@ -3764,10 +3792,10 @@
           <p:cNvPr id="16" name="Rectangle 15">
             <a:extLst>
               <a:ext uri="{FF2B5EF4-FFF2-40B4-BE49-F238E27FC236}">
-                <a16:creationId xmlns:a16="http://schemas.microsoft.com/office/drawing/2014/main" id="{A6D7111A-21E5-4EE9-8A78-10E5530F0116}"/>
+                <a16:creationId xmlns:a16="http://schemas.microsoft.com/office/drawing/2014/main" xmlns="" id="{A6D7111A-21E5-4EE9-8A78-10E5530F0116}"/>
               </a:ext>
               <a:ext uri="{C183D7F6-B498-43B3-948B-1728B52AA6E4}">
-                <adec:decorative xmlns:adec="http://schemas.microsoft.com/office/drawing/2017/decorative" val="1"/>
+                <adec:decorative xmlns:adec="http://schemas.microsoft.com/office/drawing/2017/decorative" xmlns="" val="1"/>
               </a:ext>
             </a:extLst>
           </p:cNvPr>
@@ -3777,7 +3805,7 @@
           <p:nvPr>
             <p:extLst>
               <p:ext uri="{386F3935-93C4-4BCD-93E2-E3B085C9AB24}">
-                <p16:designElem xmlns:p16="http://schemas.microsoft.com/office/powerpoint/2015/main" val="1"/>
+                <p16:designElem xmlns:p16="http://schemas.microsoft.com/office/powerpoint/2015/main" xmlns="" val="1"/>
               </p:ext>
             </p:extLst>
           </p:nvPr>
@@ -3831,10 +3859,10 @@
           <p:cNvPr id="18" name="Freeform: Shape 17">
             <a:extLst>
               <a:ext uri="{FF2B5EF4-FFF2-40B4-BE49-F238E27FC236}">
-                <a16:creationId xmlns:a16="http://schemas.microsoft.com/office/drawing/2014/main" id="{A3969E80-A77B-49FC-9122-D89AFD5EE118}"/>
+                <a16:creationId xmlns:a16="http://schemas.microsoft.com/office/drawing/2014/main" xmlns="" id="{A3969E80-A77B-49FC-9122-D89AFD5EE118}"/>
               </a:ext>
               <a:ext uri="{C183D7F6-B498-43B3-948B-1728B52AA6E4}">
-                <adec:decorative xmlns:adec="http://schemas.microsoft.com/office/drawing/2017/decorative" val="1"/>
+                <adec:decorative xmlns:adec="http://schemas.microsoft.com/office/drawing/2017/decorative" xmlns="" val="1"/>
               </a:ext>
             </a:extLst>
           </p:cNvPr>
@@ -3844,7 +3872,7 @@
           <p:nvPr>
             <p:extLst>
               <p:ext uri="{386F3935-93C4-4BCD-93E2-E3B085C9AB24}">
-                <p16:designElem xmlns:p16="http://schemas.microsoft.com/office/powerpoint/2015/main" val="1"/>
+                <p16:designElem xmlns:p16="http://schemas.microsoft.com/office/powerpoint/2015/main" xmlns="" val="1"/>
               </p:ext>
             </p:extLst>
           </p:nvPr>
@@ -3949,10 +3977,10 @@
           <p:cNvPr id="20" name="Rectangle 19">
             <a:extLst>
               <a:ext uri="{FF2B5EF4-FFF2-40B4-BE49-F238E27FC236}">
-                <a16:creationId xmlns:a16="http://schemas.microsoft.com/office/drawing/2014/main" id="{1849CA57-76BD-4CF2-80BA-D7A46A01B7B1}"/>
+                <a16:creationId xmlns:a16="http://schemas.microsoft.com/office/drawing/2014/main" xmlns="" id="{1849CA57-76BD-4CF2-80BA-D7A46A01B7B1}"/>
               </a:ext>
               <a:ext uri="{C183D7F6-B498-43B3-948B-1728B52AA6E4}">
-                <adec:decorative xmlns:adec="http://schemas.microsoft.com/office/drawing/2017/decorative" val="1"/>
+                <adec:decorative xmlns:adec="http://schemas.microsoft.com/office/drawing/2017/decorative" xmlns="" val="1"/>
               </a:ext>
             </a:extLst>
           </p:cNvPr>
@@ -3962,7 +3990,7 @@
           <p:nvPr>
             <p:extLst>
               <p:ext uri="{386F3935-93C4-4BCD-93E2-E3B085C9AB24}">
-                <p16:designElem xmlns:p16="http://schemas.microsoft.com/office/powerpoint/2015/main" val="1"/>
+                <p16:designElem xmlns:p16="http://schemas.microsoft.com/office/powerpoint/2015/main" xmlns="" val="1"/>
               </p:ext>
             </p:extLst>
           </p:nvPr>
@@ -4027,10 +4055,10 @@
           <p:cNvPr id="22" name="Freeform: Shape 21">
             <a:extLst>
               <a:ext uri="{FF2B5EF4-FFF2-40B4-BE49-F238E27FC236}">
-                <a16:creationId xmlns:a16="http://schemas.microsoft.com/office/drawing/2014/main" id="{35E9085E-E730-4768-83D4-6CB7E9897153}"/>
+                <a16:creationId xmlns:a16="http://schemas.microsoft.com/office/drawing/2014/main" xmlns="" id="{35E9085E-E730-4768-83D4-6CB7E9897153}"/>
               </a:ext>
               <a:ext uri="{C183D7F6-B498-43B3-948B-1728B52AA6E4}">
-                <adec:decorative xmlns:adec="http://schemas.microsoft.com/office/drawing/2017/decorative" val="1"/>
+                <adec:decorative xmlns:adec="http://schemas.microsoft.com/office/drawing/2017/decorative" xmlns="" val="1"/>
               </a:ext>
             </a:extLst>
           </p:cNvPr>
@@ -4040,7 +4068,7 @@
           <p:nvPr>
             <p:extLst>
               <p:ext uri="{386F3935-93C4-4BCD-93E2-E3B085C9AB24}">
-                <p16:designElem xmlns:p16="http://schemas.microsoft.com/office/powerpoint/2015/main" val="1"/>
+                <p16:designElem xmlns:p16="http://schemas.microsoft.com/office/powerpoint/2015/main" xmlns="" val="1"/>
               </p:ext>
             </p:extLst>
           </p:nvPr>
@@ -4151,10 +4179,10 @@
           <p:cNvPr id="24" name="Freeform: Shape 23">
             <a:extLst>
               <a:ext uri="{FF2B5EF4-FFF2-40B4-BE49-F238E27FC236}">
-                <a16:creationId xmlns:a16="http://schemas.microsoft.com/office/drawing/2014/main" id="{973272FE-A474-4CAE-8CA2-BCC8B476C3F4}"/>
+                <a16:creationId xmlns:a16="http://schemas.microsoft.com/office/drawing/2014/main" xmlns="" id="{973272FE-A474-4CAE-8CA2-BCC8B476C3F4}"/>
               </a:ext>
               <a:ext uri="{C183D7F6-B498-43B3-948B-1728B52AA6E4}">
-                <adec:decorative xmlns:adec="http://schemas.microsoft.com/office/drawing/2017/decorative" val="1"/>
+                <adec:decorative xmlns:adec="http://schemas.microsoft.com/office/drawing/2017/decorative" xmlns="" val="1"/>
               </a:ext>
             </a:extLst>
           </p:cNvPr>
@@ -4164,7 +4192,7 @@
           <p:nvPr>
             <p:extLst>
               <p:ext uri="{386F3935-93C4-4BCD-93E2-E3B085C9AB24}">
-                <p16:designElem xmlns:p16="http://schemas.microsoft.com/office/powerpoint/2015/main" val="1"/>
+                <p16:designElem xmlns:p16="http://schemas.microsoft.com/office/powerpoint/2015/main" xmlns="" val="1"/>
               </p:ext>
             </p:extLst>
           </p:nvPr>
@@ -4330,10 +4358,10 @@
           <p:cNvPr id="26" name="Freeform: Shape 25">
             <a:extLst>
               <a:ext uri="{FF2B5EF4-FFF2-40B4-BE49-F238E27FC236}">
-                <a16:creationId xmlns:a16="http://schemas.microsoft.com/office/drawing/2014/main" id="{E07981EA-05A6-437C-88D7-B377B92B031D}"/>
+                <a16:creationId xmlns:a16="http://schemas.microsoft.com/office/drawing/2014/main" xmlns="" id="{E07981EA-05A6-437C-88D7-B377B92B031D}"/>
               </a:ext>
               <a:ext uri="{C183D7F6-B498-43B3-948B-1728B52AA6E4}">
-                <adec:decorative xmlns:adec="http://schemas.microsoft.com/office/drawing/2017/decorative" val="1"/>
+                <adec:decorative xmlns:adec="http://schemas.microsoft.com/office/drawing/2017/decorative" xmlns="" val="1"/>
               </a:ext>
             </a:extLst>
           </p:cNvPr>
@@ -4343,7 +4371,7 @@
           <p:nvPr>
             <p:extLst>
               <p:ext uri="{386F3935-93C4-4BCD-93E2-E3B085C9AB24}">
-                <p16:designElem xmlns:p16="http://schemas.microsoft.com/office/powerpoint/2015/main" val="1"/>
+                <p16:designElem xmlns:p16="http://schemas.microsoft.com/office/powerpoint/2015/main" xmlns="" val="1"/>
               </p:ext>
             </p:extLst>
           </p:nvPr>
@@ -4440,10 +4468,10 @@
           <p:cNvPr id="28" name="Rectangle 27">
             <a:extLst>
               <a:ext uri="{FF2B5EF4-FFF2-40B4-BE49-F238E27FC236}">
-                <a16:creationId xmlns:a16="http://schemas.microsoft.com/office/drawing/2014/main" id="{15E3C750-986E-4769-B1AE-49289FBEE757}"/>
+                <a16:creationId xmlns:a16="http://schemas.microsoft.com/office/drawing/2014/main" xmlns="" id="{15E3C750-986E-4769-B1AE-49289FBEE757}"/>
               </a:ext>
               <a:ext uri="{C183D7F6-B498-43B3-948B-1728B52AA6E4}">
-                <adec:decorative xmlns:adec="http://schemas.microsoft.com/office/drawing/2017/decorative" val="1"/>
+                <adec:decorative xmlns:adec="http://schemas.microsoft.com/office/drawing/2017/decorative" xmlns="" val="1"/>
               </a:ext>
             </a:extLst>
           </p:cNvPr>
@@ -4453,7 +4481,7 @@
           <p:nvPr>
             <p:extLst>
               <p:ext uri="{386F3935-93C4-4BCD-93E2-E3B085C9AB24}">
-                <p16:designElem xmlns:p16="http://schemas.microsoft.com/office/powerpoint/2015/main" val="1"/>
+                <p16:designElem xmlns:p16="http://schemas.microsoft.com/office/powerpoint/2015/main" xmlns="" val="1"/>
               </p:ext>
             </p:extLst>
           </p:nvPr>
@@ -4507,7 +4535,7 @@
           <p:cNvPr id="4" name="Rectangle 3">
             <a:extLst>
               <a:ext uri="{FF2B5EF4-FFF2-40B4-BE49-F238E27FC236}">
-                <a16:creationId xmlns:a16="http://schemas.microsoft.com/office/drawing/2014/main" id="{92FCA41B-9033-4D94-9067-838739F3E5B1}"/>
+                <a16:creationId xmlns:a16="http://schemas.microsoft.com/office/drawing/2014/main" xmlns="" id="{92FCA41B-9033-4D94-9067-838739F3E5B1}"/>
               </a:ext>
             </a:extLst>
           </p:cNvPr>
@@ -4602,7 +4630,7 @@
           <p:cNvPr id="17" name="Group 16">
             <a:extLst>
               <a:ext uri="{FF2B5EF4-FFF2-40B4-BE49-F238E27FC236}">
-                <a16:creationId xmlns:a16="http://schemas.microsoft.com/office/drawing/2014/main" id="{79E4504B-19F0-4719-B7D4-549155EDED47}"/>
+                <a16:creationId xmlns:a16="http://schemas.microsoft.com/office/drawing/2014/main" xmlns="" id="{79E4504B-19F0-4719-B7D4-549155EDED47}"/>
               </a:ext>
             </a:extLst>
           </p:cNvPr>
@@ -4622,7 +4650,7 @@
             <p:cNvPr id="6" name="Rectangle 5">
               <a:extLst>
                 <a:ext uri="{FF2B5EF4-FFF2-40B4-BE49-F238E27FC236}">
-                  <a16:creationId xmlns:a16="http://schemas.microsoft.com/office/drawing/2014/main" id="{5274D6E9-0A1A-44C6-9E10-2A64326D4783}"/>
+                  <a16:creationId xmlns:a16="http://schemas.microsoft.com/office/drawing/2014/main" xmlns="" id="{5274D6E9-0A1A-44C6-9E10-2A64326D4783}"/>
                 </a:ext>
               </a:extLst>
             </p:cNvPr>
@@ -4676,7 +4704,7 @@
             <p:cNvPr id="7" name="Rectangle 6">
               <a:extLst>
                 <a:ext uri="{FF2B5EF4-FFF2-40B4-BE49-F238E27FC236}">
-                  <a16:creationId xmlns:a16="http://schemas.microsoft.com/office/drawing/2014/main" id="{54612C29-7094-4EE4-87BA-1CAE8FB4C31A}"/>
+                  <a16:creationId xmlns:a16="http://schemas.microsoft.com/office/drawing/2014/main" xmlns="" id="{54612C29-7094-4EE4-87BA-1CAE8FB4C31A}"/>
                 </a:ext>
               </a:extLst>
             </p:cNvPr>
@@ -4780,7 +4808,7 @@
           <p:cNvPr id="19" name="Rectangle 18">
             <a:extLst>
               <a:ext uri="{FF2B5EF4-FFF2-40B4-BE49-F238E27FC236}">
-                <a16:creationId xmlns:a16="http://schemas.microsoft.com/office/drawing/2014/main" id="{FC9913EC-FF8C-4F30-B459-2F0D5CE937B9}"/>
+                <a16:creationId xmlns:a16="http://schemas.microsoft.com/office/drawing/2014/main" xmlns="" id="{FC9913EC-FF8C-4F30-B459-2F0D5CE937B9}"/>
               </a:ext>
             </a:extLst>
           </p:cNvPr>
@@ -4843,7 +4871,7 @@
           <p:cNvPr id="23" name="Graphic 22">
             <a:extLst>
               <a:ext uri="{FF2B5EF4-FFF2-40B4-BE49-F238E27FC236}">
-                <a16:creationId xmlns:a16="http://schemas.microsoft.com/office/drawing/2014/main" id="{924AABE1-5EB4-490C-87BF-36A13AB22655}"/>
+                <a16:creationId xmlns:a16="http://schemas.microsoft.com/office/drawing/2014/main" xmlns="" id="{924AABE1-5EB4-490C-87BF-36A13AB22655}"/>
               </a:ext>
             </a:extLst>
           </p:cNvPr>
@@ -4853,13 +4881,13 @@
           <p:nvPr/>
         </p:nvPicPr>
         <p:blipFill>
-          <a:blip r:embed="rId2" cstate="hqprint">
+          <a:blip r:embed="rId2" cstate="print">
             <a:extLst>
               <a:ext uri="{28A0092B-C50C-407E-A947-70E740481C1C}">
-                <a14:useLocalDpi xmlns:a14="http://schemas.microsoft.com/office/drawing/2010/main" val="0"/>
+                <a14:useLocalDpi xmlns:a14="http://schemas.microsoft.com/office/drawing/2010/main" xmlns="" val="0"/>
               </a:ext>
               <a:ext uri="{96DAC541-7B7A-43D3-8B79-37D633B846F1}">
-                <asvg:svgBlip xmlns:asvg="http://schemas.microsoft.com/office/drawing/2016/SVG/main" r:embed="rId3"/>
+                <asvg:svgBlip xmlns:asvg="http://schemas.microsoft.com/office/drawing/2016/SVG/main" xmlns="" r:embed="rId3"/>
               </a:ext>
             </a:extLst>
           </a:blip>
@@ -4880,7 +4908,7 @@
     </p:spTree>
     <p:extLst>
       <p:ext uri="{BB962C8B-B14F-4D97-AF65-F5344CB8AC3E}">
-        <p14:creationId xmlns:p14="http://schemas.microsoft.com/office/powerpoint/2010/main" val="624867750"/>
+        <p14:creationId xmlns:p14="http://schemas.microsoft.com/office/powerpoint/2010/main" xmlns="" val="624867750"/>
       </p:ext>
     </p:extLst>
   </p:cSld>
@@ -4920,10 +4948,10 @@
           <p:cNvPr id="13" name="Rectangle 7">
             <a:extLst>
               <a:ext uri="{FF2B5EF4-FFF2-40B4-BE49-F238E27FC236}">
-                <a16:creationId xmlns:a16="http://schemas.microsoft.com/office/drawing/2014/main" id="{88294908-8B00-4F58-BBBA-20F71A40AA9E}"/>
+                <a16:creationId xmlns:a16="http://schemas.microsoft.com/office/drawing/2014/main" xmlns="" id="{88294908-8B00-4F58-BBBA-20F71A40AA9E}"/>
               </a:ext>
               <a:ext uri="{C183D7F6-B498-43B3-948B-1728B52AA6E4}">
-                <adec:decorative xmlns:adec="http://schemas.microsoft.com/office/drawing/2017/decorative" val="1"/>
+                <adec:decorative xmlns:adec="http://schemas.microsoft.com/office/drawing/2017/decorative" xmlns="" val="1"/>
               </a:ext>
             </a:extLst>
           </p:cNvPr>
@@ -4933,7 +4961,7 @@
           <p:nvPr>
             <p:extLst>
               <p:ext uri="{386F3935-93C4-4BCD-93E2-E3B085C9AB24}">
-                <p16:designElem xmlns:p16="http://schemas.microsoft.com/office/powerpoint/2015/main" val="1"/>
+                <p16:designElem xmlns:p16="http://schemas.microsoft.com/office/powerpoint/2015/main" xmlns="" val="1"/>
               </p:ext>
             </p:extLst>
           </p:nvPr>
@@ -4983,10 +5011,10 @@
           <p:cNvPr id="15" name="Freeform: Shape 9">
             <a:extLst>
               <a:ext uri="{FF2B5EF4-FFF2-40B4-BE49-F238E27FC236}">
-                <a16:creationId xmlns:a16="http://schemas.microsoft.com/office/drawing/2014/main" id="{4364C879-1404-4203-8E9D-CC5DE0A621A2}"/>
+                <a16:creationId xmlns:a16="http://schemas.microsoft.com/office/drawing/2014/main" xmlns="" id="{4364C879-1404-4203-8E9D-CC5DE0A621A2}"/>
               </a:ext>
               <a:ext uri="{C183D7F6-B498-43B3-948B-1728B52AA6E4}">
-                <adec:decorative xmlns:adec="http://schemas.microsoft.com/office/drawing/2017/decorative" val="1"/>
+                <adec:decorative xmlns:adec="http://schemas.microsoft.com/office/drawing/2017/decorative" xmlns="" val="1"/>
               </a:ext>
             </a:extLst>
           </p:cNvPr>
@@ -4996,7 +5024,7 @@
           <p:nvPr>
             <p:extLst>
               <p:ext uri="{386F3935-93C4-4BCD-93E2-E3B085C9AB24}">
-                <p16:designElem xmlns:p16="http://schemas.microsoft.com/office/powerpoint/2015/main" val="1"/>
+                <p16:designElem xmlns:p16="http://schemas.microsoft.com/office/powerpoint/2015/main" xmlns="" val="1"/>
               </p:ext>
             </p:extLst>
           </p:nvPr>
@@ -5093,10 +5121,10 @@
           <p:cNvPr id="12" name="Freeform: Shape 11">
             <a:extLst>
               <a:ext uri="{FF2B5EF4-FFF2-40B4-BE49-F238E27FC236}">
-                <a16:creationId xmlns:a16="http://schemas.microsoft.com/office/drawing/2014/main" id="{84617302-4B0D-4351-A6BB-6F0930D943AC}"/>
+                <a16:creationId xmlns:a16="http://schemas.microsoft.com/office/drawing/2014/main" xmlns="" id="{84617302-4B0D-4351-A6BB-6F0930D943AC}"/>
               </a:ext>
               <a:ext uri="{C183D7F6-B498-43B3-948B-1728B52AA6E4}">
-                <adec:decorative xmlns:adec="http://schemas.microsoft.com/office/drawing/2017/decorative" val="1"/>
+                <adec:decorative xmlns:adec="http://schemas.microsoft.com/office/drawing/2017/decorative" xmlns="" val="1"/>
               </a:ext>
             </a:extLst>
           </p:cNvPr>
@@ -5106,7 +5134,7 @@
           <p:nvPr>
             <p:extLst>
               <p:ext uri="{386F3935-93C4-4BCD-93E2-E3B085C9AB24}">
-                <p16:designElem xmlns:p16="http://schemas.microsoft.com/office/powerpoint/2015/main" val="1"/>
+                <p16:designElem xmlns:p16="http://schemas.microsoft.com/office/powerpoint/2015/main" xmlns="" val="1"/>
               </p:ext>
             </p:extLst>
           </p:nvPr>
@@ -5211,10 +5239,10 @@
           <p:cNvPr id="14" name="Freeform: Shape 13">
             <a:extLst>
               <a:ext uri="{FF2B5EF4-FFF2-40B4-BE49-F238E27FC236}">
-                <a16:creationId xmlns:a16="http://schemas.microsoft.com/office/drawing/2014/main" id="{DA2C7802-C2E0-4218-8F89-8DD7CCD2CD1C}"/>
+                <a16:creationId xmlns:a16="http://schemas.microsoft.com/office/drawing/2014/main" xmlns="" id="{DA2C7802-C2E0-4218-8F89-8DD7CCD2CD1C}"/>
               </a:ext>
               <a:ext uri="{C183D7F6-B498-43B3-948B-1728B52AA6E4}">
-                <adec:decorative xmlns:adec="http://schemas.microsoft.com/office/drawing/2017/decorative" val="1"/>
+                <adec:decorative xmlns:adec="http://schemas.microsoft.com/office/drawing/2017/decorative" xmlns="" val="1"/>
               </a:ext>
             </a:extLst>
           </p:cNvPr>
@@ -5224,7 +5252,7 @@
           <p:nvPr>
             <p:extLst>
               <p:ext uri="{386F3935-93C4-4BCD-93E2-E3B085C9AB24}">
-                <p16:designElem xmlns:p16="http://schemas.microsoft.com/office/powerpoint/2015/main" val="1"/>
+                <p16:designElem xmlns:p16="http://schemas.microsoft.com/office/powerpoint/2015/main" xmlns="" val="1"/>
               </p:ext>
             </p:extLst>
           </p:nvPr>
@@ -5321,10 +5349,10 @@
           <p:cNvPr id="16" name="Rectangle 15">
             <a:extLst>
               <a:ext uri="{FF2B5EF4-FFF2-40B4-BE49-F238E27FC236}">
-                <a16:creationId xmlns:a16="http://schemas.microsoft.com/office/drawing/2014/main" id="{A6D7111A-21E5-4EE9-8A78-10E5530F0116}"/>
+                <a16:creationId xmlns:a16="http://schemas.microsoft.com/office/drawing/2014/main" xmlns="" id="{A6D7111A-21E5-4EE9-8A78-10E5530F0116}"/>
               </a:ext>
               <a:ext uri="{C183D7F6-B498-43B3-948B-1728B52AA6E4}">
-                <adec:decorative xmlns:adec="http://schemas.microsoft.com/office/drawing/2017/decorative" val="1"/>
+                <adec:decorative xmlns:adec="http://schemas.microsoft.com/office/drawing/2017/decorative" xmlns="" val="1"/>
               </a:ext>
             </a:extLst>
           </p:cNvPr>
@@ -5334,7 +5362,7 @@
           <p:nvPr>
             <p:extLst>
               <p:ext uri="{386F3935-93C4-4BCD-93E2-E3B085C9AB24}">
-                <p16:designElem xmlns:p16="http://schemas.microsoft.com/office/powerpoint/2015/main" val="1"/>
+                <p16:designElem xmlns:p16="http://schemas.microsoft.com/office/powerpoint/2015/main" xmlns="" val="1"/>
               </p:ext>
             </p:extLst>
           </p:nvPr>
@@ -5388,10 +5416,10 @@
           <p:cNvPr id="18" name="Freeform: Shape 17">
             <a:extLst>
               <a:ext uri="{FF2B5EF4-FFF2-40B4-BE49-F238E27FC236}">
-                <a16:creationId xmlns:a16="http://schemas.microsoft.com/office/drawing/2014/main" id="{A3969E80-A77B-49FC-9122-D89AFD5EE118}"/>
+                <a16:creationId xmlns:a16="http://schemas.microsoft.com/office/drawing/2014/main" xmlns="" id="{A3969E80-A77B-49FC-9122-D89AFD5EE118}"/>
               </a:ext>
               <a:ext uri="{C183D7F6-B498-43B3-948B-1728B52AA6E4}">
-                <adec:decorative xmlns:adec="http://schemas.microsoft.com/office/drawing/2017/decorative" val="1"/>
+                <adec:decorative xmlns:adec="http://schemas.microsoft.com/office/drawing/2017/decorative" xmlns="" val="1"/>
               </a:ext>
             </a:extLst>
           </p:cNvPr>
@@ -5401,7 +5429,7 @@
           <p:nvPr>
             <p:extLst>
               <p:ext uri="{386F3935-93C4-4BCD-93E2-E3B085C9AB24}">
-                <p16:designElem xmlns:p16="http://schemas.microsoft.com/office/powerpoint/2015/main" val="1"/>
+                <p16:designElem xmlns:p16="http://schemas.microsoft.com/office/powerpoint/2015/main" xmlns="" val="1"/>
               </p:ext>
             </p:extLst>
           </p:nvPr>
@@ -5506,10 +5534,10 @@
           <p:cNvPr id="20" name="Rectangle 19">
             <a:extLst>
               <a:ext uri="{FF2B5EF4-FFF2-40B4-BE49-F238E27FC236}">
-                <a16:creationId xmlns:a16="http://schemas.microsoft.com/office/drawing/2014/main" id="{1849CA57-76BD-4CF2-80BA-D7A46A01B7B1}"/>
+                <a16:creationId xmlns:a16="http://schemas.microsoft.com/office/drawing/2014/main" xmlns="" id="{1849CA57-76BD-4CF2-80BA-D7A46A01B7B1}"/>
               </a:ext>
               <a:ext uri="{C183D7F6-B498-43B3-948B-1728B52AA6E4}">
-                <adec:decorative xmlns:adec="http://schemas.microsoft.com/office/drawing/2017/decorative" val="1"/>
+                <adec:decorative xmlns:adec="http://schemas.microsoft.com/office/drawing/2017/decorative" xmlns="" val="1"/>
               </a:ext>
             </a:extLst>
           </p:cNvPr>
@@ -5519,7 +5547,7 @@
           <p:nvPr>
             <p:extLst>
               <p:ext uri="{386F3935-93C4-4BCD-93E2-E3B085C9AB24}">
-                <p16:designElem xmlns:p16="http://schemas.microsoft.com/office/powerpoint/2015/main" val="1"/>
+                <p16:designElem xmlns:p16="http://schemas.microsoft.com/office/powerpoint/2015/main" xmlns="" val="1"/>
               </p:ext>
             </p:extLst>
           </p:nvPr>
@@ -5584,10 +5612,10 @@
           <p:cNvPr id="22" name="Freeform: Shape 21">
             <a:extLst>
               <a:ext uri="{FF2B5EF4-FFF2-40B4-BE49-F238E27FC236}">
-                <a16:creationId xmlns:a16="http://schemas.microsoft.com/office/drawing/2014/main" id="{35E9085E-E730-4768-83D4-6CB7E9897153}"/>
+                <a16:creationId xmlns:a16="http://schemas.microsoft.com/office/drawing/2014/main" xmlns="" id="{35E9085E-E730-4768-83D4-6CB7E9897153}"/>
               </a:ext>
               <a:ext uri="{C183D7F6-B498-43B3-948B-1728B52AA6E4}">
-                <adec:decorative xmlns:adec="http://schemas.microsoft.com/office/drawing/2017/decorative" val="1"/>
+                <adec:decorative xmlns:adec="http://schemas.microsoft.com/office/drawing/2017/decorative" xmlns="" val="1"/>
               </a:ext>
             </a:extLst>
           </p:cNvPr>
@@ -5597,7 +5625,7 @@
           <p:nvPr>
             <p:extLst>
               <p:ext uri="{386F3935-93C4-4BCD-93E2-E3B085C9AB24}">
-                <p16:designElem xmlns:p16="http://schemas.microsoft.com/office/powerpoint/2015/main" val="1"/>
+                <p16:designElem xmlns:p16="http://schemas.microsoft.com/office/powerpoint/2015/main" xmlns="" val="1"/>
               </p:ext>
             </p:extLst>
           </p:nvPr>
@@ -5708,10 +5736,10 @@
           <p:cNvPr id="24" name="Freeform: Shape 23">
             <a:extLst>
               <a:ext uri="{FF2B5EF4-FFF2-40B4-BE49-F238E27FC236}">
-                <a16:creationId xmlns:a16="http://schemas.microsoft.com/office/drawing/2014/main" id="{973272FE-A474-4CAE-8CA2-BCC8B476C3F4}"/>
+                <a16:creationId xmlns:a16="http://schemas.microsoft.com/office/drawing/2014/main" xmlns="" id="{973272FE-A474-4CAE-8CA2-BCC8B476C3F4}"/>
               </a:ext>
               <a:ext uri="{C183D7F6-B498-43B3-948B-1728B52AA6E4}">
-                <adec:decorative xmlns:adec="http://schemas.microsoft.com/office/drawing/2017/decorative" val="1"/>
+                <adec:decorative xmlns:adec="http://schemas.microsoft.com/office/drawing/2017/decorative" xmlns="" val="1"/>
               </a:ext>
             </a:extLst>
           </p:cNvPr>
@@ -5721,7 +5749,7 @@
           <p:nvPr>
             <p:extLst>
               <p:ext uri="{386F3935-93C4-4BCD-93E2-E3B085C9AB24}">
-                <p16:designElem xmlns:p16="http://schemas.microsoft.com/office/powerpoint/2015/main" val="1"/>
+                <p16:designElem xmlns:p16="http://schemas.microsoft.com/office/powerpoint/2015/main" xmlns="" val="1"/>
               </p:ext>
             </p:extLst>
           </p:nvPr>
@@ -5887,10 +5915,10 @@
           <p:cNvPr id="26" name="Freeform: Shape 25">
             <a:extLst>
               <a:ext uri="{FF2B5EF4-FFF2-40B4-BE49-F238E27FC236}">
-                <a16:creationId xmlns:a16="http://schemas.microsoft.com/office/drawing/2014/main" id="{E07981EA-05A6-437C-88D7-B377B92B031D}"/>
+                <a16:creationId xmlns:a16="http://schemas.microsoft.com/office/drawing/2014/main" xmlns="" id="{E07981EA-05A6-437C-88D7-B377B92B031D}"/>
               </a:ext>
               <a:ext uri="{C183D7F6-B498-43B3-948B-1728B52AA6E4}">
-                <adec:decorative xmlns:adec="http://schemas.microsoft.com/office/drawing/2017/decorative" val="1"/>
+                <adec:decorative xmlns:adec="http://schemas.microsoft.com/office/drawing/2017/decorative" xmlns="" val="1"/>
               </a:ext>
             </a:extLst>
           </p:cNvPr>
@@ -5900,7 +5928,7 @@
           <p:nvPr>
             <p:extLst>
               <p:ext uri="{386F3935-93C4-4BCD-93E2-E3B085C9AB24}">
-                <p16:designElem xmlns:p16="http://schemas.microsoft.com/office/powerpoint/2015/main" val="1"/>
+                <p16:designElem xmlns:p16="http://schemas.microsoft.com/office/powerpoint/2015/main" xmlns="" val="1"/>
               </p:ext>
             </p:extLst>
           </p:nvPr>
@@ -5997,10 +6025,10 @@
           <p:cNvPr id="28" name="Rectangle 27">
             <a:extLst>
               <a:ext uri="{FF2B5EF4-FFF2-40B4-BE49-F238E27FC236}">
-                <a16:creationId xmlns:a16="http://schemas.microsoft.com/office/drawing/2014/main" id="{15E3C750-986E-4769-B1AE-49289FBEE757}"/>
+                <a16:creationId xmlns:a16="http://schemas.microsoft.com/office/drawing/2014/main" xmlns="" id="{15E3C750-986E-4769-B1AE-49289FBEE757}"/>
               </a:ext>
               <a:ext uri="{C183D7F6-B498-43B3-948B-1728B52AA6E4}">
-                <adec:decorative xmlns:adec="http://schemas.microsoft.com/office/drawing/2017/decorative" val="1"/>
+                <adec:decorative xmlns:adec="http://schemas.microsoft.com/office/drawing/2017/decorative" xmlns="" val="1"/>
               </a:ext>
             </a:extLst>
           </p:cNvPr>
@@ -6010,7 +6038,7 @@
           <p:nvPr>
             <p:extLst>
               <p:ext uri="{386F3935-93C4-4BCD-93E2-E3B085C9AB24}">
-                <p16:designElem xmlns:p16="http://schemas.microsoft.com/office/powerpoint/2015/main" val="1"/>
+                <p16:designElem xmlns:p16="http://schemas.microsoft.com/office/powerpoint/2015/main" xmlns="" val="1"/>
               </p:ext>
             </p:extLst>
           </p:nvPr>
@@ -6064,7 +6092,7 @@
           <p:cNvPr id="21" name="TextBox 20">
             <a:extLst>
               <a:ext uri="{FF2B5EF4-FFF2-40B4-BE49-F238E27FC236}">
-                <a16:creationId xmlns:a16="http://schemas.microsoft.com/office/drawing/2014/main" id="{DE8E782F-B94E-431C-879F-122A987CA618}"/>
+                <a16:creationId xmlns:a16="http://schemas.microsoft.com/office/drawing/2014/main" xmlns="" id="{DE8E782F-B94E-431C-879F-122A987CA618}"/>
               </a:ext>
             </a:extLst>
           </p:cNvPr>
@@ -6197,7 +6225,7 @@
     </p:spTree>
     <p:extLst>
       <p:ext uri="{BB962C8B-B14F-4D97-AF65-F5344CB8AC3E}">
-        <p14:creationId xmlns:p14="http://schemas.microsoft.com/office/powerpoint/2010/main" val="2279911678"/>
+        <p14:creationId xmlns:p14="http://schemas.microsoft.com/office/powerpoint/2010/main" xmlns="" val="2279911678"/>
       </p:ext>
     </p:extLst>
   </p:cSld>
@@ -6237,10 +6265,10 @@
           <p:cNvPr id="13" name="Rectangle 7">
             <a:extLst>
               <a:ext uri="{FF2B5EF4-FFF2-40B4-BE49-F238E27FC236}">
-                <a16:creationId xmlns:a16="http://schemas.microsoft.com/office/drawing/2014/main" id="{88294908-8B00-4F58-BBBA-20F71A40AA9E}"/>
+                <a16:creationId xmlns:a16="http://schemas.microsoft.com/office/drawing/2014/main" xmlns="" id="{88294908-8B00-4F58-BBBA-20F71A40AA9E}"/>
               </a:ext>
               <a:ext uri="{C183D7F6-B498-43B3-948B-1728B52AA6E4}">
-                <adec:decorative xmlns:adec="http://schemas.microsoft.com/office/drawing/2017/decorative" val="1"/>
+                <adec:decorative xmlns:adec="http://schemas.microsoft.com/office/drawing/2017/decorative" xmlns="" val="1"/>
               </a:ext>
             </a:extLst>
           </p:cNvPr>
@@ -6250,7 +6278,7 @@
           <p:nvPr>
             <p:extLst>
               <p:ext uri="{386F3935-93C4-4BCD-93E2-E3B085C9AB24}">
-                <p16:designElem xmlns:p16="http://schemas.microsoft.com/office/powerpoint/2015/main" val="1"/>
+                <p16:designElem xmlns:p16="http://schemas.microsoft.com/office/powerpoint/2015/main" xmlns="" val="1"/>
               </p:ext>
             </p:extLst>
           </p:nvPr>
@@ -6329,10 +6357,10 @@
           <p:cNvPr id="15" name="Freeform: Shape 9">
             <a:extLst>
               <a:ext uri="{FF2B5EF4-FFF2-40B4-BE49-F238E27FC236}">
-                <a16:creationId xmlns:a16="http://schemas.microsoft.com/office/drawing/2014/main" id="{4364C879-1404-4203-8E9D-CC5DE0A621A2}"/>
+                <a16:creationId xmlns:a16="http://schemas.microsoft.com/office/drawing/2014/main" xmlns="" id="{4364C879-1404-4203-8E9D-CC5DE0A621A2}"/>
               </a:ext>
               <a:ext uri="{C183D7F6-B498-43B3-948B-1728B52AA6E4}">
-                <adec:decorative xmlns:adec="http://schemas.microsoft.com/office/drawing/2017/decorative" val="1"/>
+                <adec:decorative xmlns:adec="http://schemas.microsoft.com/office/drawing/2017/decorative" xmlns="" val="1"/>
               </a:ext>
             </a:extLst>
           </p:cNvPr>
@@ -6342,7 +6370,7 @@
           <p:nvPr>
             <p:extLst>
               <p:ext uri="{386F3935-93C4-4BCD-93E2-E3B085C9AB24}">
-                <p16:designElem xmlns:p16="http://schemas.microsoft.com/office/powerpoint/2015/main" val="1"/>
+                <p16:designElem xmlns:p16="http://schemas.microsoft.com/office/powerpoint/2015/main" xmlns="" val="1"/>
               </p:ext>
             </p:extLst>
           </p:nvPr>
@@ -6468,10 +6496,10 @@
           <p:cNvPr id="12" name="Freeform: Shape 11">
             <a:extLst>
               <a:ext uri="{FF2B5EF4-FFF2-40B4-BE49-F238E27FC236}">
-                <a16:creationId xmlns:a16="http://schemas.microsoft.com/office/drawing/2014/main" id="{84617302-4B0D-4351-A6BB-6F0930D943AC}"/>
+                <a16:creationId xmlns:a16="http://schemas.microsoft.com/office/drawing/2014/main" xmlns="" id="{84617302-4B0D-4351-A6BB-6F0930D943AC}"/>
               </a:ext>
               <a:ext uri="{C183D7F6-B498-43B3-948B-1728B52AA6E4}">
-                <adec:decorative xmlns:adec="http://schemas.microsoft.com/office/drawing/2017/decorative" val="1"/>
+                <adec:decorative xmlns:adec="http://schemas.microsoft.com/office/drawing/2017/decorative" xmlns="" val="1"/>
               </a:ext>
             </a:extLst>
           </p:cNvPr>
@@ -6481,7 +6509,7 @@
           <p:nvPr>
             <p:extLst>
               <p:ext uri="{386F3935-93C4-4BCD-93E2-E3B085C9AB24}">
-                <p16:designElem xmlns:p16="http://schemas.microsoft.com/office/powerpoint/2015/main" val="1"/>
+                <p16:designElem xmlns:p16="http://schemas.microsoft.com/office/powerpoint/2015/main" xmlns="" val="1"/>
               </p:ext>
             </p:extLst>
           </p:nvPr>
@@ -6615,10 +6643,10 @@
           <p:cNvPr id="14" name="Freeform: Shape 13">
             <a:extLst>
               <a:ext uri="{FF2B5EF4-FFF2-40B4-BE49-F238E27FC236}">
-                <a16:creationId xmlns:a16="http://schemas.microsoft.com/office/drawing/2014/main" id="{DA2C7802-C2E0-4218-8F89-8DD7CCD2CD1C}"/>
+                <a16:creationId xmlns:a16="http://schemas.microsoft.com/office/drawing/2014/main" xmlns="" id="{DA2C7802-C2E0-4218-8F89-8DD7CCD2CD1C}"/>
               </a:ext>
               <a:ext uri="{C183D7F6-B498-43B3-948B-1728B52AA6E4}">
-                <adec:decorative xmlns:adec="http://schemas.microsoft.com/office/drawing/2017/decorative" val="1"/>
+                <adec:decorative xmlns:adec="http://schemas.microsoft.com/office/drawing/2017/decorative" xmlns="" val="1"/>
               </a:ext>
             </a:extLst>
           </p:cNvPr>
@@ -6628,7 +6656,7 @@
           <p:nvPr>
             <p:extLst>
               <p:ext uri="{386F3935-93C4-4BCD-93E2-E3B085C9AB24}">
-                <p16:designElem xmlns:p16="http://schemas.microsoft.com/office/powerpoint/2015/main" val="1"/>
+                <p16:designElem xmlns:p16="http://schemas.microsoft.com/office/powerpoint/2015/main" xmlns="" val="1"/>
               </p:ext>
             </p:extLst>
           </p:nvPr>
@@ -6754,10 +6782,10 @@
           <p:cNvPr id="16" name="Rectangle 15">
             <a:extLst>
               <a:ext uri="{FF2B5EF4-FFF2-40B4-BE49-F238E27FC236}">
-                <a16:creationId xmlns:a16="http://schemas.microsoft.com/office/drawing/2014/main" id="{A6D7111A-21E5-4EE9-8A78-10E5530F0116}"/>
+                <a16:creationId xmlns:a16="http://schemas.microsoft.com/office/drawing/2014/main" xmlns="" id="{A6D7111A-21E5-4EE9-8A78-10E5530F0116}"/>
               </a:ext>
               <a:ext uri="{C183D7F6-B498-43B3-948B-1728B52AA6E4}">
-                <adec:decorative xmlns:adec="http://schemas.microsoft.com/office/drawing/2017/decorative" val="1"/>
+                <adec:decorative xmlns:adec="http://schemas.microsoft.com/office/drawing/2017/decorative" xmlns="" val="1"/>
               </a:ext>
             </a:extLst>
           </p:cNvPr>
@@ -6767,7 +6795,7 @@
           <p:nvPr>
             <p:extLst>
               <p:ext uri="{386F3935-93C4-4BCD-93E2-E3B085C9AB24}">
-                <p16:designElem xmlns:p16="http://schemas.microsoft.com/office/powerpoint/2015/main" val="1"/>
+                <p16:designElem xmlns:p16="http://schemas.microsoft.com/office/powerpoint/2015/main" xmlns="" val="1"/>
               </p:ext>
             </p:extLst>
           </p:nvPr>
@@ -6850,10 +6878,10 @@
           <p:cNvPr id="18" name="Freeform: Shape 17">
             <a:extLst>
               <a:ext uri="{FF2B5EF4-FFF2-40B4-BE49-F238E27FC236}">
-                <a16:creationId xmlns:a16="http://schemas.microsoft.com/office/drawing/2014/main" id="{A3969E80-A77B-49FC-9122-D89AFD5EE118}"/>
+                <a16:creationId xmlns:a16="http://schemas.microsoft.com/office/drawing/2014/main" xmlns="" id="{A3969E80-A77B-49FC-9122-D89AFD5EE118}"/>
               </a:ext>
               <a:ext uri="{C183D7F6-B498-43B3-948B-1728B52AA6E4}">
-                <adec:decorative xmlns:adec="http://schemas.microsoft.com/office/drawing/2017/decorative" val="1"/>
+                <adec:decorative xmlns:adec="http://schemas.microsoft.com/office/drawing/2017/decorative" xmlns="" val="1"/>
               </a:ext>
             </a:extLst>
           </p:cNvPr>
@@ -6863,7 +6891,7 @@
           <p:nvPr>
             <p:extLst>
               <p:ext uri="{386F3935-93C4-4BCD-93E2-E3B085C9AB24}">
-                <p16:designElem xmlns:p16="http://schemas.microsoft.com/office/powerpoint/2015/main" val="1"/>
+                <p16:designElem xmlns:p16="http://schemas.microsoft.com/office/powerpoint/2015/main" xmlns="" val="1"/>
               </p:ext>
             </p:extLst>
           </p:nvPr>
@@ -6997,10 +7025,10 @@
           <p:cNvPr id="20" name="Rectangle 19">
             <a:extLst>
               <a:ext uri="{FF2B5EF4-FFF2-40B4-BE49-F238E27FC236}">
-                <a16:creationId xmlns:a16="http://schemas.microsoft.com/office/drawing/2014/main" id="{1849CA57-76BD-4CF2-80BA-D7A46A01B7B1}"/>
+                <a16:creationId xmlns:a16="http://schemas.microsoft.com/office/drawing/2014/main" xmlns="" id="{1849CA57-76BD-4CF2-80BA-D7A46A01B7B1}"/>
               </a:ext>
               <a:ext uri="{C183D7F6-B498-43B3-948B-1728B52AA6E4}">
-                <adec:decorative xmlns:adec="http://schemas.microsoft.com/office/drawing/2017/decorative" val="1"/>
+                <adec:decorative xmlns:adec="http://schemas.microsoft.com/office/drawing/2017/decorative" xmlns="" val="1"/>
               </a:ext>
             </a:extLst>
           </p:cNvPr>
@@ -7010,7 +7038,7 @@
           <p:nvPr>
             <p:extLst>
               <p:ext uri="{386F3935-93C4-4BCD-93E2-E3B085C9AB24}">
-                <p16:designElem xmlns:p16="http://schemas.microsoft.com/office/powerpoint/2015/main" val="1"/>
+                <p16:designElem xmlns:p16="http://schemas.microsoft.com/office/powerpoint/2015/main" xmlns="" val="1"/>
               </p:ext>
             </p:extLst>
           </p:nvPr>
@@ -7099,10 +7127,10 @@
           <p:cNvPr id="22" name="Freeform: Shape 21">
             <a:extLst>
               <a:ext uri="{FF2B5EF4-FFF2-40B4-BE49-F238E27FC236}">
-                <a16:creationId xmlns:a16="http://schemas.microsoft.com/office/drawing/2014/main" id="{35E9085E-E730-4768-83D4-6CB7E9897153}"/>
+                <a16:creationId xmlns:a16="http://schemas.microsoft.com/office/drawing/2014/main" xmlns="" id="{35E9085E-E730-4768-83D4-6CB7E9897153}"/>
               </a:ext>
               <a:ext uri="{C183D7F6-B498-43B3-948B-1728B52AA6E4}">
-                <adec:decorative xmlns:adec="http://schemas.microsoft.com/office/drawing/2017/decorative" val="1"/>
+                <adec:decorative xmlns:adec="http://schemas.microsoft.com/office/drawing/2017/decorative" xmlns="" val="1"/>
               </a:ext>
             </a:extLst>
           </p:cNvPr>
@@ -7112,7 +7140,7 @@
           <p:nvPr>
             <p:extLst>
               <p:ext uri="{386F3935-93C4-4BCD-93E2-E3B085C9AB24}">
-                <p16:designElem xmlns:p16="http://schemas.microsoft.com/office/powerpoint/2015/main" val="1"/>
+                <p16:designElem xmlns:p16="http://schemas.microsoft.com/office/powerpoint/2015/main" xmlns="" val="1"/>
               </p:ext>
             </p:extLst>
           </p:nvPr>
@@ -7252,10 +7280,10 @@
           <p:cNvPr id="24" name="Freeform: Shape 23">
             <a:extLst>
               <a:ext uri="{FF2B5EF4-FFF2-40B4-BE49-F238E27FC236}">
-                <a16:creationId xmlns:a16="http://schemas.microsoft.com/office/drawing/2014/main" id="{973272FE-A474-4CAE-8CA2-BCC8B476C3F4}"/>
+                <a16:creationId xmlns:a16="http://schemas.microsoft.com/office/drawing/2014/main" xmlns="" id="{973272FE-A474-4CAE-8CA2-BCC8B476C3F4}"/>
               </a:ext>
               <a:ext uri="{C183D7F6-B498-43B3-948B-1728B52AA6E4}">
-                <adec:decorative xmlns:adec="http://schemas.microsoft.com/office/drawing/2017/decorative" val="1"/>
+                <adec:decorative xmlns:adec="http://schemas.microsoft.com/office/drawing/2017/decorative" xmlns="" val="1"/>
               </a:ext>
             </a:extLst>
           </p:cNvPr>
@@ -7265,7 +7293,7 @@
           <p:nvPr>
             <p:extLst>
               <p:ext uri="{386F3935-93C4-4BCD-93E2-E3B085C9AB24}">
-                <p16:designElem xmlns:p16="http://schemas.microsoft.com/office/powerpoint/2015/main" val="1"/>
+                <p16:designElem xmlns:p16="http://schemas.microsoft.com/office/powerpoint/2015/main" xmlns="" val="1"/>
               </p:ext>
             </p:extLst>
           </p:nvPr>
@@ -7456,10 +7484,10 @@
           <p:cNvPr id="26" name="Freeform: Shape 25">
             <a:extLst>
               <a:ext uri="{FF2B5EF4-FFF2-40B4-BE49-F238E27FC236}">
-                <a16:creationId xmlns:a16="http://schemas.microsoft.com/office/drawing/2014/main" id="{E07981EA-05A6-437C-88D7-B377B92B031D}"/>
+                <a16:creationId xmlns:a16="http://schemas.microsoft.com/office/drawing/2014/main" xmlns="" id="{E07981EA-05A6-437C-88D7-B377B92B031D}"/>
               </a:ext>
               <a:ext uri="{C183D7F6-B498-43B3-948B-1728B52AA6E4}">
-                <adec:decorative xmlns:adec="http://schemas.microsoft.com/office/drawing/2017/decorative" val="1"/>
+                <adec:decorative xmlns:adec="http://schemas.microsoft.com/office/drawing/2017/decorative" xmlns="" val="1"/>
               </a:ext>
             </a:extLst>
           </p:cNvPr>
@@ -7469,7 +7497,7 @@
           <p:nvPr>
             <p:extLst>
               <p:ext uri="{386F3935-93C4-4BCD-93E2-E3B085C9AB24}">
-                <p16:designElem xmlns:p16="http://schemas.microsoft.com/office/powerpoint/2015/main" val="1"/>
+                <p16:designElem xmlns:p16="http://schemas.microsoft.com/office/powerpoint/2015/main" xmlns="" val="1"/>
               </p:ext>
             </p:extLst>
           </p:nvPr>
@@ -7595,10 +7623,10 @@
           <p:cNvPr id="28" name="Rectangle 27">
             <a:extLst>
               <a:ext uri="{FF2B5EF4-FFF2-40B4-BE49-F238E27FC236}">
-                <a16:creationId xmlns:a16="http://schemas.microsoft.com/office/drawing/2014/main" id="{15E3C750-986E-4769-B1AE-49289FBEE757}"/>
+                <a16:creationId xmlns:a16="http://schemas.microsoft.com/office/drawing/2014/main" xmlns="" id="{15E3C750-986E-4769-B1AE-49289FBEE757}"/>
               </a:ext>
               <a:ext uri="{C183D7F6-B498-43B3-948B-1728B52AA6E4}">
-                <adec:decorative xmlns:adec="http://schemas.microsoft.com/office/drawing/2017/decorative" val="1"/>
+                <adec:decorative xmlns:adec="http://schemas.microsoft.com/office/drawing/2017/decorative" xmlns="" val="1"/>
               </a:ext>
             </a:extLst>
           </p:cNvPr>
@@ -7608,7 +7636,7 @@
           <p:nvPr>
             <p:extLst>
               <p:ext uri="{386F3935-93C4-4BCD-93E2-E3B085C9AB24}">
-                <p16:designElem xmlns:p16="http://schemas.microsoft.com/office/powerpoint/2015/main" val="1"/>
+                <p16:designElem xmlns:p16="http://schemas.microsoft.com/office/powerpoint/2015/main" xmlns="" val="1"/>
               </p:ext>
             </p:extLst>
           </p:nvPr>
@@ -7691,7 +7719,7 @@
           <p:cNvPr id="17" name="TextBox 16">
             <a:extLst>
               <a:ext uri="{FF2B5EF4-FFF2-40B4-BE49-F238E27FC236}">
-                <a16:creationId xmlns:a16="http://schemas.microsoft.com/office/drawing/2014/main" id="{4D7DDA9B-C4C6-4F40-A4F5-8B74EB3D995D}"/>
+                <a16:creationId xmlns:a16="http://schemas.microsoft.com/office/drawing/2014/main" xmlns="" id="{4D7DDA9B-C4C6-4F40-A4F5-8B74EB3D995D}"/>
               </a:ext>
             </a:extLst>
           </p:cNvPr>
@@ -7756,7 +7784,7 @@
           <p:cNvPr id="19" name="TextBox 18">
             <a:extLst>
               <a:ext uri="{FF2B5EF4-FFF2-40B4-BE49-F238E27FC236}">
-                <a16:creationId xmlns:a16="http://schemas.microsoft.com/office/drawing/2014/main" id="{5D5E7F9C-C4DD-4EE2-89BF-D098B3CDEB78}"/>
+                <a16:creationId xmlns:a16="http://schemas.microsoft.com/office/drawing/2014/main" xmlns="" id="{5D5E7F9C-C4DD-4EE2-89BF-D098B3CDEB78}"/>
               </a:ext>
             </a:extLst>
           </p:cNvPr>
@@ -8194,7 +8222,7 @@
     </p:spTree>
     <p:extLst>
       <p:ext uri="{BB962C8B-B14F-4D97-AF65-F5344CB8AC3E}">
-        <p14:creationId xmlns:p14="http://schemas.microsoft.com/office/powerpoint/2010/main" val="3849291856"/>
+        <p14:creationId xmlns:p14="http://schemas.microsoft.com/office/powerpoint/2010/main" xmlns="" val="3849291856"/>
       </p:ext>
     </p:extLst>
   </p:cSld>
@@ -8226,7 +8254,7 @@
           <p:cNvPr id="17" name="TextBox 16">
             <a:extLst>
               <a:ext uri="{FF2B5EF4-FFF2-40B4-BE49-F238E27FC236}">
-                <a16:creationId xmlns:a16="http://schemas.microsoft.com/office/drawing/2014/main" id="{CFF05AAC-BE11-41E7-B61B-7375F56D7E9D}"/>
+                <a16:creationId xmlns:a16="http://schemas.microsoft.com/office/drawing/2014/main" xmlns="" id="{CFF05AAC-BE11-41E7-B61B-7375F56D7E9D}"/>
               </a:ext>
             </a:extLst>
           </p:cNvPr>
@@ -8291,7 +8319,7 @@
           <p:cNvPr id="3" name="Table 3">
             <a:extLst>
               <a:ext uri="{FF2B5EF4-FFF2-40B4-BE49-F238E27FC236}">
-                <a16:creationId xmlns:a16="http://schemas.microsoft.com/office/drawing/2014/main" id="{8DFD0DDF-354F-4E66-97C7-F786A7D82D54}"/>
+                <a16:creationId xmlns:a16="http://schemas.microsoft.com/office/drawing/2014/main" xmlns="" id="{8DFD0DDF-354F-4E66-97C7-F786A7D82D54}"/>
               </a:ext>
             </a:extLst>
           </p:cNvPr>
@@ -8314,14 +8342,14 @@
                 <a:gridCol w="3113335">
                   <a:extLst>
                     <a:ext uri="{9D8B030D-6E8A-4147-A177-3AD203B41FA5}">
-                      <a16:colId xmlns:a16="http://schemas.microsoft.com/office/drawing/2014/main" val="1826928100"/>
+                      <a16:colId xmlns:a16="http://schemas.microsoft.com/office/drawing/2014/main" xmlns="" val="1826928100"/>
                     </a:ext>
                   </a:extLst>
                 </a:gridCol>
                 <a:gridCol w="6241408">
                   <a:extLst>
                     <a:ext uri="{9D8B030D-6E8A-4147-A177-3AD203B41FA5}">
-                      <a16:colId xmlns:a16="http://schemas.microsoft.com/office/drawing/2014/main" val="796778802"/>
+                      <a16:colId xmlns:a16="http://schemas.microsoft.com/office/drawing/2014/main" xmlns="" val="796778802"/>
                     </a:ext>
                   </a:extLst>
                 </a:gridCol>
@@ -8379,7 +8407,7 @@
                 </a:tc>
                 <a:extLst>
                   <a:ext uri="{0D108BD9-81ED-4DB2-BD59-A6C34878D82A}">
-                    <a16:rowId xmlns:a16="http://schemas.microsoft.com/office/drawing/2014/main" val="2479783860"/>
+                    <a16:rowId xmlns:a16="http://schemas.microsoft.com/office/drawing/2014/main" xmlns="" val="2479783860"/>
                   </a:ext>
                 </a:extLst>
               </a:tr>
@@ -8412,7 +8440,7 @@
                 </a:tc>
                 <a:extLst>
                   <a:ext uri="{0D108BD9-81ED-4DB2-BD59-A6C34878D82A}">
-                    <a16:rowId xmlns:a16="http://schemas.microsoft.com/office/drawing/2014/main" val="368074673"/>
+                    <a16:rowId xmlns:a16="http://schemas.microsoft.com/office/drawing/2014/main" xmlns="" val="368074673"/>
                   </a:ext>
                 </a:extLst>
               </a:tr>
@@ -8452,7 +8480,7 @@
                 </a:tc>
                 <a:extLst>
                   <a:ext uri="{0D108BD9-81ED-4DB2-BD59-A6C34878D82A}">
-                    <a16:rowId xmlns:a16="http://schemas.microsoft.com/office/drawing/2014/main" val="3120620800"/>
+                    <a16:rowId xmlns:a16="http://schemas.microsoft.com/office/drawing/2014/main" xmlns="" val="3120620800"/>
                   </a:ext>
                 </a:extLst>
               </a:tr>
@@ -8492,7 +8520,7 @@
                 </a:tc>
                 <a:extLst>
                   <a:ext uri="{0D108BD9-81ED-4DB2-BD59-A6C34878D82A}">
-                    <a16:rowId xmlns:a16="http://schemas.microsoft.com/office/drawing/2014/main" val="1858610247"/>
+                    <a16:rowId xmlns:a16="http://schemas.microsoft.com/office/drawing/2014/main" xmlns="" val="1858610247"/>
                   </a:ext>
                 </a:extLst>
               </a:tr>
@@ -8526,7 +8554,7 @@
                 </a:tc>
                 <a:extLst>
                   <a:ext uri="{0D108BD9-81ED-4DB2-BD59-A6C34878D82A}">
-                    <a16:rowId xmlns:a16="http://schemas.microsoft.com/office/drawing/2014/main" val="1688225698"/>
+                    <a16:rowId xmlns:a16="http://schemas.microsoft.com/office/drawing/2014/main" xmlns="" val="1688225698"/>
                   </a:ext>
                 </a:extLst>
               </a:tr>
@@ -8568,7 +8596,7 @@
                 </a:tc>
                 <a:extLst>
                   <a:ext uri="{0D108BD9-81ED-4DB2-BD59-A6C34878D82A}">
-                    <a16:rowId xmlns:a16="http://schemas.microsoft.com/office/drawing/2014/main" val="1353787869"/>
+                    <a16:rowId xmlns:a16="http://schemas.microsoft.com/office/drawing/2014/main" xmlns="" val="1353787869"/>
                   </a:ext>
                 </a:extLst>
               </a:tr>
@@ -8608,7 +8636,7 @@
                 </a:tc>
                 <a:extLst>
                   <a:ext uri="{0D108BD9-81ED-4DB2-BD59-A6C34878D82A}">
-                    <a16:rowId xmlns:a16="http://schemas.microsoft.com/office/drawing/2014/main" val="3959645380"/>
+                    <a16:rowId xmlns:a16="http://schemas.microsoft.com/office/drawing/2014/main" xmlns="" val="3959645380"/>
                   </a:ext>
                 </a:extLst>
               </a:tr>
@@ -8619,9 +8647,1656 @@
     </p:spTree>
     <p:extLst>
       <p:ext uri="{BB962C8B-B14F-4D97-AF65-F5344CB8AC3E}">
-        <p14:creationId xmlns:p14="http://schemas.microsoft.com/office/powerpoint/2010/main" val="2132903614"/>
+        <p14:creationId xmlns:p14="http://schemas.microsoft.com/office/powerpoint/2010/main" xmlns="" val="2132903614"/>
       </p:ext>
     </p:extLst>
+  </p:cSld>
+  <p:clrMapOvr>
+    <a:masterClrMapping/>
+  </p:clrMapOvr>
+</p:sld>
+</file>
+
+<file path=ppt/slides/slide5.xml><?xml version="1.0" encoding="utf-8"?>
+<p:sld xmlns:a="http://schemas.openxmlformats.org/drawingml/2006/main" xmlns:r="http://schemas.openxmlformats.org/officeDocument/2006/relationships" xmlns:p="http://schemas.openxmlformats.org/presentationml/2006/main">
+  <p:cSld>
+    <p:spTree>
+      <p:nvGrpSpPr>
+        <p:cNvPr id="1" name=""/>
+        <p:cNvGrpSpPr/>
+        <p:nvPr/>
+      </p:nvGrpSpPr>
+      <p:grpSpPr>
+        <a:xfrm>
+          <a:off x="0" y="0"/>
+          <a:ext cx="0" cy="0"/>
+          <a:chOff x="0" y="0"/>
+          <a:chExt cx="0" cy="0"/>
+        </a:xfrm>
+      </p:grpSpPr>
+      <p:sp>
+        <p:nvSpPr>
+          <p:cNvPr id="13" name="Rectangle 7">
+            <a:extLst>
+              <a:ext uri="{FF2B5EF4-FFF2-40B4-BE49-F238E27FC236}">
+                <a16:creationId xmlns:a16="http://schemas.microsoft.com/office/drawing/2014/main" xmlns="" id="{88294908-8B00-4F58-BBBA-20F71A40AA9E}"/>
+              </a:ext>
+              <a:ext uri="{C183D7F6-B498-43B3-948B-1728B52AA6E4}">
+                <adec:decorative xmlns:adec="http://schemas.microsoft.com/office/drawing/2017/decorative" xmlns="" val="1"/>
+              </a:ext>
+            </a:extLst>
+          </p:cNvPr>
+          <p:cNvSpPr>
+            <a:spLocks noGrp="1" noRot="1" noChangeAspect="1" noMove="1" noResize="1" noEditPoints="1" noAdjustHandles="1" noChangeArrowheads="1" noChangeShapeType="1" noTextEdit="1"/>
+          </p:cNvSpPr>
+          <p:nvPr>
+            <p:extLst>
+              <p:ext uri="{386F3935-93C4-4BCD-93E2-E3B085C9AB24}">
+                <p16:designElem xmlns:p16="http://schemas.microsoft.com/office/powerpoint/2015/main" xmlns="" val="1"/>
+              </p:ext>
+            </p:extLst>
+          </p:nvPr>
+        </p:nvSpPr>
+        <p:spPr>
+          <a:xfrm>
+            <a:off x="0" y="0"/>
+            <a:ext cx="12192000" cy="6858000"/>
+          </a:xfrm>
+          <a:prstGeom prst="rect">
+            <a:avLst/>
+          </a:prstGeom>
+          <a:solidFill>
+            <a:schemeClr val="bg2"/>
+          </a:solidFill>
+          <a:ln>
+            <a:noFill/>
+          </a:ln>
+        </p:spPr>
+        <p:style>
+          <a:lnRef idx="2">
+            <a:schemeClr val="accent1">
+              <a:shade val="50000"/>
+            </a:schemeClr>
+          </a:lnRef>
+          <a:fillRef idx="1">
+            <a:schemeClr val="accent1"/>
+          </a:fillRef>
+          <a:effectRef idx="0">
+            <a:schemeClr val="accent1"/>
+          </a:effectRef>
+          <a:fontRef idx="minor">
+            <a:schemeClr val="lt1"/>
+          </a:fontRef>
+        </p:style>
+        <p:txBody>
+          <a:bodyPr rtlCol="0" anchor="ctr"/>
+          <a:lstStyle/>
+          <a:p>
+            <a:pPr algn="ctr"/>
+            <a:endParaRPr lang="en-US" dirty="0"/>
+          </a:p>
+        </p:txBody>
+      </p:sp>
+      <p:sp>
+        <p:nvSpPr>
+          <p:cNvPr id="15" name="Freeform: Shape 9">
+            <a:extLst>
+              <a:ext uri="{FF2B5EF4-FFF2-40B4-BE49-F238E27FC236}">
+                <a16:creationId xmlns:a16="http://schemas.microsoft.com/office/drawing/2014/main" xmlns="" id="{4364C879-1404-4203-8E9D-CC5DE0A621A2}"/>
+              </a:ext>
+              <a:ext uri="{C183D7F6-B498-43B3-948B-1728B52AA6E4}">
+                <adec:decorative xmlns:adec="http://schemas.microsoft.com/office/drawing/2017/decorative" xmlns="" val="1"/>
+              </a:ext>
+            </a:extLst>
+          </p:cNvPr>
+          <p:cNvSpPr>
+            <a:spLocks noGrp="1" noRot="1" noChangeAspect="1" noMove="1" noResize="1" noEditPoints="1" noAdjustHandles="1" noChangeArrowheads="1" noChangeShapeType="1" noTextEdit="1"/>
+          </p:cNvSpPr>
+          <p:nvPr>
+            <p:extLst>
+              <p:ext uri="{386F3935-93C4-4BCD-93E2-E3B085C9AB24}">
+                <p16:designElem xmlns:p16="http://schemas.microsoft.com/office/powerpoint/2015/main" xmlns="" val="1"/>
+              </p:ext>
+            </p:extLst>
+          </p:nvPr>
+        </p:nvSpPr>
+        <p:spPr>
+          <a:xfrm rot="2700000">
+            <a:off x="82782" y="-1386168"/>
+            <a:ext cx="2424873" cy="3611191"/>
+          </a:xfrm>
+          <a:custGeom>
+            <a:avLst/>
+            <a:gdLst>
+              <a:gd name="connsiteX0" fmla="*/ 0 w 2424873"/>
+              <a:gd name="connsiteY0" fmla="*/ 2424874 h 3611191"/>
+              <a:gd name="connsiteX1" fmla="*/ 2424873 w 2424873"/>
+              <a:gd name="connsiteY1" fmla="*/ 0 h 3611191"/>
+              <a:gd name="connsiteX2" fmla="*/ 2424873 w 2424873"/>
+              <a:gd name="connsiteY2" fmla="*/ 3611191 h 3611191"/>
+              <a:gd name="connsiteX3" fmla="*/ 1186317 w 2424873"/>
+              <a:gd name="connsiteY3" fmla="*/ 3611191 h 3611191"/>
+            </a:gdLst>
+            <a:ahLst/>
+            <a:cxnLst>
+              <a:cxn ang="0">
+                <a:pos x="connsiteX0" y="connsiteY0"/>
+              </a:cxn>
+              <a:cxn ang="0">
+                <a:pos x="connsiteX1" y="connsiteY1"/>
+              </a:cxn>
+              <a:cxn ang="0">
+                <a:pos x="connsiteX2" y="connsiteY2"/>
+              </a:cxn>
+              <a:cxn ang="0">
+                <a:pos x="connsiteX3" y="connsiteY3"/>
+              </a:cxn>
+            </a:cxnLst>
+            <a:rect l="l" t="t" r="r" b="b"/>
+            <a:pathLst>
+              <a:path w="2424873" h="3611191">
+                <a:moveTo>
+                  <a:pt x="0" y="2424874"/>
+                </a:moveTo>
+                <a:lnTo>
+                  <a:pt x="2424873" y="0"/>
+                </a:lnTo>
+                <a:lnTo>
+                  <a:pt x="2424873" y="3611191"/>
+                </a:lnTo>
+                <a:lnTo>
+                  <a:pt x="1186317" y="3611191"/>
+                </a:lnTo>
+                <a:close/>
+              </a:path>
+            </a:pathLst>
+          </a:custGeom>
+          <a:solidFill>
+            <a:schemeClr val="accent4">
+              <a:alpha val="40000"/>
+            </a:schemeClr>
+          </a:solidFill>
+          <a:ln>
+            <a:noFill/>
+          </a:ln>
+        </p:spPr>
+        <p:style>
+          <a:lnRef idx="2">
+            <a:schemeClr val="accent1">
+              <a:shade val="50000"/>
+            </a:schemeClr>
+          </a:lnRef>
+          <a:fillRef idx="1">
+            <a:schemeClr val="accent1"/>
+          </a:fillRef>
+          <a:effectRef idx="0">
+            <a:schemeClr val="accent1"/>
+          </a:effectRef>
+          <a:fontRef idx="minor">
+            <a:schemeClr val="lt1"/>
+          </a:fontRef>
+        </p:style>
+        <p:txBody>
+          <a:bodyPr wrap="square" rtlCol="0" anchor="ctr">
+            <a:noAutofit/>
+          </a:bodyPr>
+          <a:lstStyle/>
+          <a:p>
+            <a:pPr algn="ctr"/>
+            <a:endParaRPr lang="en-US"/>
+          </a:p>
+        </p:txBody>
+      </p:sp>
+      <p:sp>
+        <p:nvSpPr>
+          <p:cNvPr id="12" name="Freeform: Shape 11">
+            <a:extLst>
+              <a:ext uri="{FF2B5EF4-FFF2-40B4-BE49-F238E27FC236}">
+                <a16:creationId xmlns:a16="http://schemas.microsoft.com/office/drawing/2014/main" xmlns="" id="{84617302-4B0D-4351-A6BB-6F0930D943AC}"/>
+              </a:ext>
+              <a:ext uri="{C183D7F6-B498-43B3-948B-1728B52AA6E4}">
+                <adec:decorative xmlns:adec="http://schemas.microsoft.com/office/drawing/2017/decorative" xmlns="" val="1"/>
+              </a:ext>
+            </a:extLst>
+          </p:cNvPr>
+          <p:cNvSpPr>
+            <a:spLocks noGrp="1" noRot="1" noChangeAspect="1" noMove="1" noResize="1" noEditPoints="1" noAdjustHandles="1" noChangeArrowheads="1" noChangeShapeType="1" noTextEdit="1"/>
+          </p:cNvSpPr>
+          <p:nvPr>
+            <p:extLst>
+              <p:ext uri="{386F3935-93C4-4BCD-93E2-E3B085C9AB24}">
+                <p16:designElem xmlns:p16="http://schemas.microsoft.com/office/powerpoint/2015/main" xmlns="" val="1"/>
+              </p:ext>
+            </p:extLst>
+          </p:nvPr>
+        </p:nvSpPr>
+        <p:spPr>
+          <a:xfrm rot="2700000">
+            <a:off x="1571000" y="-338582"/>
+            <a:ext cx="1635955" cy="1635955"/>
+          </a:xfrm>
+          <a:custGeom>
+            <a:avLst/>
+            <a:gdLst>
+              <a:gd name="connsiteX0" fmla="*/ 0 w 1635955"/>
+              <a:gd name="connsiteY0" fmla="*/ 957987 h 1635955"/>
+              <a:gd name="connsiteX1" fmla="*/ 957987 w 1635955"/>
+              <a:gd name="connsiteY1" fmla="*/ 0 h 1635955"/>
+              <a:gd name="connsiteX2" fmla="*/ 1635955 w 1635955"/>
+              <a:gd name="connsiteY2" fmla="*/ 0 h 1635955"/>
+              <a:gd name="connsiteX3" fmla="*/ 1635955 w 1635955"/>
+              <a:gd name="connsiteY3" fmla="*/ 1635955 h 1635955"/>
+              <a:gd name="connsiteX4" fmla="*/ 0 w 1635955"/>
+              <a:gd name="connsiteY4" fmla="*/ 1635955 h 1635955"/>
+            </a:gdLst>
+            <a:ahLst/>
+            <a:cxnLst>
+              <a:cxn ang="0">
+                <a:pos x="connsiteX0" y="connsiteY0"/>
+              </a:cxn>
+              <a:cxn ang="0">
+                <a:pos x="connsiteX1" y="connsiteY1"/>
+              </a:cxn>
+              <a:cxn ang="0">
+                <a:pos x="connsiteX2" y="connsiteY2"/>
+              </a:cxn>
+              <a:cxn ang="0">
+                <a:pos x="connsiteX3" y="connsiteY3"/>
+              </a:cxn>
+              <a:cxn ang="0">
+                <a:pos x="connsiteX4" y="connsiteY4"/>
+              </a:cxn>
+            </a:cxnLst>
+            <a:rect l="l" t="t" r="r" b="b"/>
+            <a:pathLst>
+              <a:path w="1635955" h="1635955">
+                <a:moveTo>
+                  <a:pt x="0" y="957987"/>
+                </a:moveTo>
+                <a:lnTo>
+                  <a:pt x="957987" y="0"/>
+                </a:lnTo>
+                <a:lnTo>
+                  <a:pt x="1635955" y="0"/>
+                </a:lnTo>
+                <a:lnTo>
+                  <a:pt x="1635955" y="1635955"/>
+                </a:lnTo>
+                <a:lnTo>
+                  <a:pt x="0" y="1635955"/>
+                </a:lnTo>
+                <a:close/>
+              </a:path>
+            </a:pathLst>
+          </a:custGeom>
+          <a:solidFill>
+            <a:schemeClr val="accent4">
+              <a:alpha val="40000"/>
+            </a:schemeClr>
+          </a:solidFill>
+          <a:ln>
+            <a:noFill/>
+          </a:ln>
+        </p:spPr>
+        <p:style>
+          <a:lnRef idx="2">
+            <a:schemeClr val="accent1">
+              <a:shade val="50000"/>
+            </a:schemeClr>
+          </a:lnRef>
+          <a:fillRef idx="1">
+            <a:schemeClr val="accent1"/>
+          </a:fillRef>
+          <a:effectRef idx="0">
+            <a:schemeClr val="accent1"/>
+          </a:effectRef>
+          <a:fontRef idx="minor">
+            <a:schemeClr val="lt1"/>
+          </a:fontRef>
+        </p:style>
+        <p:txBody>
+          <a:bodyPr wrap="square" rtlCol="0" anchor="ctr">
+            <a:noAutofit/>
+          </a:bodyPr>
+          <a:lstStyle/>
+          <a:p>
+            <a:pPr algn="ctr"/>
+            <a:endParaRPr lang="en-US"/>
+          </a:p>
+        </p:txBody>
+      </p:sp>
+      <p:sp>
+        <p:nvSpPr>
+          <p:cNvPr id="14" name="Freeform: Shape 13">
+            <a:extLst>
+              <a:ext uri="{FF2B5EF4-FFF2-40B4-BE49-F238E27FC236}">
+                <a16:creationId xmlns:a16="http://schemas.microsoft.com/office/drawing/2014/main" xmlns="" id="{DA2C7802-C2E0-4218-8F89-8DD7CCD2CD1C}"/>
+              </a:ext>
+              <a:ext uri="{C183D7F6-B498-43B3-948B-1728B52AA6E4}">
+                <adec:decorative xmlns:adec="http://schemas.microsoft.com/office/drawing/2017/decorative" xmlns="" val="1"/>
+              </a:ext>
+            </a:extLst>
+          </p:cNvPr>
+          <p:cNvSpPr>
+            <a:spLocks noGrp="1" noRot="1" noChangeAspect="1" noMove="1" noResize="1" noEditPoints="1" noAdjustHandles="1" noChangeArrowheads="1" noChangeShapeType="1" noTextEdit="1"/>
+          </p:cNvSpPr>
+          <p:nvPr>
+            <p:extLst>
+              <p:ext uri="{386F3935-93C4-4BCD-93E2-E3B085C9AB24}">
+                <p16:designElem xmlns:p16="http://schemas.microsoft.com/office/powerpoint/2015/main" xmlns="" val="1"/>
+              </p:ext>
+            </p:extLst>
+          </p:nvPr>
+        </p:nvSpPr>
+        <p:spPr>
+          <a:xfrm rot="2700000">
+            <a:off x="9627985" y="-6588"/>
+            <a:ext cx="4059393" cy="2548110"/>
+          </a:xfrm>
+          <a:custGeom>
+            <a:avLst/>
+            <a:gdLst>
+              <a:gd name="connsiteX0" fmla="*/ 0 w 4059393"/>
+              <a:gd name="connsiteY0" fmla="*/ 1511282 h 2548110"/>
+              <a:gd name="connsiteX1" fmla="*/ 1511282 w 4059393"/>
+              <a:gd name="connsiteY1" fmla="*/ 0 h 2548110"/>
+              <a:gd name="connsiteX2" fmla="*/ 4059393 w 4059393"/>
+              <a:gd name="connsiteY2" fmla="*/ 2548110 h 2548110"/>
+              <a:gd name="connsiteX3" fmla="*/ 0 w 4059393"/>
+              <a:gd name="connsiteY3" fmla="*/ 2548110 h 2548110"/>
+            </a:gdLst>
+            <a:ahLst/>
+            <a:cxnLst>
+              <a:cxn ang="0">
+                <a:pos x="connsiteX0" y="connsiteY0"/>
+              </a:cxn>
+              <a:cxn ang="0">
+                <a:pos x="connsiteX1" y="connsiteY1"/>
+              </a:cxn>
+              <a:cxn ang="0">
+                <a:pos x="connsiteX2" y="connsiteY2"/>
+              </a:cxn>
+              <a:cxn ang="0">
+                <a:pos x="connsiteX3" y="connsiteY3"/>
+              </a:cxn>
+            </a:cxnLst>
+            <a:rect l="l" t="t" r="r" b="b"/>
+            <a:pathLst>
+              <a:path w="4059393" h="2548110">
+                <a:moveTo>
+                  <a:pt x="0" y="1511282"/>
+                </a:moveTo>
+                <a:lnTo>
+                  <a:pt x="1511282" y="0"/>
+                </a:lnTo>
+                <a:lnTo>
+                  <a:pt x="4059393" y="2548110"/>
+                </a:lnTo>
+                <a:lnTo>
+                  <a:pt x="0" y="2548110"/>
+                </a:lnTo>
+                <a:close/>
+              </a:path>
+            </a:pathLst>
+          </a:custGeom>
+          <a:solidFill>
+            <a:schemeClr val="accent1">
+              <a:alpha val="30000"/>
+            </a:schemeClr>
+          </a:solidFill>
+          <a:ln>
+            <a:noFill/>
+          </a:ln>
+        </p:spPr>
+        <p:style>
+          <a:lnRef idx="2">
+            <a:schemeClr val="accent1">
+              <a:shade val="50000"/>
+            </a:schemeClr>
+          </a:lnRef>
+          <a:fillRef idx="1">
+            <a:schemeClr val="accent1"/>
+          </a:fillRef>
+          <a:effectRef idx="0">
+            <a:schemeClr val="accent1"/>
+          </a:effectRef>
+          <a:fontRef idx="minor">
+            <a:schemeClr val="lt1"/>
+          </a:fontRef>
+        </p:style>
+        <p:txBody>
+          <a:bodyPr wrap="square" rtlCol="0" anchor="ctr">
+            <a:noAutofit/>
+          </a:bodyPr>
+          <a:lstStyle/>
+          <a:p>
+            <a:pPr algn="ctr"/>
+            <a:endParaRPr lang="en-US"/>
+          </a:p>
+        </p:txBody>
+      </p:sp>
+      <p:sp>
+        <p:nvSpPr>
+          <p:cNvPr id="16" name="Rectangle 15">
+            <a:extLst>
+              <a:ext uri="{FF2B5EF4-FFF2-40B4-BE49-F238E27FC236}">
+                <a16:creationId xmlns:a16="http://schemas.microsoft.com/office/drawing/2014/main" xmlns="" id="{A6D7111A-21E5-4EE9-8A78-10E5530F0116}"/>
+              </a:ext>
+              <a:ext uri="{C183D7F6-B498-43B3-948B-1728B52AA6E4}">
+                <adec:decorative xmlns:adec="http://schemas.microsoft.com/office/drawing/2017/decorative" xmlns="" val="1"/>
+              </a:ext>
+            </a:extLst>
+          </p:cNvPr>
+          <p:cNvSpPr>
+            <a:spLocks noGrp="1" noRot="1" noChangeAspect="1" noMove="1" noResize="1" noEditPoints="1" noAdjustHandles="1" noChangeArrowheads="1" noChangeShapeType="1" noTextEdit="1"/>
+          </p:cNvSpPr>
+          <p:nvPr>
+            <p:extLst>
+              <p:ext uri="{386F3935-93C4-4BCD-93E2-E3B085C9AB24}">
+                <p16:designElem xmlns:p16="http://schemas.microsoft.com/office/powerpoint/2015/main" xmlns="" val="1"/>
+              </p:ext>
+            </p:extLst>
+          </p:nvPr>
+        </p:nvSpPr>
+        <p:spPr>
+          <a:xfrm rot="2700000">
+            <a:off x="10262924" y="1465780"/>
+            <a:ext cx="1185708" cy="1185708"/>
+          </a:xfrm>
+          <a:prstGeom prst="rect">
+            <a:avLst/>
+          </a:prstGeom>
+          <a:solidFill>
+            <a:schemeClr val="accent1">
+              <a:alpha val="30000"/>
+            </a:schemeClr>
+          </a:solidFill>
+          <a:ln>
+            <a:noFill/>
+          </a:ln>
+        </p:spPr>
+        <p:style>
+          <a:lnRef idx="2">
+            <a:schemeClr val="accent1">
+              <a:shade val="50000"/>
+            </a:schemeClr>
+          </a:lnRef>
+          <a:fillRef idx="1">
+            <a:schemeClr val="accent1"/>
+          </a:fillRef>
+          <a:effectRef idx="0">
+            <a:schemeClr val="accent1"/>
+          </a:effectRef>
+          <a:fontRef idx="minor">
+            <a:schemeClr val="lt1"/>
+          </a:fontRef>
+        </p:style>
+        <p:txBody>
+          <a:bodyPr wrap="square" rtlCol="0" anchor="ctr">
+            <a:noAutofit/>
+          </a:bodyPr>
+          <a:lstStyle/>
+          <a:p>
+            <a:pPr algn="ctr"/>
+            <a:endParaRPr lang="en-US"/>
+          </a:p>
+        </p:txBody>
+      </p:sp>
+      <p:sp>
+        <p:nvSpPr>
+          <p:cNvPr id="18" name="Freeform: Shape 17">
+            <a:extLst>
+              <a:ext uri="{FF2B5EF4-FFF2-40B4-BE49-F238E27FC236}">
+                <a16:creationId xmlns:a16="http://schemas.microsoft.com/office/drawing/2014/main" xmlns="" id="{A3969E80-A77B-49FC-9122-D89AFD5EE118}"/>
+              </a:ext>
+              <a:ext uri="{C183D7F6-B498-43B3-948B-1728B52AA6E4}">
+                <adec:decorative xmlns:adec="http://schemas.microsoft.com/office/drawing/2017/decorative" xmlns="" val="1"/>
+              </a:ext>
+            </a:extLst>
+          </p:cNvPr>
+          <p:cNvSpPr>
+            <a:spLocks noGrp="1" noRot="1" noChangeAspect="1" noMove="1" noResize="1" noEditPoints="1" noAdjustHandles="1" noChangeArrowheads="1" noChangeShapeType="1" noTextEdit="1"/>
+          </p:cNvSpPr>
+          <p:nvPr>
+            <p:extLst>
+              <p:ext uri="{386F3935-93C4-4BCD-93E2-E3B085C9AB24}">
+                <p16:designElem xmlns:p16="http://schemas.microsoft.com/office/powerpoint/2015/main" xmlns="" val="1"/>
+              </p:ext>
+            </p:extLst>
+          </p:nvPr>
+        </p:nvSpPr>
+        <p:spPr>
+          <a:xfrm rot="2700000">
+            <a:off x="-29557" y="5198743"/>
+            <a:ext cx="2444907" cy="2366116"/>
+          </a:xfrm>
+          <a:custGeom>
+            <a:avLst/>
+            <a:gdLst>
+              <a:gd name="connsiteX0" fmla="*/ 0 w 2203753"/>
+              <a:gd name="connsiteY0" fmla="*/ 0 h 2132734"/>
+              <a:gd name="connsiteX1" fmla="*/ 2203753 w 2203753"/>
+              <a:gd name="connsiteY1" fmla="*/ 0 h 2132734"/>
+              <a:gd name="connsiteX2" fmla="*/ 2203753 w 2203753"/>
+              <a:gd name="connsiteY2" fmla="*/ 576461 h 2132734"/>
+              <a:gd name="connsiteX3" fmla="*/ 647480 w 2203753"/>
+              <a:gd name="connsiteY3" fmla="*/ 2132734 h 2132734"/>
+              <a:gd name="connsiteX4" fmla="*/ 0 w 2203753"/>
+              <a:gd name="connsiteY4" fmla="*/ 1485255 h 2132734"/>
+            </a:gdLst>
+            <a:ahLst/>
+            <a:cxnLst>
+              <a:cxn ang="0">
+                <a:pos x="connsiteX0" y="connsiteY0"/>
+              </a:cxn>
+              <a:cxn ang="0">
+                <a:pos x="connsiteX1" y="connsiteY1"/>
+              </a:cxn>
+              <a:cxn ang="0">
+                <a:pos x="connsiteX2" y="connsiteY2"/>
+              </a:cxn>
+              <a:cxn ang="0">
+                <a:pos x="connsiteX3" y="connsiteY3"/>
+              </a:cxn>
+              <a:cxn ang="0">
+                <a:pos x="connsiteX4" y="connsiteY4"/>
+              </a:cxn>
+            </a:cxnLst>
+            <a:rect l="l" t="t" r="r" b="b"/>
+            <a:pathLst>
+              <a:path w="2203753" h="2132734">
+                <a:moveTo>
+                  <a:pt x="0" y="0"/>
+                </a:moveTo>
+                <a:lnTo>
+                  <a:pt x="2203753" y="0"/>
+                </a:lnTo>
+                <a:lnTo>
+                  <a:pt x="2203753" y="576461"/>
+                </a:lnTo>
+                <a:lnTo>
+                  <a:pt x="647480" y="2132734"/>
+                </a:lnTo>
+                <a:lnTo>
+                  <a:pt x="0" y="1485255"/>
+                </a:lnTo>
+                <a:close/>
+              </a:path>
+            </a:pathLst>
+          </a:custGeom>
+          <a:solidFill>
+            <a:schemeClr val="accent1">
+              <a:alpha val="30000"/>
+            </a:schemeClr>
+          </a:solidFill>
+          <a:ln>
+            <a:noFill/>
+          </a:ln>
+        </p:spPr>
+        <p:style>
+          <a:lnRef idx="2">
+            <a:schemeClr val="accent1">
+              <a:shade val="50000"/>
+            </a:schemeClr>
+          </a:lnRef>
+          <a:fillRef idx="1">
+            <a:schemeClr val="accent1"/>
+          </a:fillRef>
+          <a:effectRef idx="0">
+            <a:schemeClr val="accent1"/>
+          </a:effectRef>
+          <a:fontRef idx="minor">
+            <a:schemeClr val="lt1"/>
+          </a:fontRef>
+        </p:style>
+        <p:txBody>
+          <a:bodyPr wrap="square" rtlCol="0" anchor="ctr">
+            <a:noAutofit/>
+          </a:bodyPr>
+          <a:lstStyle/>
+          <a:p>
+            <a:pPr algn="ctr"/>
+            <a:endParaRPr lang="en-US"/>
+          </a:p>
+        </p:txBody>
+      </p:sp>
+      <p:sp>
+        <p:nvSpPr>
+          <p:cNvPr id="20" name="Rectangle 19">
+            <a:extLst>
+              <a:ext uri="{FF2B5EF4-FFF2-40B4-BE49-F238E27FC236}">
+                <a16:creationId xmlns:a16="http://schemas.microsoft.com/office/drawing/2014/main" xmlns="" id="{1849CA57-76BD-4CF2-80BA-D7A46A01B7B1}"/>
+              </a:ext>
+              <a:ext uri="{C183D7F6-B498-43B3-948B-1728B52AA6E4}">
+                <adec:decorative xmlns:adec="http://schemas.microsoft.com/office/drawing/2017/decorative" xmlns="" val="1"/>
+              </a:ext>
+            </a:extLst>
+          </p:cNvPr>
+          <p:cNvSpPr>
+            <a:spLocks noGrp="1" noRot="1" noChangeAspect="1" noMove="1" noResize="1" noEditPoints="1" noAdjustHandles="1" noChangeArrowheads="1" noChangeShapeType="1" noTextEdit="1"/>
+          </p:cNvSpPr>
+          <p:nvPr>
+            <p:extLst>
+              <p:ext uri="{386F3935-93C4-4BCD-93E2-E3B085C9AB24}">
+                <p16:designElem xmlns:p16="http://schemas.microsoft.com/office/powerpoint/2015/main" xmlns="" val="1"/>
+              </p:ext>
+            </p:extLst>
+          </p:nvPr>
+        </p:nvSpPr>
+        <p:spPr>
+          <a:xfrm rot="2700000">
+            <a:off x="1769787" y="5439893"/>
+            <a:ext cx="928467" cy="928467"/>
+          </a:xfrm>
+          <a:prstGeom prst="rect">
+            <a:avLst/>
+          </a:prstGeom>
+          <a:solidFill>
+            <a:schemeClr val="accent1">
+              <a:alpha val="30000"/>
+            </a:schemeClr>
+          </a:solidFill>
+          <a:ln>
+            <a:noFill/>
+          </a:ln>
+        </p:spPr>
+        <p:style>
+          <a:lnRef idx="2">
+            <a:schemeClr val="accent1">
+              <a:shade val="50000"/>
+            </a:schemeClr>
+          </a:lnRef>
+          <a:fillRef idx="1">
+            <a:schemeClr val="accent1"/>
+          </a:fillRef>
+          <a:effectRef idx="0">
+            <a:schemeClr val="accent1"/>
+          </a:effectRef>
+          <a:fontRef idx="minor">
+            <a:schemeClr val="lt1"/>
+          </a:fontRef>
+        </p:style>
+        <p:txBody>
+          <a:bodyPr wrap="square" rtlCol="0" anchor="ctr">
+            <a:noAutofit/>
+          </a:bodyPr>
+          <a:lstStyle/>
+          <a:p>
+            <a:pPr algn="ctr"/>
+            <a:endParaRPr lang="en-US">
+              <a:solidFill>
+                <a:srgbClr val="FFFFFF"/>
+              </a:solidFill>
+              <a:effectLst>
+                <a:outerShdw blurRad="38100" dist="38100" dir="2700000" algn="tl">
+                  <a:srgbClr val="000000">
+                    <a:alpha val="43137"/>
+                  </a:srgbClr>
+                </a:outerShdw>
+              </a:effectLst>
+            </a:endParaRPr>
+          </a:p>
+        </p:txBody>
+      </p:sp>
+      <p:sp>
+        <p:nvSpPr>
+          <p:cNvPr id="22" name="Freeform: Shape 21">
+            <a:extLst>
+              <a:ext uri="{FF2B5EF4-FFF2-40B4-BE49-F238E27FC236}">
+                <a16:creationId xmlns:a16="http://schemas.microsoft.com/office/drawing/2014/main" xmlns="" id="{35E9085E-E730-4768-83D4-6CB7E9897153}"/>
+              </a:ext>
+              <a:ext uri="{C183D7F6-B498-43B3-948B-1728B52AA6E4}">
+                <adec:decorative xmlns:adec="http://schemas.microsoft.com/office/drawing/2017/decorative" xmlns="" val="1"/>
+              </a:ext>
+            </a:extLst>
+          </p:cNvPr>
+          <p:cNvSpPr>
+            <a:spLocks noGrp="1" noRot="1" noChangeAspect="1" noMove="1" noResize="1" noEditPoints="1" noAdjustHandles="1" noChangeArrowheads="1" noChangeShapeType="1" noTextEdit="1"/>
+          </p:cNvSpPr>
+          <p:nvPr>
+            <p:extLst>
+              <p:ext uri="{386F3935-93C4-4BCD-93E2-E3B085C9AB24}">
+                <p16:designElem xmlns:p16="http://schemas.microsoft.com/office/powerpoint/2015/main" xmlns="" val="1"/>
+              </p:ext>
+            </p:extLst>
+          </p:nvPr>
+        </p:nvSpPr>
+        <p:spPr>
+          <a:xfrm rot="2700000">
+            <a:off x="3401311" y="734311"/>
+            <a:ext cx="5389379" cy="5389379"/>
+          </a:xfrm>
+          <a:custGeom>
+            <a:avLst/>
+            <a:gdLst>
+              <a:gd name="connsiteX0" fmla="*/ 0 w 5389379"/>
+              <a:gd name="connsiteY0" fmla="*/ 540040 h 5389379"/>
+              <a:gd name="connsiteX1" fmla="*/ 540040 w 5389379"/>
+              <a:gd name="connsiteY1" fmla="*/ 0 h 5389379"/>
+              <a:gd name="connsiteX2" fmla="*/ 5389379 w 5389379"/>
+              <a:gd name="connsiteY2" fmla="*/ 0 h 5389379"/>
+              <a:gd name="connsiteX3" fmla="*/ 5389379 w 5389379"/>
+              <a:gd name="connsiteY3" fmla="*/ 4838655 h 5389379"/>
+              <a:gd name="connsiteX4" fmla="*/ 4838655 w 5389379"/>
+              <a:gd name="connsiteY4" fmla="*/ 5389379 h 5389379"/>
+              <a:gd name="connsiteX5" fmla="*/ 0 w 5389379"/>
+              <a:gd name="connsiteY5" fmla="*/ 5389379 h 5389379"/>
+            </a:gdLst>
+            <a:ahLst/>
+            <a:cxnLst>
+              <a:cxn ang="0">
+                <a:pos x="connsiteX0" y="connsiteY0"/>
+              </a:cxn>
+              <a:cxn ang="0">
+                <a:pos x="connsiteX1" y="connsiteY1"/>
+              </a:cxn>
+              <a:cxn ang="0">
+                <a:pos x="connsiteX2" y="connsiteY2"/>
+              </a:cxn>
+              <a:cxn ang="0">
+                <a:pos x="connsiteX3" y="connsiteY3"/>
+              </a:cxn>
+              <a:cxn ang="0">
+                <a:pos x="connsiteX4" y="connsiteY4"/>
+              </a:cxn>
+              <a:cxn ang="0">
+                <a:pos x="connsiteX5" y="connsiteY5"/>
+              </a:cxn>
+            </a:cxnLst>
+            <a:rect l="l" t="t" r="r" b="b"/>
+            <a:pathLst>
+              <a:path w="5389379" h="5389379">
+                <a:moveTo>
+                  <a:pt x="0" y="540040"/>
+                </a:moveTo>
+                <a:lnTo>
+                  <a:pt x="540040" y="0"/>
+                </a:lnTo>
+                <a:lnTo>
+                  <a:pt x="5389379" y="0"/>
+                </a:lnTo>
+                <a:lnTo>
+                  <a:pt x="5389379" y="4838655"/>
+                </a:lnTo>
+                <a:lnTo>
+                  <a:pt x="4838655" y="5389379"/>
+                </a:lnTo>
+                <a:lnTo>
+                  <a:pt x="0" y="5389379"/>
+                </a:lnTo>
+                <a:close/>
+              </a:path>
+            </a:pathLst>
+          </a:custGeom>
+          <a:solidFill>
+            <a:srgbClr val="FFFFFF"/>
+          </a:solidFill>
+          <a:ln>
+            <a:noFill/>
+          </a:ln>
+        </p:spPr>
+        <p:style>
+          <a:lnRef idx="2">
+            <a:schemeClr val="accent1">
+              <a:shade val="50000"/>
+            </a:schemeClr>
+          </a:lnRef>
+          <a:fillRef idx="1">
+            <a:schemeClr val="accent1"/>
+          </a:fillRef>
+          <a:effectRef idx="0">
+            <a:schemeClr val="accent1"/>
+          </a:effectRef>
+          <a:fontRef idx="minor">
+            <a:schemeClr val="lt1"/>
+          </a:fontRef>
+        </p:style>
+        <p:txBody>
+          <a:bodyPr wrap="square" rtlCol="0" anchor="ctr">
+            <a:noAutofit/>
+          </a:bodyPr>
+          <a:lstStyle/>
+          <a:p>
+            <a:pPr algn="ctr"/>
+            <a:endParaRPr lang="en-US"/>
+          </a:p>
+        </p:txBody>
+      </p:sp>
+      <p:sp>
+        <p:nvSpPr>
+          <p:cNvPr id="24" name="Freeform: Shape 23">
+            <a:extLst>
+              <a:ext uri="{FF2B5EF4-FFF2-40B4-BE49-F238E27FC236}">
+                <a16:creationId xmlns:a16="http://schemas.microsoft.com/office/drawing/2014/main" xmlns="" id="{973272FE-A474-4CAE-8CA2-BCC8B476C3F4}"/>
+              </a:ext>
+              <a:ext uri="{C183D7F6-B498-43B3-948B-1728B52AA6E4}">
+                <adec:decorative xmlns:adec="http://schemas.microsoft.com/office/drawing/2017/decorative" xmlns="" val="1"/>
+              </a:ext>
+            </a:extLst>
+          </p:cNvPr>
+          <p:cNvSpPr>
+            <a:spLocks noGrp="1" noRot="1" noChangeAspect="1" noMove="1" noResize="1" noEditPoints="1" noAdjustHandles="1" noChangeArrowheads="1" noChangeShapeType="1" noTextEdit="1"/>
+          </p:cNvSpPr>
+          <p:nvPr>
+            <p:extLst>
+              <p:ext uri="{386F3935-93C4-4BCD-93E2-E3B085C9AB24}">
+                <p16:designElem xmlns:p16="http://schemas.microsoft.com/office/powerpoint/2015/main" xmlns="" val="1"/>
+              </p:ext>
+            </p:extLst>
+          </p:nvPr>
+        </p:nvSpPr>
+        <p:spPr>
+          <a:xfrm rot="2700000">
+            <a:off x="2700283" y="33283"/>
+            <a:ext cx="6791435" cy="6791435"/>
+          </a:xfrm>
+          <a:custGeom>
+            <a:avLst/>
+            <a:gdLst>
+              <a:gd name="connsiteX0" fmla="*/ 1860938 w 6791435"/>
+              <a:gd name="connsiteY0" fmla="*/ 81158 h 6791435"/>
+              <a:gd name="connsiteX1" fmla="*/ 1942096 w 6791435"/>
+              <a:gd name="connsiteY1" fmla="*/ 0 h 6791435"/>
+              <a:gd name="connsiteX2" fmla="*/ 6791435 w 6791435"/>
+              <a:gd name="connsiteY2" fmla="*/ 0 h 6791435"/>
+              <a:gd name="connsiteX3" fmla="*/ 6791435 w 6791435"/>
+              <a:gd name="connsiteY3" fmla="*/ 4838655 h 6791435"/>
+              <a:gd name="connsiteX4" fmla="*/ 6710277 w 6791435"/>
+              <a:gd name="connsiteY4" fmla="*/ 4919813 h 6791435"/>
+              <a:gd name="connsiteX5" fmla="*/ 6710277 w 6791435"/>
+              <a:gd name="connsiteY5" fmla="*/ 81158 h 6791435"/>
+              <a:gd name="connsiteX6" fmla="*/ 0 w 6791435"/>
+              <a:gd name="connsiteY6" fmla="*/ 1942096 h 6791435"/>
+              <a:gd name="connsiteX7" fmla="*/ 81158 w 6791435"/>
+              <a:gd name="connsiteY7" fmla="*/ 1860938 h 6791435"/>
+              <a:gd name="connsiteX8" fmla="*/ 81158 w 6791435"/>
+              <a:gd name="connsiteY8" fmla="*/ 6710277 h 6791435"/>
+              <a:gd name="connsiteX9" fmla="*/ 4919813 w 6791435"/>
+              <a:gd name="connsiteY9" fmla="*/ 6710277 h 6791435"/>
+              <a:gd name="connsiteX10" fmla="*/ 4838655 w 6791435"/>
+              <a:gd name="connsiteY10" fmla="*/ 6791435 h 6791435"/>
+              <a:gd name="connsiteX11" fmla="*/ 0 w 6791435"/>
+              <a:gd name="connsiteY11" fmla="*/ 6791435 h 6791435"/>
+            </a:gdLst>
+            <a:ahLst/>
+            <a:cxnLst>
+              <a:cxn ang="0">
+                <a:pos x="connsiteX0" y="connsiteY0"/>
+              </a:cxn>
+              <a:cxn ang="0">
+                <a:pos x="connsiteX1" y="connsiteY1"/>
+              </a:cxn>
+              <a:cxn ang="0">
+                <a:pos x="connsiteX2" y="connsiteY2"/>
+              </a:cxn>
+              <a:cxn ang="0">
+                <a:pos x="connsiteX3" y="connsiteY3"/>
+              </a:cxn>
+              <a:cxn ang="0">
+                <a:pos x="connsiteX4" y="connsiteY4"/>
+              </a:cxn>
+              <a:cxn ang="0">
+                <a:pos x="connsiteX5" y="connsiteY5"/>
+              </a:cxn>
+              <a:cxn ang="0">
+                <a:pos x="connsiteX6" y="connsiteY6"/>
+              </a:cxn>
+              <a:cxn ang="0">
+                <a:pos x="connsiteX7" y="connsiteY7"/>
+              </a:cxn>
+              <a:cxn ang="0">
+                <a:pos x="connsiteX8" y="connsiteY8"/>
+              </a:cxn>
+              <a:cxn ang="0">
+                <a:pos x="connsiteX9" y="connsiteY9"/>
+              </a:cxn>
+              <a:cxn ang="0">
+                <a:pos x="connsiteX10" y="connsiteY10"/>
+              </a:cxn>
+              <a:cxn ang="0">
+                <a:pos x="connsiteX11" y="connsiteY11"/>
+              </a:cxn>
+            </a:cxnLst>
+            <a:rect l="l" t="t" r="r" b="b"/>
+            <a:pathLst>
+              <a:path w="6791435" h="6791435">
+                <a:moveTo>
+                  <a:pt x="1860938" y="81158"/>
+                </a:moveTo>
+                <a:lnTo>
+                  <a:pt x="1942096" y="0"/>
+                </a:lnTo>
+                <a:lnTo>
+                  <a:pt x="6791435" y="0"/>
+                </a:lnTo>
+                <a:lnTo>
+                  <a:pt x="6791435" y="4838655"/>
+                </a:lnTo>
+                <a:lnTo>
+                  <a:pt x="6710277" y="4919813"/>
+                </a:lnTo>
+                <a:lnTo>
+                  <a:pt x="6710277" y="81158"/>
+                </a:lnTo>
+                <a:close/>
+                <a:moveTo>
+                  <a:pt x="0" y="1942096"/>
+                </a:moveTo>
+                <a:lnTo>
+                  <a:pt x="81158" y="1860938"/>
+                </a:lnTo>
+                <a:lnTo>
+                  <a:pt x="81158" y="6710277"/>
+                </a:lnTo>
+                <a:lnTo>
+                  <a:pt x="4919813" y="6710277"/>
+                </a:lnTo>
+                <a:lnTo>
+                  <a:pt x="4838655" y="6791435"/>
+                </a:lnTo>
+                <a:lnTo>
+                  <a:pt x="0" y="6791435"/>
+                </a:lnTo>
+                <a:close/>
+              </a:path>
+            </a:pathLst>
+          </a:custGeom>
+          <a:solidFill>
+            <a:srgbClr val="FFFFFF">
+              <a:alpha val="60000"/>
+            </a:srgbClr>
+          </a:solidFill>
+          <a:ln>
+            <a:noFill/>
+          </a:ln>
+        </p:spPr>
+        <p:style>
+          <a:lnRef idx="2">
+            <a:schemeClr val="accent1">
+              <a:shade val="50000"/>
+            </a:schemeClr>
+          </a:lnRef>
+          <a:fillRef idx="1">
+            <a:schemeClr val="accent1"/>
+          </a:fillRef>
+          <a:effectRef idx="0">
+            <a:schemeClr val="accent1"/>
+          </a:effectRef>
+          <a:fontRef idx="minor">
+            <a:schemeClr val="lt1"/>
+          </a:fontRef>
+        </p:style>
+        <p:txBody>
+          <a:bodyPr wrap="square" rtlCol="0" anchor="ctr">
+            <a:noAutofit/>
+          </a:bodyPr>
+          <a:lstStyle/>
+          <a:p>
+            <a:pPr algn="ctr"/>
+            <a:endParaRPr lang="en-US">
+              <a:solidFill>
+                <a:schemeClr val="tx1"/>
+              </a:solidFill>
+            </a:endParaRPr>
+          </a:p>
+        </p:txBody>
+      </p:sp>
+      <p:sp>
+        <p:nvSpPr>
+          <p:cNvPr id="26" name="Freeform: Shape 25">
+            <a:extLst>
+              <a:ext uri="{FF2B5EF4-FFF2-40B4-BE49-F238E27FC236}">
+                <a16:creationId xmlns:a16="http://schemas.microsoft.com/office/drawing/2014/main" xmlns="" id="{E07981EA-05A6-437C-88D7-B377B92B031D}"/>
+              </a:ext>
+              <a:ext uri="{C183D7F6-B498-43B3-948B-1728B52AA6E4}">
+                <adec:decorative xmlns:adec="http://schemas.microsoft.com/office/drawing/2017/decorative" xmlns="" val="1"/>
+              </a:ext>
+            </a:extLst>
+          </p:cNvPr>
+          <p:cNvSpPr>
+            <a:spLocks noGrp="1" noRot="1" noChangeAspect="1" noMove="1" noResize="1" noEditPoints="1" noAdjustHandles="1" noChangeArrowheads="1" noChangeShapeType="1" noTextEdit="1"/>
+          </p:cNvSpPr>
+          <p:nvPr>
+            <p:extLst>
+              <p:ext uri="{386F3935-93C4-4BCD-93E2-E3B085C9AB24}">
+                <p16:designElem xmlns:p16="http://schemas.microsoft.com/office/powerpoint/2015/main" xmlns="" val="1"/>
+              </p:ext>
+            </p:extLst>
+          </p:nvPr>
+        </p:nvSpPr>
+        <p:spPr>
+          <a:xfrm rot="2700000">
+            <a:off x="9629823" y="5457591"/>
+            <a:ext cx="2231794" cy="2568811"/>
+          </a:xfrm>
+          <a:custGeom>
+            <a:avLst/>
+            <a:gdLst>
+              <a:gd name="connsiteX0" fmla="*/ 0 w 2940086"/>
+              <a:gd name="connsiteY0" fmla="*/ 0 h 3384061"/>
+              <a:gd name="connsiteX1" fmla="*/ 2496112 w 2940086"/>
+              <a:gd name="connsiteY1" fmla="*/ 0 h 3384061"/>
+              <a:gd name="connsiteX2" fmla="*/ 2940086 w 2940086"/>
+              <a:gd name="connsiteY2" fmla="*/ 443975 h 3384061"/>
+              <a:gd name="connsiteX3" fmla="*/ 0 w 2940086"/>
+              <a:gd name="connsiteY3" fmla="*/ 3384061 h 3384061"/>
+            </a:gdLst>
+            <a:ahLst/>
+            <a:cxnLst>
+              <a:cxn ang="0">
+                <a:pos x="connsiteX0" y="connsiteY0"/>
+              </a:cxn>
+              <a:cxn ang="0">
+                <a:pos x="connsiteX1" y="connsiteY1"/>
+              </a:cxn>
+              <a:cxn ang="0">
+                <a:pos x="connsiteX2" y="connsiteY2"/>
+              </a:cxn>
+              <a:cxn ang="0">
+                <a:pos x="connsiteX3" y="connsiteY3"/>
+              </a:cxn>
+            </a:cxnLst>
+            <a:rect l="l" t="t" r="r" b="b"/>
+            <a:pathLst>
+              <a:path w="2940086" h="3384061">
+                <a:moveTo>
+                  <a:pt x="0" y="0"/>
+                </a:moveTo>
+                <a:lnTo>
+                  <a:pt x="2496112" y="0"/>
+                </a:lnTo>
+                <a:lnTo>
+                  <a:pt x="2940086" y="443975"/>
+                </a:lnTo>
+                <a:lnTo>
+                  <a:pt x="0" y="3384061"/>
+                </a:lnTo>
+                <a:close/>
+              </a:path>
+            </a:pathLst>
+          </a:custGeom>
+          <a:solidFill>
+            <a:schemeClr val="accent4">
+              <a:alpha val="40000"/>
+            </a:schemeClr>
+          </a:solidFill>
+          <a:ln>
+            <a:noFill/>
+          </a:ln>
+        </p:spPr>
+        <p:style>
+          <a:lnRef idx="2">
+            <a:schemeClr val="accent1">
+              <a:shade val="50000"/>
+            </a:schemeClr>
+          </a:lnRef>
+          <a:fillRef idx="1">
+            <a:schemeClr val="accent1"/>
+          </a:fillRef>
+          <a:effectRef idx="0">
+            <a:schemeClr val="accent1"/>
+          </a:effectRef>
+          <a:fontRef idx="minor">
+            <a:schemeClr val="lt1"/>
+          </a:fontRef>
+        </p:style>
+        <p:txBody>
+          <a:bodyPr wrap="square" rtlCol="0" anchor="ctr">
+            <a:noAutofit/>
+          </a:bodyPr>
+          <a:lstStyle/>
+          <a:p>
+            <a:pPr algn="ctr"/>
+            <a:endParaRPr lang="en-US"/>
+          </a:p>
+        </p:txBody>
+      </p:sp>
+      <p:sp>
+        <p:nvSpPr>
+          <p:cNvPr id="28" name="Rectangle 27">
+            <a:extLst>
+              <a:ext uri="{FF2B5EF4-FFF2-40B4-BE49-F238E27FC236}">
+                <a16:creationId xmlns:a16="http://schemas.microsoft.com/office/drawing/2014/main" xmlns="" id="{15E3C750-986E-4769-B1AE-49289FBEE757}"/>
+              </a:ext>
+              <a:ext uri="{C183D7F6-B498-43B3-948B-1728B52AA6E4}">
+                <adec:decorative xmlns:adec="http://schemas.microsoft.com/office/drawing/2017/decorative" xmlns="" val="1"/>
+              </a:ext>
+            </a:extLst>
+          </p:cNvPr>
+          <p:cNvSpPr>
+            <a:spLocks noGrp="1" noRot="1" noChangeAspect="1" noMove="1" noResize="1" noEditPoints="1" noAdjustHandles="1" noChangeArrowheads="1" noChangeShapeType="1" noTextEdit="1"/>
+          </p:cNvSpPr>
+          <p:nvPr>
+            <p:extLst>
+              <p:ext uri="{386F3935-93C4-4BCD-93E2-E3B085C9AB24}">
+                <p16:designElem xmlns:p16="http://schemas.microsoft.com/office/powerpoint/2015/main" xmlns="" val="1"/>
+              </p:ext>
+            </p:extLst>
+          </p:nvPr>
+        </p:nvSpPr>
+        <p:spPr>
+          <a:xfrm rot="2700000">
+            <a:off x="9720059" y="5243545"/>
+            <a:ext cx="959985" cy="959985"/>
+          </a:xfrm>
+          <a:prstGeom prst="rect">
+            <a:avLst/>
+          </a:prstGeom>
+          <a:solidFill>
+            <a:schemeClr val="accent4">
+              <a:alpha val="40000"/>
+            </a:schemeClr>
+          </a:solidFill>
+          <a:ln>
+            <a:noFill/>
+          </a:ln>
+        </p:spPr>
+        <p:style>
+          <a:lnRef idx="2">
+            <a:schemeClr val="accent1">
+              <a:shade val="50000"/>
+            </a:schemeClr>
+          </a:lnRef>
+          <a:fillRef idx="1">
+            <a:schemeClr val="accent1"/>
+          </a:fillRef>
+          <a:effectRef idx="0">
+            <a:schemeClr val="accent1"/>
+          </a:effectRef>
+          <a:fontRef idx="minor">
+            <a:schemeClr val="lt1"/>
+          </a:fontRef>
+        </p:style>
+        <p:txBody>
+          <a:bodyPr wrap="square" rtlCol="0" anchor="ctr">
+            <a:noAutofit/>
+          </a:bodyPr>
+          <a:lstStyle/>
+          <a:p>
+            <a:pPr algn="ctr"/>
+            <a:endParaRPr lang="en-US"/>
+          </a:p>
+        </p:txBody>
+      </p:sp>
+      <p:sp>
+        <p:nvSpPr>
+          <p:cNvPr id="17" name="TextBox 16">
+            <a:extLst>
+              <a:ext uri="{FF2B5EF4-FFF2-40B4-BE49-F238E27FC236}">
+                <a16:creationId xmlns:a16="http://schemas.microsoft.com/office/drawing/2014/main" xmlns="" id="{79E58039-1AD1-4857-8B26-E5C840871595}"/>
+              </a:ext>
+            </a:extLst>
+          </p:cNvPr>
+          <p:cNvSpPr txBox="1"/>
+          <p:nvPr/>
+        </p:nvSpPr>
+        <p:spPr>
+          <a:xfrm>
+            <a:off x="1389067" y="479395"/>
+            <a:ext cx="6940065" cy="646331"/>
+          </a:xfrm>
+          <a:prstGeom prst="rect">
+            <a:avLst/>
+          </a:prstGeom>
+          <a:noFill/>
+        </p:spPr>
+        <p:txBody>
+          <a:bodyPr wrap="square">
+            <a:spAutoFit/>
+          </a:bodyPr>
+          <a:lstStyle/>
+          <a:p>
+            <a:r>
+              <a:rPr lang="en-US" sz="3600" b="1" u="sng" dirty="0">
+                <a:latin typeface="Times New Roman" panose="02020603050405020304" pitchFamily="18" charset="0"/>
+                <a:cs typeface="Times New Roman" panose="02020603050405020304" pitchFamily="18" charset="0"/>
+              </a:rPr>
+              <a:t>Git Revert to Previous Commit</a:t>
+            </a:r>
+          </a:p>
+        </p:txBody>
+      </p:sp>
+      <p:sp>
+        <p:nvSpPr>
+          <p:cNvPr id="19" name="TextBox 18">
+            <a:extLst>
+              <a:ext uri="{FF2B5EF4-FFF2-40B4-BE49-F238E27FC236}">
+                <a16:creationId xmlns:a16="http://schemas.microsoft.com/office/drawing/2014/main" xmlns="" id="{1C9F9DE5-0A30-4274-98D1-4C3F2D99FC42}"/>
+              </a:ext>
+            </a:extLst>
+          </p:cNvPr>
+          <p:cNvSpPr txBox="1"/>
+          <p:nvPr/>
+        </p:nvSpPr>
+        <p:spPr>
+          <a:xfrm>
+            <a:off x="1518451" y="3350835"/>
+            <a:ext cx="6107184" cy="646331"/>
+          </a:xfrm>
+          <a:prstGeom prst="rect">
+            <a:avLst/>
+          </a:prstGeom>
+          <a:noFill/>
+        </p:spPr>
+        <p:txBody>
+          <a:bodyPr wrap="square">
+            <a:spAutoFit/>
+          </a:bodyPr>
+          <a:lstStyle/>
+          <a:p>
+            <a:r>
+              <a:rPr lang="en-IN" sz="3600" b="1" u="sng" dirty="0">
+                <a:latin typeface="Times New Roman" panose="02020603050405020304" pitchFamily="18" charset="0"/>
+                <a:cs typeface="Times New Roman" panose="02020603050405020304" pitchFamily="18" charset="0"/>
+              </a:rPr>
+              <a:t>Git Revert Merge</a:t>
+            </a:r>
+          </a:p>
+        </p:txBody>
+      </p:sp>
+      <p:sp>
+        <p:nvSpPr>
+          <p:cNvPr id="4" name="TextBox 3">
+            <a:extLst>
+              <a:ext uri="{FF2B5EF4-FFF2-40B4-BE49-F238E27FC236}">
+                <a16:creationId xmlns:a16="http://schemas.microsoft.com/office/drawing/2014/main" xmlns="" id="{02C19D1F-B1C7-4F6C-ACCB-046594DF640C}"/>
+              </a:ext>
+            </a:extLst>
+          </p:cNvPr>
+          <p:cNvSpPr txBox="1"/>
+          <p:nvPr/>
+        </p:nvSpPr>
+        <p:spPr>
+          <a:xfrm>
+            <a:off x="1487328" y="1431689"/>
+            <a:ext cx="8873075" cy="1569660"/>
+          </a:xfrm>
+          <a:prstGeom prst="rect">
+            <a:avLst/>
+          </a:prstGeom>
+          <a:noFill/>
+        </p:spPr>
+        <p:txBody>
+          <a:bodyPr wrap="square" rtlCol="0">
+            <a:spAutoFit/>
+          </a:bodyPr>
+          <a:lstStyle/>
+          <a:p>
+            <a:r>
+              <a:rPr lang="en-US" sz="2400" dirty="0"/>
+              <a:t>To get revert to previous commit first check for the commit reference and then revert back as –</a:t>
+            </a:r>
+          </a:p>
+          <a:p>
+            <a:r>
+              <a:rPr lang="en-IN" sz="2400" dirty="0"/>
+              <a:t>$ git log  </a:t>
+            </a:r>
+            <a:endParaRPr lang="en-US" sz="2400" dirty="0"/>
+          </a:p>
+          <a:p>
+            <a:r>
+              <a:rPr lang="en-IN" sz="2400" dirty="0"/>
+              <a:t>$ git revert</a:t>
+            </a:r>
+            <a:r>
+              <a:rPr lang="en-US" sz="2400" dirty="0"/>
+              <a:t> &lt; commit reference &gt;</a:t>
+            </a:r>
+            <a:endParaRPr lang="en-IN" sz="2400" dirty="0"/>
+          </a:p>
+        </p:txBody>
+      </p:sp>
+      <p:sp>
+        <p:nvSpPr>
+          <p:cNvPr id="23" name="TextBox 22">
+            <a:extLst>
+              <a:ext uri="{FF2B5EF4-FFF2-40B4-BE49-F238E27FC236}">
+                <a16:creationId xmlns:a16="http://schemas.microsoft.com/office/drawing/2014/main" xmlns="" id="{E6F68117-09F4-4473-A07F-1B1C00F843E8}"/>
+              </a:ext>
+            </a:extLst>
+          </p:cNvPr>
+          <p:cNvSpPr txBox="1"/>
+          <p:nvPr/>
+        </p:nvSpPr>
+        <p:spPr>
+          <a:xfrm>
+            <a:off x="1482610" y="4245117"/>
+            <a:ext cx="9396253" cy="1569660"/>
+          </a:xfrm>
+          <a:prstGeom prst="rect">
+            <a:avLst/>
+          </a:prstGeom>
+          <a:noFill/>
+        </p:spPr>
+        <p:txBody>
+          <a:bodyPr wrap="square" rtlCol="0">
+            <a:spAutoFit/>
+          </a:bodyPr>
+          <a:lstStyle/>
+          <a:p>
+            <a:r>
+              <a:rPr lang="en-US" sz="2400" dirty="0"/>
+              <a:t>To get revert the merge first check for the commit reference and then revert back as –</a:t>
+            </a:r>
+          </a:p>
+          <a:p>
+            <a:r>
+              <a:rPr lang="en-IN" sz="2400" dirty="0"/>
+              <a:t>$ git log  </a:t>
+            </a:r>
+            <a:endParaRPr lang="en-US" sz="2400" dirty="0"/>
+          </a:p>
+          <a:p>
+            <a:r>
+              <a:rPr lang="en-US" sz="2400" dirty="0"/>
+              <a:t>$ git revert &lt;commit reference&gt; -m 1  </a:t>
+            </a:r>
+          </a:p>
+        </p:txBody>
+      </p:sp>
+    </p:spTree>
+    <p:extLst>
+      <p:ext uri="{BB962C8B-B14F-4D97-AF65-F5344CB8AC3E}">
+        <p14:creationId xmlns:p14="http://schemas.microsoft.com/office/powerpoint/2010/main" xmlns="" val="1684029393"/>
+      </p:ext>
+    </p:extLst>
+  </p:cSld>
+  <p:clrMapOvr>
+    <a:masterClrMapping/>
+  </p:clrMapOvr>
+</p:sld>
+</file>
+
+<file path=ppt/slides/slide6.xml><?xml version="1.0" encoding="utf-8"?>
+<p:sld xmlns:a="http://schemas.openxmlformats.org/drawingml/2006/main" xmlns:r="http://schemas.openxmlformats.org/officeDocument/2006/relationships" xmlns:p="http://schemas.openxmlformats.org/presentationml/2006/main">
+  <p:cSld>
+    <p:spTree>
+      <p:nvGrpSpPr>
+        <p:cNvPr id="1" name=""/>
+        <p:cNvGrpSpPr/>
+        <p:nvPr/>
+      </p:nvGrpSpPr>
+      <p:grpSpPr>
+        <a:xfrm>
+          <a:off x="0" y="0"/>
+          <a:ext cx="0" cy="0"/>
+          <a:chOff x="0" y="0"/>
+          <a:chExt cx="0" cy="0"/>
+        </a:xfrm>
+      </p:grpSpPr>
+      <p:sp>
+        <p:nvSpPr>
+          <p:cNvPr id="2" name="Title 1"/>
+          <p:cNvSpPr>
+            <a:spLocks noGrp="1"/>
+          </p:cNvSpPr>
+          <p:nvPr>
+            <p:ph type="title"/>
+          </p:nvPr>
+        </p:nvSpPr>
+        <p:spPr/>
+        <p:txBody>
+          <a:bodyPr>
+            <a:normAutofit fontScale="90000"/>
+          </a:bodyPr>
+          <a:lstStyle/>
+          <a:p>
+            <a:pPr lvl="0">
+              <a:lnSpc>
+                <a:spcPct val="100000"/>
+              </a:lnSpc>
+              <a:spcBef>
+                <a:spcPts val="0"/>
+              </a:spcBef>
+              <a:defRPr/>
+            </a:pPr>
+            <a:r>
+              <a:rPr lang="en-IN" b="1" u="sng" dirty="0" smtClean="0">
+                <a:solidFill>
+                  <a:prstClr val="black"/>
+                </a:solidFill>
+                <a:latin typeface="Times New Roman" panose="02020603050405020304" pitchFamily="18" charset="0"/>
+                <a:cs typeface="Times New Roman" panose="02020603050405020304" pitchFamily="18" charset="0"/>
+              </a:rPr>
+              <a:t>Git </a:t>
+            </a:r>
+            <a:r>
+              <a:rPr lang="en-IN" b="1" u="sng" dirty="0" smtClean="0">
+                <a:solidFill>
+                  <a:prstClr val="black"/>
+                </a:solidFill>
+                <a:latin typeface="Times New Roman" panose="02020603050405020304" pitchFamily="18" charset="0"/>
+                <a:cs typeface="Times New Roman" panose="02020603050405020304" pitchFamily="18" charset="0"/>
+              </a:rPr>
+              <a:t>Revert Live example in our remote repo:</a:t>
+            </a:r>
+            <a:endParaRPr lang="en-IN" b="1" u="sng" dirty="0">
+              <a:solidFill>
+                <a:prstClr val="black"/>
+              </a:solidFill>
+              <a:latin typeface="Times New Roman" panose="02020603050405020304" pitchFamily="18" charset="0"/>
+              <a:cs typeface="Times New Roman" panose="02020603050405020304" pitchFamily="18" charset="0"/>
+            </a:endParaRPr>
+          </a:p>
+        </p:txBody>
+      </p:sp>
+      <p:pic>
+        <p:nvPicPr>
+          <p:cNvPr id="1026" name="Picture 2" descr="C:\Users\BABA\Desktop\revert.PNG"/>
+          <p:cNvPicPr>
+            <a:picLocks noGrp="1" noChangeAspect="1" noChangeArrowheads="1"/>
+          </p:cNvPicPr>
+          <p:nvPr>
+            <p:ph idx="1"/>
+          </p:nvPr>
+        </p:nvPicPr>
+        <p:blipFill>
+          <a:blip r:embed="rId2" cstate="print"/>
+          <a:srcRect/>
+          <a:stretch>
+            <a:fillRect/>
+          </a:stretch>
+        </p:blipFill>
+        <p:spPr bwMode="auto">
+          <a:xfrm>
+            <a:off x="838200" y="2168759"/>
+            <a:ext cx="10515600" cy="3665069"/>
+          </a:xfrm>
+          <a:prstGeom prst="rect">
+            <a:avLst/>
+          </a:prstGeom>
+          <a:noFill/>
+        </p:spPr>
+      </p:pic>
+    </p:spTree>
+  </p:cSld>
+  <p:clrMapOvr>
+    <a:masterClrMapping/>
+  </p:clrMapOvr>
+</p:sld>
+</file>
+
+<file path=ppt/slides/slide7.xml><?xml version="1.0" encoding="utf-8"?>
+<p:sld xmlns:a="http://schemas.openxmlformats.org/drawingml/2006/main" xmlns:r="http://schemas.openxmlformats.org/officeDocument/2006/relationships" xmlns:p="http://schemas.openxmlformats.org/presentationml/2006/main">
+  <p:cSld>
+    <p:spTree>
+      <p:nvGrpSpPr>
+        <p:cNvPr id="1" name=""/>
+        <p:cNvGrpSpPr/>
+        <p:nvPr/>
+      </p:nvGrpSpPr>
+      <p:grpSpPr>
+        <a:xfrm>
+          <a:off x="0" y="0"/>
+          <a:ext cx="0" cy="0"/>
+          <a:chOff x="0" y="0"/>
+          <a:chExt cx="0" cy="0"/>
+        </a:xfrm>
+      </p:grpSpPr>
+      <p:sp>
+        <p:nvSpPr>
+          <p:cNvPr id="2" name="Title 1"/>
+          <p:cNvSpPr>
+            <a:spLocks noGrp="1"/>
+          </p:cNvSpPr>
+          <p:nvPr>
+            <p:ph type="title"/>
+          </p:nvPr>
+        </p:nvSpPr>
+        <p:spPr/>
+        <p:txBody>
+          <a:bodyPr/>
+          <a:lstStyle/>
+          <a:p>
+            <a:r>
+              <a:rPr lang="en-IN" b="1" u="sng" dirty="0" smtClean="0">
+                <a:solidFill>
+                  <a:prstClr val="black"/>
+                </a:solidFill>
+                <a:latin typeface="Times New Roman" panose="02020603050405020304" pitchFamily="18" charset="0"/>
+                <a:cs typeface="Times New Roman" panose="02020603050405020304" pitchFamily="18" charset="0"/>
+              </a:rPr>
+              <a:t>Git Revert Live example in </a:t>
+            </a:r>
+            <a:r>
+              <a:rPr lang="en-IN" b="1" u="sng" dirty="0" smtClean="0">
+                <a:solidFill>
+                  <a:prstClr val="black"/>
+                </a:solidFill>
+                <a:latin typeface="Times New Roman" panose="02020603050405020304" pitchFamily="18" charset="0"/>
+                <a:cs typeface="Times New Roman" panose="02020603050405020304" pitchFamily="18" charset="0"/>
+              </a:rPr>
+              <a:t>local </a:t>
+            </a:r>
+            <a:r>
+              <a:rPr lang="en-IN" b="1" u="sng" dirty="0" smtClean="0">
+                <a:solidFill>
+                  <a:prstClr val="black"/>
+                </a:solidFill>
+                <a:latin typeface="Times New Roman" panose="02020603050405020304" pitchFamily="18" charset="0"/>
+                <a:cs typeface="Times New Roman" panose="02020603050405020304" pitchFamily="18" charset="0"/>
+              </a:rPr>
+              <a:t>repo:</a:t>
+            </a:r>
+            <a:endParaRPr lang="en-IN" dirty="0"/>
+          </a:p>
+        </p:txBody>
+      </p:sp>
+      <p:pic>
+        <p:nvPicPr>
+          <p:cNvPr id="2050" name="Picture 2" descr="C:\Users\BABA\Desktop\revert2.PNG"/>
+          <p:cNvPicPr>
+            <a:picLocks noGrp="1" noChangeAspect="1" noChangeArrowheads="1"/>
+          </p:cNvPicPr>
+          <p:nvPr>
+            <p:ph idx="1"/>
+          </p:nvPr>
+        </p:nvPicPr>
+        <p:blipFill>
+          <a:blip r:embed="rId2" cstate="print"/>
+          <a:srcRect/>
+          <a:stretch>
+            <a:fillRect/>
+          </a:stretch>
+        </p:blipFill>
+        <p:spPr bwMode="auto">
+          <a:xfrm>
+            <a:off x="1897812" y="1844434"/>
+            <a:ext cx="8367622" cy="4530486"/>
+          </a:xfrm>
+          <a:prstGeom prst="rect">
+            <a:avLst/>
+          </a:prstGeom>
+          <a:noFill/>
+        </p:spPr>
+      </p:pic>
+    </p:spTree>
+  </p:cSld>
+  <p:clrMapOvr>
+    <a:masterClrMapping/>
+  </p:clrMapOvr>
+</p:sld>
+</file>
+
+<file path=ppt/slides/slide8.xml><?xml version="1.0" encoding="utf-8"?>
+<p:sld xmlns:a="http://schemas.openxmlformats.org/drawingml/2006/main" xmlns:r="http://schemas.openxmlformats.org/officeDocument/2006/relationships" xmlns:p="http://schemas.openxmlformats.org/presentationml/2006/main">
+  <p:cSld>
+    <p:spTree>
+      <p:nvGrpSpPr>
+        <p:cNvPr id="1" name=""/>
+        <p:cNvGrpSpPr/>
+        <p:nvPr/>
+      </p:nvGrpSpPr>
+      <p:grpSpPr>
+        <a:xfrm>
+          <a:off x="0" y="0"/>
+          <a:ext cx="0" cy="0"/>
+          <a:chOff x="0" y="0"/>
+          <a:chExt cx="0" cy="0"/>
+        </a:xfrm>
+      </p:grpSpPr>
+      <p:sp>
+        <p:nvSpPr>
+          <p:cNvPr id="2" name="Title 1"/>
+          <p:cNvSpPr>
+            <a:spLocks noGrp="1"/>
+          </p:cNvSpPr>
+          <p:nvPr>
+            <p:ph type="title"/>
+          </p:nvPr>
+        </p:nvSpPr>
+        <p:spPr/>
+        <p:txBody>
+          <a:bodyPr/>
+          <a:lstStyle/>
+          <a:p>
+            <a:endParaRPr lang="en-IN" dirty="0"/>
+          </a:p>
+        </p:txBody>
+      </p:sp>
+      <p:pic>
+        <p:nvPicPr>
+          <p:cNvPr id="4" name="Content Placeholder 3">
+            <a:extLst>
+              <a:ext uri="{FF2B5EF4-FFF2-40B4-BE49-F238E27FC236}">
+                <a16:creationId xmlns:a16="http://schemas.microsoft.com/office/drawing/2014/main" xmlns="" id="{2B5C12E2-3E2A-4053-9D58-E06D2E83D225}"/>
+              </a:ext>
+            </a:extLst>
+          </p:cNvPr>
+          <p:cNvPicPr>
+            <a:picLocks noGrp="1" noChangeAspect="1"/>
+          </p:cNvPicPr>
+          <p:nvPr>
+            <p:ph idx="1"/>
+          </p:nvPr>
+        </p:nvPicPr>
+        <p:blipFill>
+          <a:blip r:embed="rId2" cstate="print">
+            <a:extLst>
+              <a:ext uri="{28A0092B-C50C-407E-A947-70E740481C1C}">
+                <a14:useLocalDpi xmlns:a14="http://schemas.microsoft.com/office/drawing/2010/main" xmlns="" val="0"/>
+              </a:ext>
+              <a:ext uri="{837473B0-CC2E-450A-ABE3-18F120FF3D39}">
+                <a1611:picAttrSrcUrl xmlns:a1611="http://schemas.microsoft.com/office/drawing/2016/11/main" xmlns="" r:id="rId3"/>
+              </a:ext>
+            </a:extLst>
+          </a:blip>
+          <a:stretch>
+            <a:fillRect/>
+          </a:stretch>
+        </p:blipFill>
+        <p:spPr>
+          <a:xfrm>
+            <a:off x="0" y="0"/>
+            <a:ext cx="12192000" cy="6858000"/>
+          </a:xfrm>
+          <a:prstGeom prst="rect">
+            <a:avLst/>
+          </a:prstGeom>
+        </p:spPr>
+      </p:pic>
+    </p:spTree>
   </p:cSld>
   <p:clrMapOvr>
     <a:masterClrMapping/>
@@ -8672,7 +10347,7 @@
     </a:clrScheme>
     <a:fontScheme name="Office">
       <a:majorFont>
-        <a:latin typeface="Calibri Light" panose="020F0302020204030204"/>
+        <a:latin typeface="Calibri Light"/>
         <a:ea typeface=""/>
         <a:cs typeface=""/>
         <a:font script="Jpan" typeface="游ゴシック Light"/>
@@ -8724,7 +10399,7 @@
         <a:font script="Tfng" typeface="Ebrima"/>
       </a:majorFont>
       <a:minorFont>
-        <a:latin typeface="Calibri" panose="020F0502020204030204"/>
+        <a:latin typeface="Calibri"/>
         <a:ea typeface=""/>
         <a:cs typeface=""/>
         <a:font script="Jpan" typeface="游ゴシック"/>
@@ -8918,7 +10593,7 @@
   <a:extraClrSchemeLst/>
   <a:extLst>
     <a:ext uri="{05A4C25C-085E-4340-85A3-A5531E510DB2}">
-      <thm15:themeFamily xmlns:thm15="http://schemas.microsoft.com/office/thememl/2012/main" name="Office Theme" id="{62F939B6-93AF-4DB8-9C6B-D6C7DFDC589F}" vid="{4A3C46E8-61CC-4603-A589-7422A47A8E4A}"/>
+      <thm15:themeFamily xmlns:thm15="http://schemas.microsoft.com/office/thememl/2012/main" xmlns="" name="Office Theme" id="{62F939B6-93AF-4DB8-9C6B-D6C7DFDC589F}" vid="{4A3C46E8-61CC-4603-A589-7422A47A8E4A}"/>
     </a:ext>
   </a:extLst>
 </a:theme>

</xml_diff>